<commit_message>
Update Fourier Neural Operators.pptx
</commit_message>
<xml_diff>
--- a/Fourier Neural Operators.pptx
+++ b/Fourier Neural Operators.pptx
@@ -11006,6 +11006,35 @@
               <a:buFont typeface="Arial" panose="020B0604020202020204" pitchFamily="34" charset="0"/>
               <a:buChar char="•"/>
             </a:pPr>
+            <a:r>
+              <a:rPr lang="en-US" dirty="0"/>
+              <a:t>Check </a:t>
+            </a:r>
+            <a:r>
+              <a:rPr lang="en-US" dirty="0" err="1"/>
+              <a:t>matlab</a:t>
+            </a:r>
+            <a:r>
+              <a:rPr lang="en-US" dirty="0"/>
+              <a:t> &amp; python combined </a:t>
+            </a:r>
+            <a:r>
+              <a:rPr lang="en-US"/>
+              <a:t>normalization effects</a:t>
+            </a:r>
+          </a:p>
+          <a:p>
+            <a:pPr marL="285750" indent="-285750">
+              <a:buFont typeface="Arial" panose="020B0604020202020204" pitchFamily="34" charset="0"/>
+              <a:buChar char="•"/>
+            </a:pPr>
+            <a:endParaRPr lang="en-US" dirty="0"/>
+          </a:p>
+          <a:p>
+            <a:pPr marL="285750" indent="-285750">
+              <a:buFont typeface="Arial" panose="020B0604020202020204" pitchFamily="34" charset="0"/>
+              <a:buChar char="•"/>
+            </a:pPr>
             <a:endParaRPr lang="en-US" dirty="0"/>
           </a:p>
           <a:p>
@@ -15492,6 +15521,23 @@
 </file>
 
 <file path=customXml/item1.xml><?xml version="1.0" encoding="utf-8"?>
+<p:properties xmlns:p="http://schemas.microsoft.com/office/2006/metadata/properties" xmlns:xsi="http://www.w3.org/2001/XMLSchema-instance" xmlns:pc="http://schemas.microsoft.com/office/infopath/2007/PartnerControls">
+  <documentManagement>
+    <_activity xmlns="5ab46313-7834-4214-aec9-155b2fe37111" xsi:nil="true"/>
+  </documentManagement>
+</p:properties>
+</file>
+
+<file path=customXml/item2.xml><?xml version="1.0" encoding="utf-8"?>
+<?mso-contentType ?>
+<FormTemplates xmlns="http://schemas.microsoft.com/sharepoint/v3/contenttype/forms">
+  <Display>DocumentLibraryForm</Display>
+  <Edit>DocumentLibraryForm</Edit>
+  <New>DocumentLibraryForm</New>
+</FormTemplates>
+</file>
+
+<file path=customXml/item3.xml><?xml version="1.0" encoding="utf-8"?>
 <ct:contentTypeSchema xmlns:ct="http://schemas.microsoft.com/office/2006/metadata/contentType" xmlns:ma="http://schemas.microsoft.com/office/2006/metadata/properties/metaAttributes" ct:_="" ma:_="" ma:contentTypeName="Document" ma:contentTypeID="0x0101008C6D81289CCC004F972E63C671B7D298" ma:contentTypeVersion="16" ma:contentTypeDescription="Create a new document." ma:contentTypeScope="" ma:versionID="c2c3315a8cb087b7f4137d6d13727adf">
   <xsd:schema xmlns:xsd="http://www.w3.org/2001/XMLSchema" xmlns:xs="http://www.w3.org/2001/XMLSchema" xmlns:p="http://schemas.microsoft.com/office/2006/metadata/properties" xmlns:ns3="5ab46313-7834-4214-aec9-155b2fe37111" xmlns:ns4="2d1aa6b7-1a0a-46e3-8f70-b6d3e32cbd9a" targetNamespace="http://schemas.microsoft.com/office/2006/metadata/properties" ma:root="true" ma:fieldsID="26aa1baf6954272560c91e9e12c661a6" ns3:_="" ns4:_="">
     <xsd:import namespace="5ab46313-7834-4214-aec9-155b2fe37111"/>
@@ -15730,24 +15776,32 @@
 </ct:contentTypeSchema>
 </file>
 
-<file path=customXml/item2.xml><?xml version="1.0" encoding="utf-8"?>
-<?mso-contentType ?>
-<FormTemplates xmlns="http://schemas.microsoft.com/sharepoint/v3/contenttype/forms">
-  <Display>DocumentLibraryForm</Display>
-  <Edit>DocumentLibraryForm</Edit>
-  <New>DocumentLibraryForm</New>
-</FormTemplates>
+<file path=customXml/itemProps1.xml><?xml version="1.0" encoding="utf-8"?>
+<ds:datastoreItem xmlns:ds="http://schemas.openxmlformats.org/officeDocument/2006/customXml" ds:itemID="{49168DCE-134F-4610-A6AA-88CEBE8D71D2}">
+  <ds:schemaRefs>
+    <ds:schemaRef ds:uri="http://schemas.microsoft.com/office/infopath/2007/PartnerControls"/>
+    <ds:schemaRef ds:uri="http://schemas.microsoft.com/office/2006/metadata/properties"/>
+    <ds:schemaRef ds:uri="http://purl.org/dc/elements/1.1/"/>
+    <ds:schemaRef ds:uri="http://purl.org/dc/dcmitype/"/>
+    <ds:schemaRef ds:uri="http://schemas.openxmlformats.org/package/2006/metadata/core-properties"/>
+    <ds:schemaRef ds:uri="http://www.w3.org/XML/1998/namespace"/>
+    <ds:schemaRef ds:uri="http://schemas.microsoft.com/office/2006/documentManagement/types"/>
+    <ds:schemaRef ds:uri="http://purl.org/dc/terms/"/>
+    <ds:schemaRef ds:uri="5ab46313-7834-4214-aec9-155b2fe37111"/>
+    <ds:schemaRef ds:uri="2d1aa6b7-1a0a-46e3-8f70-b6d3e32cbd9a"/>
+  </ds:schemaRefs>
+</ds:datastoreItem>
 </file>
 
-<file path=customXml/item3.xml><?xml version="1.0" encoding="utf-8"?>
-<p:properties xmlns:p="http://schemas.microsoft.com/office/2006/metadata/properties" xmlns:xsi="http://www.w3.org/2001/XMLSchema-instance" xmlns:pc="http://schemas.microsoft.com/office/infopath/2007/PartnerControls">
-  <documentManagement>
-    <_activity xmlns="5ab46313-7834-4214-aec9-155b2fe37111" xsi:nil="true"/>
-  </documentManagement>
-</p:properties>
+<file path=customXml/itemProps2.xml><?xml version="1.0" encoding="utf-8"?>
+<ds:datastoreItem xmlns:ds="http://schemas.openxmlformats.org/officeDocument/2006/customXml" ds:itemID="{CABF691C-888B-4061-8A6F-D5CE84A0254B}">
+  <ds:schemaRefs>
+    <ds:schemaRef ds:uri="http://schemas.microsoft.com/sharepoint/v3/contenttype/forms"/>
+  </ds:schemaRefs>
+</ds:datastoreItem>
 </file>
 
-<file path=customXml/itemProps1.xml><?xml version="1.0" encoding="utf-8"?>
+<file path=customXml/itemProps3.xml><?xml version="1.0" encoding="utf-8"?>
 <ds:datastoreItem xmlns:ds="http://schemas.openxmlformats.org/officeDocument/2006/customXml" ds:itemID="{7DFF6294-0604-41C8-8ED0-04BB72B8FEC1}">
   <ds:schemaRefs>
     <ds:schemaRef ds:uri="http://schemas.microsoft.com/office/2006/metadata/contentType"/>
@@ -15766,31 +15820,6 @@
 </ds:datastoreItem>
 </file>
 
-<file path=customXml/itemProps2.xml><?xml version="1.0" encoding="utf-8"?>
-<ds:datastoreItem xmlns:ds="http://schemas.openxmlformats.org/officeDocument/2006/customXml" ds:itemID="{CABF691C-888B-4061-8A6F-D5CE84A0254B}">
-  <ds:schemaRefs>
-    <ds:schemaRef ds:uri="http://schemas.microsoft.com/sharepoint/v3/contenttype/forms"/>
-  </ds:schemaRefs>
-</ds:datastoreItem>
-</file>
-
-<file path=customXml/itemProps3.xml><?xml version="1.0" encoding="utf-8"?>
-<ds:datastoreItem xmlns:ds="http://schemas.openxmlformats.org/officeDocument/2006/customXml" ds:itemID="{49168DCE-134F-4610-A6AA-88CEBE8D71D2}">
-  <ds:schemaRefs>
-    <ds:schemaRef ds:uri="http://schemas.microsoft.com/office/infopath/2007/PartnerControls"/>
-    <ds:schemaRef ds:uri="http://schemas.microsoft.com/office/2006/metadata/properties"/>
-    <ds:schemaRef ds:uri="http://purl.org/dc/elements/1.1/"/>
-    <ds:schemaRef ds:uri="http://purl.org/dc/dcmitype/"/>
-    <ds:schemaRef ds:uri="http://schemas.openxmlformats.org/package/2006/metadata/core-properties"/>
-    <ds:schemaRef ds:uri="http://www.w3.org/XML/1998/namespace"/>
-    <ds:schemaRef ds:uri="http://schemas.microsoft.com/office/2006/documentManagement/types"/>
-    <ds:schemaRef ds:uri="http://purl.org/dc/terms/"/>
-    <ds:schemaRef ds:uri="5ab46313-7834-4214-aec9-155b2fe37111"/>
-    <ds:schemaRef ds:uri="2d1aa6b7-1a0a-46e3-8f70-b6d3e32cbd9a"/>
-  </ds:schemaRefs>
-</ds:datastoreItem>
-</file>
-
 <file path=docMetadata/LabelInfo.xml><?xml version="1.0" encoding="utf-8"?>
 <clbl:labelList xmlns:clbl="http://schemas.microsoft.com/office/2020/mipLabelMetadata"/>
 </file>
</xml_diff>

<commit_message>
physics context slides added
</commit_message>
<xml_diff>
--- a/Fourier Neural Operators.pptx
+++ b/Fourier Neural Operators.pptx
@@ -5,10 +5,10 @@
     <p:sldMasterId id="2147483648" r:id="rId4"/>
   </p:sldMasterIdLst>
   <p:notesMasterIdLst>
-    <p:notesMasterId r:id="rId20"/>
+    <p:notesMasterId r:id="rId21"/>
   </p:notesMasterIdLst>
   <p:handoutMasterIdLst>
-    <p:handoutMasterId r:id="rId21"/>
+    <p:handoutMasterId r:id="rId22"/>
   </p:handoutMasterIdLst>
   <p:sldIdLst>
     <p:sldId id="256" r:id="rId5"/>
@@ -18,14 +18,15 @@
     <p:sldId id="296" r:id="rId9"/>
     <p:sldId id="286" r:id="rId10"/>
     <p:sldId id="282" r:id="rId11"/>
-    <p:sldId id="287" r:id="rId12"/>
-    <p:sldId id="289" r:id="rId13"/>
-    <p:sldId id="290" r:id="rId14"/>
-    <p:sldId id="291" r:id="rId15"/>
-    <p:sldId id="292" r:id="rId16"/>
-    <p:sldId id="293" r:id="rId17"/>
-    <p:sldId id="294" r:id="rId18"/>
-    <p:sldId id="271" r:id="rId19"/>
+    <p:sldId id="297" r:id="rId12"/>
+    <p:sldId id="287" r:id="rId13"/>
+    <p:sldId id="289" r:id="rId14"/>
+    <p:sldId id="290" r:id="rId15"/>
+    <p:sldId id="291" r:id="rId16"/>
+    <p:sldId id="292" r:id="rId17"/>
+    <p:sldId id="293" r:id="rId18"/>
+    <p:sldId id="294" r:id="rId19"/>
+    <p:sldId id="271" r:id="rId20"/>
   </p:sldIdLst>
   <p:sldSz cx="12192000" cy="6858000"/>
   <p:notesSz cx="6858000" cy="9144000"/>
@@ -3030,7 +3031,7 @@
           <a:p>
             <a:fld id="{B56F32FC-4BD9-442A-A8C6-51598C909FE3}" type="datetimeFigureOut">
               <a:rPr lang="en-US" smtClean="0"/>
-              <a:t>2/3/2025</a:t>
+              <a:t>2/4/2025</a:t>
             </a:fld>
             <a:endParaRPr lang="en-US" dirty="0"/>
           </a:p>
@@ -3207,7 +3208,7 @@
           <a:p>
             <a:fld id="{056371FA-A98D-41E8-93F4-09945841298A}" type="datetimeFigureOut">
               <a:rPr lang="en-US" smtClean="0"/>
-              <a:t>2/3/2025</a:t>
+              <a:t>2/4/2025</a:t>
             </a:fld>
             <a:endParaRPr lang="en-US" dirty="0"/>
           </a:p>
@@ -3632,7 +3633,7 @@
     </p:spTree>
     <p:extLst>
       <p:ext uri="{BB962C8B-B14F-4D97-AF65-F5344CB8AC3E}">
-        <p14:creationId xmlns:p14="http://schemas.microsoft.com/office/powerpoint/2010/main" val="552981084"/>
+        <p14:creationId xmlns:p14="http://schemas.microsoft.com/office/powerpoint/2010/main" val="413884245"/>
       </p:ext>
     </p:extLst>
   </p:cSld>
@@ -3716,7 +3717,7 @@
     </p:spTree>
     <p:extLst>
       <p:ext uri="{BB962C8B-B14F-4D97-AF65-F5344CB8AC3E}">
-        <p14:creationId xmlns:p14="http://schemas.microsoft.com/office/powerpoint/2010/main" val="1393862505"/>
+        <p14:creationId xmlns:p14="http://schemas.microsoft.com/office/powerpoint/2010/main" val="552981084"/>
       </p:ext>
     </p:extLst>
   </p:cSld>
@@ -3800,7 +3801,7 @@
     </p:spTree>
     <p:extLst>
       <p:ext uri="{BB962C8B-B14F-4D97-AF65-F5344CB8AC3E}">
-        <p14:creationId xmlns:p14="http://schemas.microsoft.com/office/powerpoint/2010/main" val="425801007"/>
+        <p14:creationId xmlns:p14="http://schemas.microsoft.com/office/powerpoint/2010/main" val="1393862505"/>
       </p:ext>
     </p:extLst>
   </p:cSld>
@@ -3884,7 +3885,7 @@
     </p:spTree>
     <p:extLst>
       <p:ext uri="{BB962C8B-B14F-4D97-AF65-F5344CB8AC3E}">
-        <p14:creationId xmlns:p14="http://schemas.microsoft.com/office/powerpoint/2010/main" val="3475769782"/>
+        <p14:creationId xmlns:p14="http://schemas.microsoft.com/office/powerpoint/2010/main" val="425801007"/>
       </p:ext>
     </p:extLst>
   </p:cSld>
@@ -3968,7 +3969,7 @@
     </p:spTree>
     <p:extLst>
       <p:ext uri="{BB962C8B-B14F-4D97-AF65-F5344CB8AC3E}">
-        <p14:creationId xmlns:p14="http://schemas.microsoft.com/office/powerpoint/2010/main" val="740346189"/>
+        <p14:creationId xmlns:p14="http://schemas.microsoft.com/office/powerpoint/2010/main" val="3475769782"/>
       </p:ext>
     </p:extLst>
   </p:cSld>
@@ -4044,6 +4045,90 @@
             <a:fld id="{22289C57-55D7-40A4-A101-E74FAC7A092B}" type="slidenum">
               <a:rPr lang="en-US" smtClean="0"/>
               <a:t>15</a:t>
+            </a:fld>
+            <a:endParaRPr lang="en-US" dirty="0"/>
+          </a:p>
+        </p:txBody>
+      </p:sp>
+    </p:spTree>
+    <p:extLst>
+      <p:ext uri="{BB962C8B-B14F-4D97-AF65-F5344CB8AC3E}">
+        <p14:creationId xmlns:p14="http://schemas.microsoft.com/office/powerpoint/2010/main" val="740346189"/>
+      </p:ext>
+    </p:extLst>
+  </p:cSld>
+  <p:clrMapOvr>
+    <a:masterClrMapping/>
+  </p:clrMapOvr>
+</p:notes>
+</file>
+
+<file path=ppt/notesSlides/notesSlide16.xml><?xml version="1.0" encoding="utf-8"?>
+<p:notes xmlns:a="http://schemas.openxmlformats.org/drawingml/2006/main" xmlns:r="http://schemas.openxmlformats.org/officeDocument/2006/relationships" xmlns:p="http://schemas.openxmlformats.org/presentationml/2006/main">
+  <p:cSld>
+    <p:spTree>
+      <p:nvGrpSpPr>
+        <p:cNvPr id="1" name=""/>
+        <p:cNvGrpSpPr/>
+        <p:nvPr/>
+      </p:nvGrpSpPr>
+      <p:grpSpPr>
+        <a:xfrm>
+          <a:off x="0" y="0"/>
+          <a:ext cx="0" cy="0"/>
+          <a:chOff x="0" y="0"/>
+          <a:chExt cx="0" cy="0"/>
+        </a:xfrm>
+      </p:grpSpPr>
+      <p:sp>
+        <p:nvSpPr>
+          <p:cNvPr id="2" name="Slide Image Placeholder 1"/>
+          <p:cNvSpPr>
+            <a:spLocks noGrp="1" noRot="1" noChangeAspect="1"/>
+          </p:cNvSpPr>
+          <p:nvPr>
+            <p:ph type="sldImg"/>
+          </p:nvPr>
+        </p:nvSpPr>
+        <p:spPr/>
+      </p:sp>
+      <p:sp>
+        <p:nvSpPr>
+          <p:cNvPr id="3" name="Notes Placeholder 2"/>
+          <p:cNvSpPr>
+            <a:spLocks noGrp="1"/>
+          </p:cNvSpPr>
+          <p:nvPr>
+            <p:ph type="body" idx="1"/>
+          </p:nvPr>
+        </p:nvSpPr>
+        <p:spPr/>
+        <p:txBody>
+          <a:bodyPr/>
+          <a:lstStyle/>
+          <a:p>
+            <a:endParaRPr lang="en-US" dirty="0"/>
+          </a:p>
+        </p:txBody>
+      </p:sp>
+      <p:sp>
+        <p:nvSpPr>
+          <p:cNvPr id="4" name="Slide Number Placeholder 3"/>
+          <p:cNvSpPr>
+            <a:spLocks noGrp="1"/>
+          </p:cNvSpPr>
+          <p:nvPr>
+            <p:ph type="sldNum" sz="quarter" idx="5"/>
+          </p:nvPr>
+        </p:nvSpPr>
+        <p:spPr/>
+        <p:txBody>
+          <a:bodyPr/>
+          <a:lstStyle/>
+          <a:p>
+            <a:fld id="{22289C57-55D7-40A4-A101-E74FAC7A092B}" type="slidenum">
+              <a:rPr lang="en-US" smtClean="0"/>
+              <a:t>16</a:t>
             </a:fld>
             <a:endParaRPr lang="en-US" dirty="0"/>
           </a:p>
@@ -4619,7 +4704,13 @@
   <p:cSld>
     <p:spTree>
       <p:nvGrpSpPr>
-        <p:cNvPr id="1" name=""/>
+        <p:cNvPr id="1" name="">
+          <a:extLst>
+            <a:ext uri="{FF2B5EF4-FFF2-40B4-BE49-F238E27FC236}">
+              <a16:creationId xmlns:a16="http://schemas.microsoft.com/office/drawing/2014/main" id="{70097EA9-19A7-CC0C-3A7B-6A0389143844}"/>
+            </a:ext>
+          </a:extLst>
+        </p:cNvPr>
         <p:cNvGrpSpPr/>
         <p:nvPr/>
       </p:nvGrpSpPr>
@@ -4633,7 +4724,13 @@
       </p:grpSpPr>
       <p:sp>
         <p:nvSpPr>
-          <p:cNvPr id="2" name="Slide Image Placeholder 1"/>
+          <p:cNvPr id="2" name="Slide Image Placeholder 1">
+            <a:extLst>
+              <a:ext uri="{FF2B5EF4-FFF2-40B4-BE49-F238E27FC236}">
+                <a16:creationId xmlns:a16="http://schemas.microsoft.com/office/drawing/2014/main" id="{5049D504-1EAD-56F0-1DAF-5EA629A58EF9}"/>
+              </a:ext>
+            </a:extLst>
+          </p:cNvPr>
           <p:cNvSpPr>
             <a:spLocks noGrp="1" noRot="1" noChangeAspect="1"/>
           </p:cNvSpPr>
@@ -4645,7 +4742,13 @@
       </p:sp>
       <p:sp>
         <p:nvSpPr>
-          <p:cNvPr id="3" name="Notes Placeholder 2"/>
+          <p:cNvPr id="3" name="Notes Placeholder 2">
+            <a:extLst>
+              <a:ext uri="{FF2B5EF4-FFF2-40B4-BE49-F238E27FC236}">
+                <a16:creationId xmlns:a16="http://schemas.microsoft.com/office/drawing/2014/main" id="{BCB69705-B548-E3E0-7B5E-C88400D8507D}"/>
+              </a:ext>
+            </a:extLst>
+          </p:cNvPr>
           <p:cNvSpPr>
             <a:spLocks noGrp="1"/>
           </p:cNvSpPr>
@@ -4664,7 +4767,13 @@
       </p:sp>
       <p:sp>
         <p:nvSpPr>
-          <p:cNvPr id="4" name="Slide Number Placeholder 3"/>
+          <p:cNvPr id="4" name="Slide Number Placeholder 3">
+            <a:extLst>
+              <a:ext uri="{FF2B5EF4-FFF2-40B4-BE49-F238E27FC236}">
+                <a16:creationId xmlns:a16="http://schemas.microsoft.com/office/drawing/2014/main" id="{0866A473-5218-36EB-D4BE-10B9DCB937EA}"/>
+              </a:ext>
+            </a:extLst>
+          </p:cNvPr>
           <p:cNvSpPr>
             <a:spLocks noGrp="1"/>
           </p:cNvSpPr>
@@ -4688,7 +4797,7 @@
     </p:spTree>
     <p:extLst>
       <p:ext uri="{BB962C8B-B14F-4D97-AF65-F5344CB8AC3E}">
-        <p14:creationId xmlns:p14="http://schemas.microsoft.com/office/powerpoint/2010/main" val="3327029406"/>
+        <p14:creationId xmlns:p14="http://schemas.microsoft.com/office/powerpoint/2010/main" val="2235761985"/>
       </p:ext>
     </p:extLst>
   </p:cSld>
@@ -4772,7 +4881,7 @@
     </p:spTree>
     <p:extLst>
       <p:ext uri="{BB962C8B-B14F-4D97-AF65-F5344CB8AC3E}">
-        <p14:creationId xmlns:p14="http://schemas.microsoft.com/office/powerpoint/2010/main" val="413884245"/>
+        <p14:creationId xmlns:p14="http://schemas.microsoft.com/office/powerpoint/2010/main" val="3327029406"/>
       </p:ext>
     </p:extLst>
   </p:cSld>
@@ -10197,6 +10306,236 @@
 </file>
 
 <file path=ppt/slides/slide10.xml><?xml version="1.0" encoding="utf-8"?>
+<p:sld xmlns:a="http://schemas.openxmlformats.org/drawingml/2006/main" xmlns:r="http://schemas.openxmlformats.org/officeDocument/2006/relationships" xmlns:p="http://schemas.openxmlformats.org/presentationml/2006/main" show="0">
+  <p:cSld>
+    <p:spTree>
+      <p:nvGrpSpPr>
+        <p:cNvPr id="1" name=""/>
+        <p:cNvGrpSpPr/>
+        <p:nvPr/>
+      </p:nvGrpSpPr>
+      <p:grpSpPr>
+        <a:xfrm>
+          <a:off x="0" y="0"/>
+          <a:ext cx="0" cy="0"/>
+          <a:chOff x="0" y="0"/>
+          <a:chExt cx="0" cy="0"/>
+        </a:xfrm>
+      </p:grpSpPr>
+      <p:sp>
+        <p:nvSpPr>
+          <p:cNvPr id="2" name="Title 1">
+            <a:extLst>
+              <a:ext uri="{FF2B5EF4-FFF2-40B4-BE49-F238E27FC236}">
+                <a16:creationId xmlns:a16="http://schemas.microsoft.com/office/drawing/2014/main" id="{8B27D9B3-B64F-656A-0D99-161A6C0F518F}"/>
+              </a:ext>
+            </a:extLst>
+          </p:cNvPr>
+          <p:cNvSpPr>
+            <a:spLocks noGrp="1"/>
+          </p:cNvSpPr>
+          <p:nvPr>
+            <p:ph type="title"/>
+          </p:nvPr>
+        </p:nvSpPr>
+        <p:spPr>
+          <a:xfrm>
+            <a:off x="1341120" y="558801"/>
+            <a:ext cx="9953308" cy="580682"/>
+          </a:xfrm>
+        </p:spPr>
+        <p:txBody>
+          <a:bodyPr/>
+          <a:lstStyle/>
+          <a:p>
+            <a:r>
+              <a:rPr lang="en-US" dirty="0"/>
+              <a:t>Troubleshooting</a:t>
+            </a:r>
+          </a:p>
+        </p:txBody>
+      </p:sp>
+      <p:sp>
+        <p:nvSpPr>
+          <p:cNvPr id="68" name="Slide Number Placeholder 67">
+            <a:extLst>
+              <a:ext uri="{FF2B5EF4-FFF2-40B4-BE49-F238E27FC236}">
+                <a16:creationId xmlns:a16="http://schemas.microsoft.com/office/drawing/2014/main" id="{AA0ACADD-CC4E-851C-DA07-C22DB97FA23E}"/>
+              </a:ext>
+            </a:extLst>
+          </p:cNvPr>
+          <p:cNvSpPr>
+            <a:spLocks noGrp="1"/>
+          </p:cNvSpPr>
+          <p:nvPr>
+            <p:ph type="sldNum" sz="quarter" idx="13"/>
+          </p:nvPr>
+        </p:nvSpPr>
+        <p:spPr>
+          <a:xfrm>
+            <a:off x="10373350" y="6356349"/>
+            <a:ext cx="987552" cy="365125"/>
+          </a:xfrm>
+        </p:spPr>
+        <p:txBody>
+          <a:bodyPr/>
+          <a:lstStyle/>
+          <a:p>
+            <a:fld id="{A49DFD55-3C28-40EF-9E31-A92D2E4017FF}" type="slidenum">
+              <a:rPr lang="en-US" smtClean="0"/>
+              <a:pPr/>
+              <a:t>10</a:t>
+            </a:fld>
+            <a:endParaRPr lang="en-US" dirty="0"/>
+          </a:p>
+        </p:txBody>
+      </p:sp>
+      <p:sp>
+        <p:nvSpPr>
+          <p:cNvPr id="4" name="Content Placeholder 3">
+            <a:extLst>
+              <a:ext uri="{FF2B5EF4-FFF2-40B4-BE49-F238E27FC236}">
+                <a16:creationId xmlns:a16="http://schemas.microsoft.com/office/drawing/2014/main" id="{AB1F8A9E-54FC-8CCB-7C5C-8B9D1002ADA2}"/>
+              </a:ext>
+            </a:extLst>
+          </p:cNvPr>
+          <p:cNvSpPr>
+            <a:spLocks noGrp="1"/>
+          </p:cNvSpPr>
+          <p:nvPr>
+            <p:ph sz="half" idx="14"/>
+          </p:nvPr>
+        </p:nvSpPr>
+        <p:spPr>
+          <a:xfrm>
+            <a:off x="1341120" y="1139483"/>
+            <a:ext cx="8920481" cy="5216865"/>
+          </a:xfrm>
+        </p:spPr>
+        <p:txBody>
+          <a:bodyPr/>
+          <a:lstStyle/>
+          <a:p>
+            <a:pPr marL="285750" indent="-285750">
+              <a:buFont typeface="Arial" panose="020B0604020202020204" pitchFamily="34" charset="0"/>
+              <a:buChar char="•"/>
+            </a:pPr>
+            <a:r>
+              <a:rPr lang="en-US" dirty="0"/>
+              <a:t>Currently using </a:t>
+            </a:r>
+            <a:r>
+              <a:rPr lang="en-US" dirty="0" err="1"/>
+              <a:t>Neuralop</a:t>
+            </a:r>
+            <a:r>
+              <a:rPr lang="en-US" dirty="0"/>
+              <a:t> package to build &amp; train FNO neural operator. </a:t>
+            </a:r>
+          </a:p>
+          <a:p>
+            <a:pPr marL="569214" lvl="1"/>
+            <a:r>
+              <a:rPr lang="en-US" dirty="0"/>
+              <a:t>Inputs: geometry; Outputs: eigenvector x component; Fixed: wavevector</a:t>
+            </a:r>
+          </a:p>
+          <a:p>
+            <a:pPr marL="285750" indent="-285750">
+              <a:buFont typeface="Arial" panose="020B0604020202020204" pitchFamily="34" charset="0"/>
+              <a:buChar char="•"/>
+            </a:pPr>
+            <a:r>
+              <a:rPr lang="en-US" dirty="0"/>
+              <a:t>Suspect the neural network is not properly transforming the input space.</a:t>
+            </a:r>
+          </a:p>
+          <a:p>
+            <a:pPr marL="285750" indent="-285750">
+              <a:buFont typeface="Arial" panose="020B0604020202020204" pitchFamily="34" charset="0"/>
+              <a:buChar char="•"/>
+            </a:pPr>
+            <a:r>
+              <a:rPr lang="en-US" dirty="0"/>
+              <a:t>Suspect there are other inputs necessary for network to learn, like wavevector.</a:t>
+            </a:r>
+          </a:p>
+          <a:p>
+            <a:pPr marL="285750" indent="-285750">
+              <a:buFont typeface="Arial" panose="020B0604020202020204" pitchFamily="34" charset="0"/>
+              <a:buChar char="•"/>
+            </a:pPr>
+            <a:r>
+              <a:rPr lang="en-US" dirty="0"/>
+              <a:t>Suspect it may be easier to learn eigenvector magnitude over one component</a:t>
+            </a:r>
+          </a:p>
+          <a:p>
+            <a:pPr marL="285750" indent="-285750">
+              <a:buFont typeface="Arial" panose="020B0604020202020204" pitchFamily="34" charset="0"/>
+              <a:buChar char="•"/>
+            </a:pPr>
+            <a:r>
+              <a:rPr lang="en-US" dirty="0"/>
+              <a:t>Train/test on one sample to see if model can learn just one representation.</a:t>
+            </a:r>
+          </a:p>
+          <a:p>
+            <a:pPr marL="285750" indent="-285750">
+              <a:buFont typeface="Arial" panose="020B0604020202020204" pitchFamily="34" charset="0"/>
+              <a:buChar char="•"/>
+            </a:pPr>
+            <a:r>
+              <a:rPr lang="en-US" dirty="0"/>
+              <a:t>Swap to eigenvector magnitude to see if it can learn that. Then try x &amp; y.</a:t>
+            </a:r>
+          </a:p>
+        </p:txBody>
+      </p:sp>
+      <p:pic>
+        <p:nvPicPr>
+          <p:cNvPr id="5" name="Picture 4" descr="A blue and green squares&#10;&#10;Description automatically generated">
+            <a:extLst>
+              <a:ext uri="{FF2B5EF4-FFF2-40B4-BE49-F238E27FC236}">
+                <a16:creationId xmlns:a16="http://schemas.microsoft.com/office/drawing/2014/main" id="{931E91D2-10F6-706B-F055-E2ED87EABE1E}"/>
+              </a:ext>
+            </a:extLst>
+          </p:cNvPr>
+          <p:cNvPicPr>
+            <a:picLocks noChangeAspect="1"/>
+          </p:cNvPicPr>
+          <p:nvPr/>
+        </p:nvPicPr>
+        <p:blipFill>
+          <a:blip r:embed="rId3"/>
+          <a:stretch>
+            <a:fillRect/>
+          </a:stretch>
+        </p:blipFill>
+        <p:spPr>
+          <a:xfrm>
+            <a:off x="1341120" y="3838543"/>
+            <a:ext cx="8920481" cy="2882931"/>
+          </a:xfrm>
+          <a:prstGeom prst="rect">
+            <a:avLst/>
+          </a:prstGeom>
+        </p:spPr>
+      </p:pic>
+    </p:spTree>
+    <p:extLst>
+      <p:ext uri="{BB962C8B-B14F-4D97-AF65-F5344CB8AC3E}">
+        <p14:creationId xmlns:p14="http://schemas.microsoft.com/office/powerpoint/2010/main" val="2594934582"/>
+      </p:ext>
+    </p:extLst>
+  </p:cSld>
+  <p:clrMapOvr>
+    <a:masterClrMapping/>
+  </p:clrMapOvr>
+</p:sld>
+</file>
+
+<file path=ppt/slides/slide11.xml><?xml version="1.0" encoding="utf-8"?>
 <p:sld xmlns:a="http://schemas.openxmlformats.org/drawingml/2006/main" xmlns:r="http://schemas.openxmlformats.org/officeDocument/2006/relationships" xmlns:p="http://schemas.openxmlformats.org/presentationml/2006/main">
   <p:cSld>
     <p:spTree>
@@ -10275,7 +10614,7 @@
             <a:fld id="{A49DFD55-3C28-40EF-9E31-A92D2E4017FF}" type="slidenum">
               <a:rPr lang="en-US" smtClean="0"/>
               <a:pPr/>
-              <a:t>10</a:t>
+              <a:t>11</a:t>
             </a:fld>
             <a:endParaRPr lang="en-US" dirty="0"/>
           </a:p>
@@ -10476,7 +10815,7 @@
 </p:sld>
 </file>
 
-<file path=ppt/slides/slide11.xml><?xml version="1.0" encoding="utf-8"?>
+<file path=ppt/slides/slide12.xml><?xml version="1.0" encoding="utf-8"?>
 <p:sld xmlns:a="http://schemas.openxmlformats.org/drawingml/2006/main" xmlns:r="http://schemas.openxmlformats.org/officeDocument/2006/relationships" xmlns:p="http://schemas.openxmlformats.org/presentationml/2006/main">
   <p:cSld>
     <p:spTree>
@@ -10555,7 +10894,7 @@
             <a:fld id="{A49DFD55-3C28-40EF-9E31-A92D2E4017FF}" type="slidenum">
               <a:rPr lang="en-US" smtClean="0"/>
               <a:pPr/>
-              <a:t>11</a:t>
+              <a:t>12</a:t>
             </a:fld>
             <a:endParaRPr lang="en-US" dirty="0"/>
           </a:p>
@@ -10742,7 +11081,7 @@
 </p:sld>
 </file>
 
-<file path=ppt/slides/slide12.xml><?xml version="1.0" encoding="utf-8"?>
+<file path=ppt/slides/slide13.xml><?xml version="1.0" encoding="utf-8"?>
 <p:sld xmlns:a="http://schemas.openxmlformats.org/drawingml/2006/main" xmlns:r="http://schemas.openxmlformats.org/officeDocument/2006/relationships" xmlns:p="http://schemas.openxmlformats.org/presentationml/2006/main">
   <p:cSld>
     <p:spTree>
@@ -10821,7 +11160,7 @@
             <a:fld id="{A49DFD55-3C28-40EF-9E31-A92D2E4017FF}" type="slidenum">
               <a:rPr lang="en-US" smtClean="0"/>
               <a:pPr/>
-              <a:t>12</a:t>
+              <a:t>13</a:t>
             </a:fld>
             <a:endParaRPr lang="en-US" dirty="0"/>
           </a:p>
@@ -11354,7 +11693,7 @@
 </p:sld>
 </file>
 
-<file path=ppt/slides/slide13.xml><?xml version="1.0" encoding="utf-8"?>
+<file path=ppt/slides/slide14.xml><?xml version="1.0" encoding="utf-8"?>
 <p:sld xmlns:a="http://schemas.openxmlformats.org/drawingml/2006/main" xmlns:r="http://schemas.openxmlformats.org/officeDocument/2006/relationships" xmlns:p="http://schemas.openxmlformats.org/presentationml/2006/main">
   <p:cSld>
     <p:spTree>
@@ -11433,7 +11772,7 @@
             <a:fld id="{A49DFD55-3C28-40EF-9E31-A92D2E4017FF}" type="slidenum">
               <a:rPr lang="en-US" smtClean="0"/>
               <a:pPr/>
-              <a:t>13</a:t>
+              <a:t>14</a:t>
             </a:fld>
             <a:endParaRPr lang="en-US" dirty="0"/>
           </a:p>
@@ -11615,7 +11954,7 @@
 </p:sld>
 </file>
 
-<file path=ppt/slides/slide14.xml><?xml version="1.0" encoding="utf-8"?>
+<file path=ppt/slides/slide15.xml><?xml version="1.0" encoding="utf-8"?>
 <p:sld xmlns:a="http://schemas.openxmlformats.org/drawingml/2006/main" xmlns:r="http://schemas.openxmlformats.org/officeDocument/2006/relationships" xmlns:p="http://schemas.openxmlformats.org/presentationml/2006/main">
   <p:cSld>
     <p:spTree>
@@ -11694,7 +12033,7 @@
             <a:fld id="{A49DFD55-3C28-40EF-9E31-A92D2E4017FF}" type="slidenum">
               <a:rPr lang="en-US" smtClean="0"/>
               <a:pPr/>
-              <a:t>14</a:t>
+              <a:t>15</a:t>
             </a:fld>
             <a:endParaRPr lang="en-US" dirty="0"/>
           </a:p>
@@ -11823,7 +12162,7 @@
 </p:sld>
 </file>
 
-<file path=ppt/slides/slide15.xml><?xml version="1.0" encoding="utf-8"?>
+<file path=ppt/slides/slide16.xml><?xml version="1.0" encoding="utf-8"?>
 <p:sld xmlns:a="http://schemas.openxmlformats.org/drawingml/2006/main" xmlns:r="http://schemas.openxmlformats.org/officeDocument/2006/relationships" xmlns:p="http://schemas.openxmlformats.org/presentationml/2006/main">
   <p:cSld>
     <p:spTree>
@@ -11937,7 +12276,7 @@
             <a:fld id="{A49DFD55-3C28-40EF-9E31-A92D2E4017FF}" type="slidenum">
               <a:rPr lang="en-US" smtClean="0"/>
               <a:pPr/>
-              <a:t>15</a:t>
+              <a:t>16</a:t>
             </a:fld>
             <a:endParaRPr lang="en-US" dirty="0"/>
           </a:p>
@@ -12441,8 +12780,8 @@
           </a:p>
         </p:txBody>
       </p:sp>
-      <mc:AlternateContent xmlns:mc="http://schemas.openxmlformats.org/markup-compatibility/2006">
-        <mc:Choice xmlns:a14="http://schemas.microsoft.com/office/drawing/2010/main" Requires="a14">
+      <mc:AlternateContent xmlns:mc="http://schemas.openxmlformats.org/markup-compatibility/2006" xmlns:a14="http://schemas.microsoft.com/office/drawing/2010/main">
+        <mc:Choice Requires="a14">
           <p:sp>
             <p:nvSpPr>
               <p:cNvPr id="4" name="Content Placeholder 3">
@@ -13533,1553 +13872,7 @@
                 <a:pPr marL="285750" lvl="1"/>
                 <a:r>
                   <a:rPr lang="en-US" dirty="0"/>
-                  <a:t>The wave equation for solids:</a:t>
-                </a:r>
-              </a:p>
-              <a:p>
-                <a14:m>
-                  <m:oMathPara xmlns:m="http://schemas.openxmlformats.org/officeDocument/2006/math">
-                    <m:oMathParaPr>
-                      <m:jc m:val="centerGroup"/>
-                    </m:oMathParaPr>
-                    <m:oMath xmlns:m="http://schemas.openxmlformats.org/officeDocument/2006/math">
-                      <m:r>
-                        <a:rPr lang="en-US" i="1">
-                          <a:latin typeface="Cambria Math" panose="02040503050406030204" pitchFamily="18" charset="0"/>
-                        </a:rPr>
-                        <m:t>𝜌</m:t>
-                      </m:r>
-                      <m:f>
-                        <m:fPr>
-                          <m:ctrlPr>
-                            <a:rPr lang="en-US" i="1">
-                              <a:latin typeface="Cambria Math" panose="02040503050406030204" pitchFamily="18" charset="0"/>
-                            </a:rPr>
-                          </m:ctrlPr>
-                        </m:fPr>
-                        <m:num>
-                          <m:sSup>
-                            <m:sSupPr>
-                              <m:ctrlPr>
-                                <a:rPr lang="en-US" i="1">
-                                  <a:latin typeface="Cambria Math" panose="02040503050406030204" pitchFamily="18" charset="0"/>
-                                </a:rPr>
-                              </m:ctrlPr>
-                            </m:sSupPr>
-                            <m:e>
-                              <m:r>
-                                <a:rPr lang="en-US" i="1">
-                                  <a:latin typeface="Cambria Math" panose="02040503050406030204" pitchFamily="18" charset="0"/>
-                                  <a:ea typeface="Cambria Math" panose="02040503050406030204" pitchFamily="18" charset="0"/>
-                                </a:rPr>
-                                <m:t>𝜕</m:t>
-                              </m:r>
-                            </m:e>
-                            <m:sup>
-                              <m:r>
-                                <a:rPr lang="en-US" i="1">
-                                  <a:latin typeface="Cambria Math" panose="02040503050406030204" pitchFamily="18" charset="0"/>
-                                </a:rPr>
-                                <m:t>2</m:t>
-                              </m:r>
-                            </m:sup>
-                          </m:sSup>
-                          <m:acc>
-                            <m:accPr>
-                              <m:chr m:val="̅"/>
-                              <m:ctrlPr>
-                                <a:rPr lang="en-US" i="1">
-                                  <a:latin typeface="Cambria Math" panose="02040503050406030204" pitchFamily="18" charset="0"/>
-                                </a:rPr>
-                              </m:ctrlPr>
-                            </m:accPr>
-                            <m:e>
-                              <m:r>
-                                <a:rPr lang="en-US" i="1">
-                                  <a:latin typeface="Cambria Math" panose="02040503050406030204" pitchFamily="18" charset="0"/>
-                                </a:rPr>
-                                <m:t>𝑢</m:t>
-                              </m:r>
-                            </m:e>
-                          </m:acc>
-                        </m:num>
-                        <m:den>
-                          <m:r>
-                            <a:rPr lang="en-US" i="1">
-                              <a:latin typeface="Cambria Math" panose="02040503050406030204" pitchFamily="18" charset="0"/>
-                              <a:ea typeface="Cambria Math" panose="02040503050406030204" pitchFamily="18" charset="0"/>
-                            </a:rPr>
-                            <m:t>𝜕</m:t>
-                          </m:r>
-                          <m:sSup>
-                            <m:sSupPr>
-                              <m:ctrlPr>
-                                <a:rPr lang="en-US" i="1">
-                                  <a:latin typeface="Cambria Math" panose="02040503050406030204" pitchFamily="18" charset="0"/>
-                                </a:rPr>
-                              </m:ctrlPr>
-                            </m:sSupPr>
-                            <m:e>
-                              <m:r>
-                                <a:rPr lang="en-US" i="1">
-                                  <a:latin typeface="Cambria Math" panose="02040503050406030204" pitchFamily="18" charset="0"/>
-                                </a:rPr>
-                                <m:t>𝑡</m:t>
-                              </m:r>
-                            </m:e>
-                            <m:sup>
-                              <m:r>
-                                <a:rPr lang="en-US" i="1">
-                                  <a:latin typeface="Cambria Math" panose="02040503050406030204" pitchFamily="18" charset="0"/>
-                                </a:rPr>
-                                <m:t>2</m:t>
-                              </m:r>
-                            </m:sup>
-                          </m:sSup>
-                        </m:den>
-                      </m:f>
-                      <m:r>
-                        <a:rPr lang="en-US" i="1">
-                          <a:latin typeface="Cambria Math" panose="02040503050406030204" pitchFamily="18" charset="0"/>
-                        </a:rPr>
-                        <m:t>=</m:t>
-                      </m:r>
-                      <m:d>
-                        <m:dPr>
-                          <m:ctrlPr>
-                            <a:rPr lang="en-US" b="0" i="1" smtClean="0">
-                              <a:latin typeface="Cambria Math" panose="02040503050406030204" pitchFamily="18" charset="0"/>
-                            </a:rPr>
-                          </m:ctrlPr>
-                        </m:dPr>
-                        <m:e>
-                          <m:r>
-                            <a:rPr lang="en-US" b="0" i="1" smtClean="0">
-                              <a:latin typeface="Cambria Math" panose="02040503050406030204" pitchFamily="18" charset="0"/>
-                            </a:rPr>
-                            <m:t>𝜆</m:t>
-                          </m:r>
-                          <m:r>
-                            <a:rPr lang="en-US" b="0" i="1" smtClean="0">
-                              <a:latin typeface="Cambria Math" panose="02040503050406030204" pitchFamily="18" charset="0"/>
-                            </a:rPr>
-                            <m:t>+</m:t>
-                          </m:r>
-                          <m:r>
-                            <a:rPr lang="en-US" b="0" i="1" smtClean="0">
-                              <a:latin typeface="Cambria Math" panose="02040503050406030204" pitchFamily="18" charset="0"/>
-                            </a:rPr>
-                            <m:t>𝜇</m:t>
-                          </m:r>
-                        </m:e>
-                      </m:d>
-                      <m:r>
-                        <m:rPr>
-                          <m:sty m:val="p"/>
-                        </m:rPr>
-                        <a:rPr lang="en-US" b="0" i="0" smtClean="0">
-                          <a:latin typeface="Cambria Math" panose="02040503050406030204" pitchFamily="18" charset="0"/>
-                        </a:rPr>
-                        <m:t>∇</m:t>
-                      </m:r>
-                      <m:d>
-                        <m:dPr>
-                          <m:ctrlPr>
-                            <a:rPr lang="en-US" b="0" i="0" smtClean="0">
-                              <a:latin typeface="Cambria Math" panose="02040503050406030204" pitchFamily="18" charset="0"/>
-                            </a:rPr>
-                          </m:ctrlPr>
-                        </m:dPr>
-                        <m:e>
-                          <m:r>
-                            <m:rPr>
-                              <m:sty m:val="p"/>
-                            </m:rPr>
-                            <a:rPr lang="en-US" i="1">
-                              <a:latin typeface="Cambria Math" panose="02040503050406030204" pitchFamily="18" charset="0"/>
-                              <a:ea typeface="Cambria Math" panose="02040503050406030204" pitchFamily="18" charset="0"/>
-                            </a:rPr>
-                            <m:t>∇</m:t>
-                          </m:r>
-                          <m:r>
-                            <a:rPr lang="en-US" i="1">
-                              <a:latin typeface="Cambria Math" panose="02040503050406030204" pitchFamily="18" charset="0"/>
-                              <a:ea typeface="Cambria Math" panose="02040503050406030204" pitchFamily="18" charset="0"/>
-                            </a:rPr>
-                            <m:t>⋅</m:t>
-                          </m:r>
-                          <m:acc>
-                            <m:accPr>
-                              <m:chr m:val="̅"/>
-                              <m:ctrlPr>
-                                <a:rPr lang="en-US" i="1">
-                                  <a:latin typeface="Cambria Math" panose="02040503050406030204" pitchFamily="18" charset="0"/>
-                                  <a:ea typeface="Cambria Math" panose="02040503050406030204" pitchFamily="18" charset="0"/>
-                                </a:rPr>
-                              </m:ctrlPr>
-                            </m:accPr>
-                            <m:e>
-                              <m:r>
-                                <a:rPr lang="en-US" b="0" i="1" smtClean="0">
-                                  <a:latin typeface="Cambria Math" panose="02040503050406030204" pitchFamily="18" charset="0"/>
-                                  <a:ea typeface="Cambria Math" panose="02040503050406030204" pitchFamily="18" charset="0"/>
-                                </a:rPr>
-                                <m:t>𝑢</m:t>
-                              </m:r>
-                            </m:e>
-                          </m:acc>
-                        </m:e>
-                      </m:d>
-                      <m:r>
-                        <a:rPr lang="en-US" i="1">
-                          <a:latin typeface="Cambria Math" panose="02040503050406030204" pitchFamily="18" charset="0"/>
-                          <a:ea typeface="Cambria Math" panose="02040503050406030204" pitchFamily="18" charset="0"/>
-                        </a:rPr>
-                        <m:t>+</m:t>
-                      </m:r>
-                      <m:r>
-                        <a:rPr lang="en-US" b="0" i="1" smtClean="0">
-                          <a:latin typeface="Cambria Math" panose="02040503050406030204" pitchFamily="18" charset="0"/>
-                          <a:ea typeface="Cambria Math" panose="02040503050406030204" pitchFamily="18" charset="0"/>
-                        </a:rPr>
-                        <m:t>𝜇</m:t>
-                      </m:r>
-                      <m:sSup>
-                        <m:sSupPr>
-                          <m:ctrlPr>
-                            <a:rPr lang="en-US" b="0" i="1" smtClean="0">
-                              <a:latin typeface="Cambria Math" panose="02040503050406030204" pitchFamily="18" charset="0"/>
-                              <a:ea typeface="Cambria Math" panose="02040503050406030204" pitchFamily="18" charset="0"/>
-                            </a:rPr>
-                          </m:ctrlPr>
-                        </m:sSupPr>
-                        <m:e>
-                          <m:r>
-                            <m:rPr>
-                              <m:sty m:val="p"/>
-                            </m:rPr>
-                            <a:rPr lang="en-US" b="0" i="0" smtClean="0">
-                              <a:latin typeface="Cambria Math" panose="02040503050406030204" pitchFamily="18" charset="0"/>
-                              <a:ea typeface="Cambria Math" panose="02040503050406030204" pitchFamily="18" charset="0"/>
-                            </a:rPr>
-                            <m:t>∇</m:t>
-                          </m:r>
-                        </m:e>
-                        <m:sup>
-                          <m:r>
-                            <a:rPr lang="en-US" b="0" i="1" smtClean="0">
-                              <a:latin typeface="Cambria Math" panose="02040503050406030204" pitchFamily="18" charset="0"/>
-                              <a:ea typeface="Cambria Math" panose="02040503050406030204" pitchFamily="18" charset="0"/>
-                            </a:rPr>
-                            <m:t>2</m:t>
-                          </m:r>
-                        </m:sup>
-                      </m:sSup>
-                      <m:acc>
-                        <m:accPr>
-                          <m:chr m:val="̅"/>
-                          <m:ctrlPr>
-                            <a:rPr lang="en-US" i="1">
-                              <a:latin typeface="Cambria Math" panose="02040503050406030204" pitchFamily="18" charset="0"/>
-                              <a:ea typeface="Cambria Math" panose="02040503050406030204" pitchFamily="18" charset="0"/>
-                            </a:rPr>
-                          </m:ctrlPr>
-                        </m:accPr>
-                        <m:e>
-                          <m:r>
-                            <a:rPr lang="en-US" b="0" i="1" smtClean="0">
-                              <a:latin typeface="Cambria Math" panose="02040503050406030204" pitchFamily="18" charset="0"/>
-                              <a:ea typeface="Cambria Math" panose="02040503050406030204" pitchFamily="18" charset="0"/>
-                            </a:rPr>
-                            <m:t>𝑢</m:t>
-                          </m:r>
-                        </m:e>
-                      </m:acc>
-                      <m:r>
-                        <a:rPr lang="en-US" b="0" i="1" smtClean="0">
-                          <a:latin typeface="Cambria Math" panose="02040503050406030204" pitchFamily="18" charset="0"/>
-                          <a:ea typeface="Cambria Math" panose="02040503050406030204" pitchFamily="18" charset="0"/>
-                        </a:rPr>
-                        <m:t>+</m:t>
-                      </m:r>
-                      <m:acc>
-                        <m:accPr>
-                          <m:chr m:val="̅"/>
-                          <m:ctrlPr>
-                            <a:rPr lang="en-US" b="0" i="1" smtClean="0">
-                              <a:latin typeface="Cambria Math" panose="02040503050406030204" pitchFamily="18" charset="0"/>
-                              <a:ea typeface="Cambria Math" panose="02040503050406030204" pitchFamily="18" charset="0"/>
-                            </a:rPr>
-                          </m:ctrlPr>
-                        </m:accPr>
-                        <m:e>
-                          <m:r>
-                            <a:rPr lang="en-US" b="0" i="1" smtClean="0">
-                              <a:latin typeface="Cambria Math" panose="02040503050406030204" pitchFamily="18" charset="0"/>
-                              <a:ea typeface="Cambria Math" panose="02040503050406030204" pitchFamily="18" charset="0"/>
-                            </a:rPr>
-                            <m:t>𝑓</m:t>
-                          </m:r>
-                        </m:e>
-                      </m:acc>
-                    </m:oMath>
-                  </m:oMathPara>
-                </a14:m>
-                <a:endParaRPr lang="en-US" dirty="0"/>
-              </a:p>
-              <a:p>
-                <a:pPr marL="285750"/>
-                <a:endParaRPr lang="en-US" dirty="0"/>
-              </a:p>
-            </p:txBody>
-          </p:sp>
-        </mc:Choice>
-        <mc:Fallback>
-          <p:sp>
-            <p:nvSpPr>
-              <p:cNvPr id="4" name="Content Placeholder 3">
-                <a:extLst>
-                  <a:ext uri="{FF2B5EF4-FFF2-40B4-BE49-F238E27FC236}">
-                    <a16:creationId xmlns:a16="http://schemas.microsoft.com/office/drawing/2014/main" id="{C9F60626-48B6-5ABF-56DC-461C6D7C5091}"/>
-                  </a:ext>
-                </a:extLst>
-              </p:cNvPr>
-              <p:cNvSpPr>
-                <a:spLocks noGrp="1" noRot="1" noChangeAspect="1" noMove="1" noResize="1" noEditPoints="1" noAdjustHandles="1" noChangeArrowheads="1" noChangeShapeType="1" noTextEdit="1"/>
-              </p:cNvSpPr>
-              <p:nvPr>
-                <p:ph sz="half" idx="14"/>
-              </p:nvPr>
-            </p:nvSpPr>
-            <p:spPr>
-              <a:xfrm>
-                <a:off x="1341120" y="1139483"/>
-                <a:ext cx="8920481" cy="5216865"/>
-              </a:xfrm>
-              <a:blipFill>
-                <a:blip r:embed="rId3"/>
-                <a:stretch>
-                  <a:fillRect l="-410" t="-1519"/>
-                </a:stretch>
-              </a:blipFill>
-            </p:spPr>
-            <p:txBody>
-              <a:bodyPr/>
-              <a:lstStyle/>
-              <a:p>
-                <a:r>
-                  <a:rPr lang="en-US">
-                    <a:noFill/>
-                  </a:rPr>
-                  <a:t> </a:t>
-                </a:r>
-              </a:p>
-            </p:txBody>
-          </p:sp>
-        </mc:Fallback>
-      </mc:AlternateContent>
-    </p:spTree>
-    <p:extLst>
-      <p:ext uri="{BB962C8B-B14F-4D97-AF65-F5344CB8AC3E}">
-        <p14:creationId xmlns:p14="http://schemas.microsoft.com/office/powerpoint/2010/main" val="85280667"/>
-      </p:ext>
-    </p:extLst>
-  </p:cSld>
-  <p:clrMapOvr>
-    <a:masterClrMapping/>
-  </p:clrMapOvr>
-</p:sld>
-</file>
-
-<file path=ppt/slides/slide5.xml><?xml version="1.0" encoding="utf-8"?>
-<p:sld xmlns:a="http://schemas.openxmlformats.org/drawingml/2006/main" xmlns:r="http://schemas.openxmlformats.org/officeDocument/2006/relationships" xmlns:p="http://schemas.openxmlformats.org/presentationml/2006/main">
-  <p:cSld>
-    <p:spTree>
-      <p:nvGrpSpPr>
-        <p:cNvPr id="1" name="">
-          <a:extLst>
-            <a:ext uri="{FF2B5EF4-FFF2-40B4-BE49-F238E27FC236}">
-              <a16:creationId xmlns:a16="http://schemas.microsoft.com/office/drawing/2014/main" id="{64552390-94C5-7C8A-E531-0E96E82EA7C3}"/>
-            </a:ext>
-          </a:extLst>
-        </p:cNvPr>
-        <p:cNvGrpSpPr/>
-        <p:nvPr/>
-      </p:nvGrpSpPr>
-      <p:grpSpPr>
-        <a:xfrm>
-          <a:off x="0" y="0"/>
-          <a:ext cx="0" cy="0"/>
-          <a:chOff x="0" y="0"/>
-          <a:chExt cx="0" cy="0"/>
-        </a:xfrm>
-      </p:grpSpPr>
-      <p:sp>
-        <p:nvSpPr>
-          <p:cNvPr id="2" name="Title 1">
-            <a:extLst>
-              <a:ext uri="{FF2B5EF4-FFF2-40B4-BE49-F238E27FC236}">
-                <a16:creationId xmlns:a16="http://schemas.microsoft.com/office/drawing/2014/main" id="{05023634-3FF5-98EB-9101-63137C059787}"/>
-              </a:ext>
-            </a:extLst>
-          </p:cNvPr>
-          <p:cNvSpPr>
-            <a:spLocks noGrp="1"/>
-          </p:cNvSpPr>
-          <p:nvPr>
-            <p:ph type="title"/>
-          </p:nvPr>
-        </p:nvSpPr>
-        <p:spPr>
-          <a:xfrm>
-            <a:off x="1341120" y="558801"/>
-            <a:ext cx="9953308" cy="580682"/>
-          </a:xfrm>
-        </p:spPr>
-        <p:txBody>
-          <a:bodyPr/>
-          <a:lstStyle/>
-          <a:p>
-            <a:r>
-              <a:rPr lang="en-US" dirty="0"/>
-              <a:t>Boundary Conditions</a:t>
-            </a:r>
-          </a:p>
-        </p:txBody>
-      </p:sp>
-      <p:sp>
-        <p:nvSpPr>
-          <p:cNvPr id="68" name="Slide Number Placeholder 67">
-            <a:extLst>
-              <a:ext uri="{FF2B5EF4-FFF2-40B4-BE49-F238E27FC236}">
-                <a16:creationId xmlns:a16="http://schemas.microsoft.com/office/drawing/2014/main" id="{E018125A-0987-F2A8-9EBE-BBC5A8DB2F4C}"/>
-              </a:ext>
-            </a:extLst>
-          </p:cNvPr>
-          <p:cNvSpPr>
-            <a:spLocks noGrp="1"/>
-          </p:cNvSpPr>
-          <p:nvPr>
-            <p:ph type="sldNum" sz="quarter" idx="13"/>
-          </p:nvPr>
-        </p:nvSpPr>
-        <p:spPr>
-          <a:xfrm>
-            <a:off x="10373350" y="6356349"/>
-            <a:ext cx="987552" cy="365125"/>
-          </a:xfrm>
-        </p:spPr>
-        <p:txBody>
-          <a:bodyPr/>
-          <a:lstStyle/>
-          <a:p>
-            <a:fld id="{A49DFD55-3C28-40EF-9E31-A92D2E4017FF}" type="slidenum">
-              <a:rPr lang="en-US" smtClean="0"/>
-              <a:pPr/>
-              <a:t>5</a:t>
-            </a:fld>
-            <a:endParaRPr lang="en-US" dirty="0"/>
-          </a:p>
-        </p:txBody>
-      </p:sp>
-      <mc:AlternateContent xmlns:mc="http://schemas.openxmlformats.org/markup-compatibility/2006">
-        <mc:Choice xmlns:a14="http://schemas.microsoft.com/office/drawing/2010/main" Requires="a14">
-          <p:sp>
-            <p:nvSpPr>
-              <p:cNvPr id="4" name="Content Placeholder 3">
-                <a:extLst>
-                  <a:ext uri="{FF2B5EF4-FFF2-40B4-BE49-F238E27FC236}">
-                    <a16:creationId xmlns:a16="http://schemas.microsoft.com/office/drawing/2014/main" id="{1573343B-E3B0-E1CB-3BDC-58F1C031904B}"/>
-                  </a:ext>
-                </a:extLst>
-              </p:cNvPr>
-              <p:cNvSpPr>
-                <a:spLocks noGrp="1"/>
-              </p:cNvSpPr>
-              <p:nvPr>
-                <p:ph sz="half" idx="14"/>
-              </p:nvPr>
-            </p:nvSpPr>
-            <p:spPr>
-              <a:xfrm>
-                <a:off x="1341120" y="1139483"/>
-                <a:ext cx="8920481" cy="5216865"/>
-              </a:xfrm>
-            </p:spPr>
-            <p:txBody>
-              <a:bodyPr>
-                <a:normAutofit/>
-              </a:bodyPr>
-              <a:lstStyle/>
-              <a:p>
-                <a:pPr marL="285750" indent="-285750">
-                  <a:buFont typeface="Arial" panose="020B0604020202020204" pitchFamily="34" charset="0"/>
-                  <a:buChar char="•"/>
-                </a:pPr>
-                <a:r>
-                  <a:rPr lang="en-US" dirty="0"/>
-                  <a:t>Simulations </a:t>
-                </a:r>
-                <a:r>
-                  <a:rPr lang="en-US"/>
-                  <a:t>assume metamaterials made of two solids:</a:t>
-                </a:r>
-                <a:endParaRPr lang="en-US" dirty="0"/>
-              </a:p>
-              <a:p>
-                <a:pPr marL="0" indent="0">
-                  <a:buNone/>
-                </a:pPr>
-                <a14:m>
-                  <m:oMathPara xmlns:m="http://schemas.openxmlformats.org/officeDocument/2006/math">
-                    <m:oMathParaPr>
-                      <m:jc m:val="centerGroup"/>
-                    </m:oMathParaPr>
-                    <m:oMath xmlns:m="http://schemas.openxmlformats.org/officeDocument/2006/math">
-                      <m:r>
-                        <a:rPr lang="en-US" b="0" i="1" smtClean="0">
-                          <a:latin typeface="Cambria Math" panose="02040503050406030204" pitchFamily="18" charset="0"/>
-                        </a:rPr>
-                        <m:t>𝜌</m:t>
-                      </m:r>
-                      <m:f>
-                        <m:fPr>
-                          <m:ctrlPr>
-                            <a:rPr lang="en-US" b="0" i="1" smtClean="0">
-                              <a:latin typeface="Cambria Math" panose="02040503050406030204" pitchFamily="18" charset="0"/>
-                            </a:rPr>
-                          </m:ctrlPr>
-                        </m:fPr>
-                        <m:num>
-                          <m:sSup>
-                            <m:sSupPr>
-                              <m:ctrlPr>
-                                <a:rPr lang="en-US" b="0" i="1" smtClean="0">
-                                  <a:latin typeface="Cambria Math" panose="02040503050406030204" pitchFamily="18" charset="0"/>
-                                </a:rPr>
-                              </m:ctrlPr>
-                            </m:sSupPr>
-                            <m:e>
-                              <m:r>
-                                <a:rPr lang="en-US" b="0" i="1" smtClean="0">
-                                  <a:latin typeface="Cambria Math" panose="02040503050406030204" pitchFamily="18" charset="0"/>
-                                  <a:ea typeface="Cambria Math" panose="02040503050406030204" pitchFamily="18" charset="0"/>
-                                </a:rPr>
-                                <m:t>𝜕</m:t>
-                              </m:r>
-                            </m:e>
-                            <m:sup>
-                              <m:r>
-                                <a:rPr lang="en-US" b="0" i="1" smtClean="0">
-                                  <a:latin typeface="Cambria Math" panose="02040503050406030204" pitchFamily="18" charset="0"/>
-                                </a:rPr>
-                                <m:t>2</m:t>
-                              </m:r>
-                            </m:sup>
-                          </m:sSup>
-                          <m:acc>
-                            <m:accPr>
-                              <m:chr m:val="̅"/>
-                              <m:ctrlPr>
-                                <a:rPr lang="en-US" b="0" i="1" smtClean="0">
-                                  <a:latin typeface="Cambria Math" panose="02040503050406030204" pitchFamily="18" charset="0"/>
-                                </a:rPr>
-                              </m:ctrlPr>
-                            </m:accPr>
-                            <m:e>
-                              <m:r>
-                                <a:rPr lang="en-US" b="0" i="1" smtClean="0">
-                                  <a:latin typeface="Cambria Math" panose="02040503050406030204" pitchFamily="18" charset="0"/>
-                                </a:rPr>
-                                <m:t>𝑢</m:t>
-                              </m:r>
-                            </m:e>
-                          </m:acc>
-                        </m:num>
-                        <m:den>
-                          <m:r>
-                            <a:rPr lang="en-US" b="0" i="1" smtClean="0">
-                              <a:latin typeface="Cambria Math" panose="02040503050406030204" pitchFamily="18" charset="0"/>
-                              <a:ea typeface="Cambria Math" panose="02040503050406030204" pitchFamily="18" charset="0"/>
-                            </a:rPr>
-                            <m:t>𝜕</m:t>
-                          </m:r>
-                          <m:sSup>
-                            <m:sSupPr>
-                              <m:ctrlPr>
-                                <a:rPr lang="en-US" b="0" i="1" smtClean="0">
-                                  <a:latin typeface="Cambria Math" panose="02040503050406030204" pitchFamily="18" charset="0"/>
-                                </a:rPr>
-                              </m:ctrlPr>
-                            </m:sSupPr>
-                            <m:e>
-                              <m:r>
-                                <a:rPr lang="en-US" b="0" i="1" smtClean="0">
-                                  <a:latin typeface="Cambria Math" panose="02040503050406030204" pitchFamily="18" charset="0"/>
-                                </a:rPr>
-                                <m:t>𝑡</m:t>
-                              </m:r>
-                            </m:e>
-                            <m:sup>
-                              <m:r>
-                                <a:rPr lang="en-US" b="0" i="1" smtClean="0">
-                                  <a:latin typeface="Cambria Math" panose="02040503050406030204" pitchFamily="18" charset="0"/>
-                                </a:rPr>
-                                <m:t>2</m:t>
-                              </m:r>
-                            </m:sup>
-                          </m:sSup>
-                        </m:den>
-                      </m:f>
-                      <m:r>
-                        <a:rPr lang="en-US" b="0" i="1" smtClean="0">
-                          <a:latin typeface="Cambria Math" panose="02040503050406030204" pitchFamily="18" charset="0"/>
-                        </a:rPr>
-                        <m:t>=</m:t>
-                      </m:r>
-                      <m:r>
-                        <m:rPr>
-                          <m:sty m:val="p"/>
-                        </m:rPr>
-                        <a:rPr lang="en-US" b="0" i="1" smtClean="0">
-                          <a:latin typeface="Cambria Math" panose="02040503050406030204" pitchFamily="18" charset="0"/>
-                          <a:ea typeface="Cambria Math" panose="02040503050406030204" pitchFamily="18" charset="0"/>
-                        </a:rPr>
-                        <m:t>∇</m:t>
-                      </m:r>
-                      <m:r>
-                        <a:rPr lang="en-US" b="0" i="1" smtClean="0">
-                          <a:latin typeface="Cambria Math" panose="02040503050406030204" pitchFamily="18" charset="0"/>
-                          <a:ea typeface="Cambria Math" panose="02040503050406030204" pitchFamily="18" charset="0"/>
-                        </a:rPr>
-                        <m:t>⋅</m:t>
-                      </m:r>
-                      <m:acc>
-                        <m:accPr>
-                          <m:chr m:val="̅"/>
-                          <m:ctrlPr>
-                            <a:rPr lang="en-US" b="0" i="1" smtClean="0">
-                              <a:latin typeface="Cambria Math" panose="02040503050406030204" pitchFamily="18" charset="0"/>
-                              <a:ea typeface="Cambria Math" panose="02040503050406030204" pitchFamily="18" charset="0"/>
-                            </a:rPr>
-                          </m:ctrlPr>
-                        </m:accPr>
-                        <m:e>
-                          <m:r>
-                            <a:rPr lang="en-US" b="0" i="1" smtClean="0">
-                              <a:latin typeface="Cambria Math" panose="02040503050406030204" pitchFamily="18" charset="0"/>
-                              <a:ea typeface="Cambria Math" panose="02040503050406030204" pitchFamily="18" charset="0"/>
-                            </a:rPr>
-                            <m:t>𝜎</m:t>
-                          </m:r>
-                        </m:e>
-                      </m:acc>
-                      <m:r>
-                        <a:rPr lang="en-US" b="0" i="1" smtClean="0">
-                          <a:latin typeface="Cambria Math" panose="02040503050406030204" pitchFamily="18" charset="0"/>
-                          <a:ea typeface="Cambria Math" panose="02040503050406030204" pitchFamily="18" charset="0"/>
-                        </a:rPr>
-                        <m:t>+</m:t>
-                      </m:r>
-                      <m:acc>
-                        <m:accPr>
-                          <m:chr m:val="̅"/>
-                          <m:ctrlPr>
-                            <a:rPr lang="en-US" b="0" i="1" smtClean="0">
-                              <a:latin typeface="Cambria Math" panose="02040503050406030204" pitchFamily="18" charset="0"/>
-                              <a:ea typeface="Cambria Math" panose="02040503050406030204" pitchFamily="18" charset="0"/>
-                            </a:rPr>
-                          </m:ctrlPr>
-                        </m:accPr>
-                        <m:e>
-                          <m:r>
-                            <a:rPr lang="en-US" b="0" i="1" smtClean="0">
-                              <a:latin typeface="Cambria Math" panose="02040503050406030204" pitchFamily="18" charset="0"/>
-                              <a:ea typeface="Cambria Math" panose="02040503050406030204" pitchFamily="18" charset="0"/>
-                            </a:rPr>
-                            <m:t>𝑓</m:t>
-                          </m:r>
-                        </m:e>
-                      </m:acc>
-                    </m:oMath>
-                  </m:oMathPara>
-                </a14:m>
-                <a:endParaRPr lang="en-US" dirty="0"/>
-              </a:p>
-              <a:p>
-                <a:pPr marL="290513"/>
-                <a:r>
-                  <a:rPr lang="en-US" dirty="0"/>
-                  <a:t>The displacement at any point, is equal to the sum of internal forces and external forces. </a:t>
-                </a:r>
-              </a:p>
-              <a:p>
-                <a:pPr marL="285750" indent="-285750">
-                  <a:buFont typeface="Arial" panose="020B0604020202020204" pitchFamily="34" charset="0"/>
-                  <a:buChar char="•"/>
-                </a:pPr>
-                <a:r>
-                  <a:rPr lang="en-US" dirty="0"/>
-                  <a:t>Constitutive Relation (Hooke’s Law):</a:t>
-                </a:r>
-              </a:p>
-              <a:p>
-                <a:pPr lvl="1" indent="0">
-                  <a:buNone/>
-                </a:pPr>
-                <a14:m>
-                  <m:oMathPara xmlns:m="http://schemas.openxmlformats.org/officeDocument/2006/math">
-                    <m:oMathParaPr>
-                      <m:jc m:val="centerGroup"/>
-                    </m:oMathParaPr>
-                    <m:oMath xmlns:m="http://schemas.openxmlformats.org/officeDocument/2006/math">
-                      <m:acc>
-                        <m:accPr>
-                          <m:chr m:val="̅"/>
-                          <m:ctrlPr>
-                            <a:rPr lang="en-US" i="1" smtClean="0">
-                              <a:latin typeface="Cambria Math" panose="02040503050406030204" pitchFamily="18" charset="0"/>
-                              <a:ea typeface="Cambria Math" panose="02040503050406030204" pitchFamily="18" charset="0"/>
-                            </a:rPr>
-                          </m:ctrlPr>
-                        </m:accPr>
-                        <m:e>
-                          <m:r>
-                            <a:rPr lang="en-US" b="0" i="1" smtClean="0">
-                              <a:latin typeface="Cambria Math" panose="02040503050406030204" pitchFamily="18" charset="0"/>
-                              <a:ea typeface="Cambria Math" panose="02040503050406030204" pitchFamily="18" charset="0"/>
-                            </a:rPr>
-                            <m:t>𝜎</m:t>
-                          </m:r>
-                        </m:e>
-                      </m:acc>
-                      <m:r>
-                        <a:rPr lang="en-US" b="0" i="1" smtClean="0">
-                          <a:latin typeface="Cambria Math" panose="02040503050406030204" pitchFamily="18" charset="0"/>
-                          <a:ea typeface="Cambria Math" panose="02040503050406030204" pitchFamily="18" charset="0"/>
-                        </a:rPr>
-                        <m:t>=</m:t>
-                      </m:r>
-                      <m:acc>
-                        <m:accPr>
-                          <m:chr m:val="̿"/>
-                          <m:ctrlPr>
-                            <a:rPr lang="en-US" b="0" i="1" smtClean="0">
-                              <a:latin typeface="Cambria Math" panose="02040503050406030204" pitchFamily="18" charset="0"/>
-                              <a:ea typeface="Cambria Math" panose="02040503050406030204" pitchFamily="18" charset="0"/>
-                            </a:rPr>
-                          </m:ctrlPr>
-                        </m:accPr>
-                        <m:e>
-                          <m:r>
-                            <a:rPr lang="en-US" b="0" i="1" smtClean="0">
-                              <a:latin typeface="Cambria Math" panose="02040503050406030204" pitchFamily="18" charset="0"/>
-                              <a:ea typeface="Cambria Math" panose="02040503050406030204" pitchFamily="18" charset="0"/>
-                            </a:rPr>
-                            <m:t>𝐶</m:t>
-                          </m:r>
-                        </m:e>
-                      </m:acc>
-                      <m:r>
-                        <a:rPr lang="en-US" b="0" i="1" smtClean="0">
-                          <a:latin typeface="Cambria Math" panose="02040503050406030204" pitchFamily="18" charset="0"/>
-                          <a:ea typeface="Cambria Math" panose="02040503050406030204" pitchFamily="18" charset="0"/>
-                        </a:rPr>
-                        <m:t>:</m:t>
-                      </m:r>
-                      <m:acc>
-                        <m:accPr>
-                          <m:chr m:val="̅"/>
-                          <m:ctrlPr>
-                            <a:rPr lang="en-US" b="0" i="1" smtClean="0">
-                              <a:latin typeface="Cambria Math" panose="02040503050406030204" pitchFamily="18" charset="0"/>
-                              <a:ea typeface="Cambria Math" panose="02040503050406030204" pitchFamily="18" charset="0"/>
-                            </a:rPr>
-                          </m:ctrlPr>
-                        </m:accPr>
-                        <m:e>
-                          <m:r>
-                            <a:rPr lang="en-US" b="0" i="1" smtClean="0">
-                              <a:latin typeface="Cambria Math" panose="02040503050406030204" pitchFamily="18" charset="0"/>
-                              <a:ea typeface="Cambria Math" panose="02040503050406030204" pitchFamily="18" charset="0"/>
-                            </a:rPr>
-                            <m:t>𝜖</m:t>
-                          </m:r>
-                        </m:e>
-                      </m:acc>
-                      <m:r>
-                        <a:rPr lang="en-US" b="0" i="1" smtClean="0">
-                          <a:latin typeface="Cambria Math" panose="02040503050406030204" pitchFamily="18" charset="0"/>
-                          <a:ea typeface="Cambria Math" panose="02040503050406030204" pitchFamily="18" charset="0"/>
-                        </a:rPr>
-                        <m:t>=</m:t>
-                      </m:r>
-                      <m:r>
-                        <a:rPr lang="en-US" b="0" i="1" smtClean="0">
-                          <a:latin typeface="Cambria Math" panose="02040503050406030204" pitchFamily="18" charset="0"/>
-                          <a:ea typeface="Cambria Math" panose="02040503050406030204" pitchFamily="18" charset="0"/>
-                        </a:rPr>
-                        <m:t>𝜆</m:t>
-                      </m:r>
-                      <m:d>
-                        <m:dPr>
-                          <m:ctrlPr>
-                            <a:rPr lang="en-US" b="0" i="1" smtClean="0">
-                              <a:latin typeface="Cambria Math" panose="02040503050406030204" pitchFamily="18" charset="0"/>
-                              <a:ea typeface="Cambria Math" panose="02040503050406030204" pitchFamily="18" charset="0"/>
-                            </a:rPr>
-                          </m:ctrlPr>
-                        </m:dPr>
-                        <m:e>
-                          <m:r>
-                            <m:rPr>
-                              <m:sty m:val="p"/>
-                            </m:rPr>
-                            <a:rPr lang="en-US" b="0" i="0" smtClean="0">
-                              <a:latin typeface="Cambria Math" panose="02040503050406030204" pitchFamily="18" charset="0"/>
-                              <a:ea typeface="Cambria Math" panose="02040503050406030204" pitchFamily="18" charset="0"/>
-                            </a:rPr>
-                            <m:t>∇</m:t>
-                          </m:r>
-                          <m:r>
-                            <a:rPr lang="en-US" b="0" i="1" smtClean="0">
-                              <a:latin typeface="Cambria Math" panose="02040503050406030204" pitchFamily="18" charset="0"/>
-                              <a:ea typeface="Cambria Math" panose="02040503050406030204" pitchFamily="18" charset="0"/>
-                            </a:rPr>
-                            <m:t>⋅</m:t>
-                          </m:r>
-                          <m:acc>
-                            <m:accPr>
-                              <m:chr m:val="̅"/>
-                              <m:ctrlPr>
-                                <a:rPr lang="en-US" b="0" i="1" smtClean="0">
-                                  <a:latin typeface="Cambria Math" panose="02040503050406030204" pitchFamily="18" charset="0"/>
-                                  <a:ea typeface="Cambria Math" panose="02040503050406030204" pitchFamily="18" charset="0"/>
-                                </a:rPr>
-                              </m:ctrlPr>
-                            </m:accPr>
-                            <m:e>
-                              <m:r>
-                                <a:rPr lang="en-US" b="0" i="1" smtClean="0">
-                                  <a:latin typeface="Cambria Math" panose="02040503050406030204" pitchFamily="18" charset="0"/>
-                                  <a:ea typeface="Cambria Math" panose="02040503050406030204" pitchFamily="18" charset="0"/>
-                                </a:rPr>
-                                <m:t>𝑢</m:t>
-                              </m:r>
-                            </m:e>
-                          </m:acc>
-                        </m:e>
-                      </m:d>
-                      <m:acc>
-                        <m:accPr>
-                          <m:chr m:val="̿"/>
-                          <m:ctrlPr>
-                            <a:rPr lang="en-US" b="0" i="1" smtClean="0">
-                              <a:latin typeface="Cambria Math" panose="02040503050406030204" pitchFamily="18" charset="0"/>
-                              <a:ea typeface="Cambria Math" panose="02040503050406030204" pitchFamily="18" charset="0"/>
-                            </a:rPr>
-                          </m:ctrlPr>
-                        </m:accPr>
-                        <m:e>
-                          <m:r>
-                            <a:rPr lang="en-US" b="0" i="1" smtClean="0">
-                              <a:latin typeface="Cambria Math" panose="02040503050406030204" pitchFamily="18" charset="0"/>
-                              <a:ea typeface="Cambria Math" panose="02040503050406030204" pitchFamily="18" charset="0"/>
-                            </a:rPr>
-                            <m:t>𝐼</m:t>
-                          </m:r>
-                        </m:e>
-                      </m:acc>
-                      <m:r>
-                        <a:rPr lang="en-US" b="0" i="1" smtClean="0">
-                          <a:latin typeface="Cambria Math" panose="02040503050406030204" pitchFamily="18" charset="0"/>
-                          <a:ea typeface="Cambria Math" panose="02040503050406030204" pitchFamily="18" charset="0"/>
-                        </a:rPr>
-                        <m:t>+2</m:t>
-                      </m:r>
-                      <m:r>
-                        <a:rPr lang="en-US" b="0" i="1" smtClean="0">
-                          <a:latin typeface="Cambria Math" panose="02040503050406030204" pitchFamily="18" charset="0"/>
-                          <a:ea typeface="Cambria Math" panose="02040503050406030204" pitchFamily="18" charset="0"/>
-                        </a:rPr>
-                        <m:t>𝜇𝜖</m:t>
-                      </m:r>
-                    </m:oMath>
-                  </m:oMathPara>
-                </a14:m>
-                <a:endParaRPr lang="en-US" dirty="0">
-                  <a:latin typeface="Cambria Math" panose="02040503050406030204" pitchFamily="18" charset="0"/>
-                  <a:ea typeface="Cambria Math" panose="02040503050406030204" pitchFamily="18" charset="0"/>
-                </a:endParaRPr>
-              </a:p>
-              <a:p>
-                <a:pPr lvl="1" indent="0">
-                  <a:buNone/>
-                </a:pPr>
-                <a:r>
-                  <a:rPr lang="en-US" b="0" dirty="0"/>
-                  <a:t>Where, </a:t>
-                </a:r>
-                <a14:m>
-                  <m:oMath xmlns:m="http://schemas.openxmlformats.org/officeDocument/2006/math">
-                    <m:sSub>
-                      <m:sSubPr>
-                        <m:ctrlPr>
-                          <a:rPr lang="en-US" b="0" i="1" smtClean="0">
-                            <a:latin typeface="Cambria Math" panose="02040503050406030204" pitchFamily="18" charset="0"/>
-                          </a:rPr>
-                        </m:ctrlPr>
-                      </m:sSubPr>
-                      <m:e>
-                        <m:r>
-                          <a:rPr lang="en-US" b="0" i="1" smtClean="0">
-                            <a:latin typeface="Cambria Math" panose="02040503050406030204" pitchFamily="18" charset="0"/>
-                          </a:rPr>
-                          <m:t>𝐶</m:t>
-                        </m:r>
-                      </m:e>
-                      <m:sub>
-                        <m:r>
-                          <a:rPr lang="en-US" b="0" i="1" smtClean="0">
-                            <a:latin typeface="Cambria Math" panose="02040503050406030204" pitchFamily="18" charset="0"/>
-                          </a:rPr>
-                          <m:t>𝑖𝑗𝑘𝑙</m:t>
-                        </m:r>
-                      </m:sub>
-                    </m:sSub>
-                    <m:r>
-                      <a:rPr lang="en-US" b="0" i="1" smtClean="0">
-                        <a:latin typeface="Cambria Math" panose="02040503050406030204" pitchFamily="18" charset="0"/>
-                      </a:rPr>
-                      <m:t>=</m:t>
-                    </m:r>
-                    <m:r>
-                      <a:rPr lang="en-US" b="0" i="1" smtClean="0">
-                        <a:latin typeface="Cambria Math" panose="02040503050406030204" pitchFamily="18" charset="0"/>
-                      </a:rPr>
-                      <m:t>𝜆</m:t>
-                    </m:r>
-                    <m:sSub>
-                      <m:sSubPr>
-                        <m:ctrlPr>
-                          <a:rPr lang="en-US" b="0" i="1" smtClean="0">
-                            <a:latin typeface="Cambria Math" panose="02040503050406030204" pitchFamily="18" charset="0"/>
-                          </a:rPr>
-                        </m:ctrlPr>
-                      </m:sSubPr>
-                      <m:e>
-                        <m:r>
-                          <a:rPr lang="en-US" b="0" i="1" smtClean="0">
-                            <a:latin typeface="Cambria Math" panose="02040503050406030204" pitchFamily="18" charset="0"/>
-                          </a:rPr>
-                          <m:t>𝛿</m:t>
-                        </m:r>
-                      </m:e>
-                      <m:sub>
-                        <m:r>
-                          <a:rPr lang="en-US" b="0" i="1" smtClean="0">
-                            <a:latin typeface="Cambria Math" panose="02040503050406030204" pitchFamily="18" charset="0"/>
-                          </a:rPr>
-                          <m:t>𝑖𝑗</m:t>
-                        </m:r>
-                      </m:sub>
-                    </m:sSub>
-                    <m:sSub>
-                      <m:sSubPr>
-                        <m:ctrlPr>
-                          <a:rPr lang="en-US" b="0" i="1" smtClean="0">
-                            <a:latin typeface="Cambria Math" panose="02040503050406030204" pitchFamily="18" charset="0"/>
-                          </a:rPr>
-                        </m:ctrlPr>
-                      </m:sSubPr>
-                      <m:e>
-                        <m:r>
-                          <a:rPr lang="en-US" b="0" i="1" smtClean="0">
-                            <a:latin typeface="Cambria Math" panose="02040503050406030204" pitchFamily="18" charset="0"/>
-                          </a:rPr>
-                          <m:t>𝛿</m:t>
-                        </m:r>
-                      </m:e>
-                      <m:sub>
-                        <m:r>
-                          <a:rPr lang="en-US" b="0" i="1" smtClean="0">
-                            <a:latin typeface="Cambria Math" panose="02040503050406030204" pitchFamily="18" charset="0"/>
-                          </a:rPr>
-                          <m:t>𝑘𝑙</m:t>
-                        </m:r>
-                      </m:sub>
-                    </m:sSub>
-                    <m:r>
-                      <a:rPr lang="en-US" b="0" i="1" smtClean="0">
-                        <a:latin typeface="Cambria Math" panose="02040503050406030204" pitchFamily="18" charset="0"/>
-                      </a:rPr>
-                      <m:t>+</m:t>
-                    </m:r>
-                    <m:r>
-                      <a:rPr lang="en-US" b="0" i="1" smtClean="0">
-                        <a:latin typeface="Cambria Math" panose="02040503050406030204" pitchFamily="18" charset="0"/>
-                      </a:rPr>
-                      <m:t>𝜇</m:t>
-                    </m:r>
-                    <m:r>
-                      <a:rPr lang="en-US" b="0" i="1" smtClean="0">
-                        <a:latin typeface="Cambria Math" panose="02040503050406030204" pitchFamily="18" charset="0"/>
-                      </a:rPr>
-                      <m:t>(</m:t>
-                    </m:r>
-                    <m:sSub>
-                      <m:sSubPr>
-                        <m:ctrlPr>
-                          <a:rPr lang="en-US" b="0" i="1" smtClean="0">
-                            <a:latin typeface="Cambria Math" panose="02040503050406030204" pitchFamily="18" charset="0"/>
-                          </a:rPr>
-                        </m:ctrlPr>
-                      </m:sSubPr>
-                      <m:e>
-                        <m:r>
-                          <a:rPr lang="en-US" b="0" i="1" smtClean="0">
-                            <a:latin typeface="Cambria Math" panose="02040503050406030204" pitchFamily="18" charset="0"/>
-                          </a:rPr>
-                          <m:t>𝛿</m:t>
-                        </m:r>
-                      </m:e>
-                      <m:sub>
-                        <m:r>
-                          <a:rPr lang="en-US" b="0" i="1" smtClean="0">
-                            <a:latin typeface="Cambria Math" panose="02040503050406030204" pitchFamily="18" charset="0"/>
-                          </a:rPr>
-                          <m:t>𝑖𝑘</m:t>
-                        </m:r>
-                      </m:sub>
-                    </m:sSub>
-                    <m:sSub>
-                      <m:sSubPr>
-                        <m:ctrlPr>
-                          <a:rPr lang="en-US" b="0" i="1" smtClean="0">
-                            <a:latin typeface="Cambria Math" panose="02040503050406030204" pitchFamily="18" charset="0"/>
-                          </a:rPr>
-                        </m:ctrlPr>
-                      </m:sSubPr>
-                      <m:e>
-                        <m:r>
-                          <a:rPr lang="en-US" b="0" i="1" smtClean="0">
-                            <a:latin typeface="Cambria Math" panose="02040503050406030204" pitchFamily="18" charset="0"/>
-                          </a:rPr>
-                          <m:t>𝛿</m:t>
-                        </m:r>
-                      </m:e>
-                      <m:sub>
-                        <m:r>
-                          <a:rPr lang="en-US" b="0" i="1" smtClean="0">
-                            <a:latin typeface="Cambria Math" panose="02040503050406030204" pitchFamily="18" charset="0"/>
-                          </a:rPr>
-                          <m:t>𝑗𝑙</m:t>
-                        </m:r>
-                      </m:sub>
-                    </m:sSub>
-                    <m:r>
-                      <a:rPr lang="en-US" b="0" i="1" smtClean="0">
-                        <a:latin typeface="Cambria Math" panose="02040503050406030204" pitchFamily="18" charset="0"/>
-                      </a:rPr>
-                      <m:t>+</m:t>
-                    </m:r>
-                    <m:sSub>
-                      <m:sSubPr>
-                        <m:ctrlPr>
-                          <a:rPr lang="en-US" b="0" i="1" smtClean="0">
-                            <a:latin typeface="Cambria Math" panose="02040503050406030204" pitchFamily="18" charset="0"/>
-                          </a:rPr>
-                        </m:ctrlPr>
-                      </m:sSubPr>
-                      <m:e>
-                        <m:r>
-                          <a:rPr lang="en-US" b="0" i="1" smtClean="0">
-                            <a:latin typeface="Cambria Math" panose="02040503050406030204" pitchFamily="18" charset="0"/>
-                          </a:rPr>
-                          <m:t>𝛿</m:t>
-                        </m:r>
-                      </m:e>
-                      <m:sub>
-                        <m:r>
-                          <a:rPr lang="en-US" b="0" i="1" smtClean="0">
-                            <a:latin typeface="Cambria Math" panose="02040503050406030204" pitchFamily="18" charset="0"/>
-                          </a:rPr>
-                          <m:t>𝑖𝑙</m:t>
-                        </m:r>
-                      </m:sub>
-                    </m:sSub>
-                    <m:sSub>
-                      <m:sSubPr>
-                        <m:ctrlPr>
-                          <a:rPr lang="en-US" b="0" i="1" smtClean="0">
-                            <a:latin typeface="Cambria Math" panose="02040503050406030204" pitchFamily="18" charset="0"/>
-                          </a:rPr>
-                        </m:ctrlPr>
-                      </m:sSubPr>
-                      <m:e>
-                        <m:r>
-                          <a:rPr lang="en-US" b="0" i="1" smtClean="0">
-                            <a:latin typeface="Cambria Math" panose="02040503050406030204" pitchFamily="18" charset="0"/>
-                          </a:rPr>
-                          <m:t>𝛿</m:t>
-                        </m:r>
-                      </m:e>
-                      <m:sub>
-                        <m:r>
-                          <a:rPr lang="en-US" b="0" i="1" smtClean="0">
-                            <a:latin typeface="Cambria Math" panose="02040503050406030204" pitchFamily="18" charset="0"/>
-                          </a:rPr>
-                          <m:t>𝑗𝑘</m:t>
-                        </m:r>
-                      </m:sub>
-                    </m:sSub>
-                    <m:r>
-                      <a:rPr lang="en-US" b="0" i="1" smtClean="0">
-                        <a:latin typeface="Cambria Math" panose="02040503050406030204" pitchFamily="18" charset="0"/>
-                      </a:rPr>
-                      <m:t>)</m:t>
-                    </m:r>
-                  </m:oMath>
-                </a14:m>
-                <a:r>
-                  <a:rPr lang="en-US" dirty="0"/>
-                  <a:t> ; (</a:t>
-                </a:r>
-                <a14:m>
-                  <m:oMath xmlns:m="http://schemas.openxmlformats.org/officeDocument/2006/math">
-                    <m:r>
-                      <a:rPr lang="en-US" b="0" i="1" smtClean="0">
-                        <a:latin typeface="Cambria Math" panose="02040503050406030204" pitchFamily="18" charset="0"/>
-                      </a:rPr>
-                      <m:t>𝜆</m:t>
-                    </m:r>
-                  </m:oMath>
-                </a14:m>
-                <a:r>
-                  <a:rPr lang="en-US" dirty="0"/>
-                  <a:t> &amp; </a:t>
-                </a:r>
-                <a14:m>
-                  <m:oMath xmlns:m="http://schemas.openxmlformats.org/officeDocument/2006/math">
-                    <m:r>
-                      <a:rPr lang="en-US" b="0" i="1" smtClean="0">
-                        <a:latin typeface="Cambria Math" panose="02040503050406030204" pitchFamily="18" charset="0"/>
-                      </a:rPr>
-                      <m:t>𝜇</m:t>
-                    </m:r>
-                  </m:oMath>
-                </a14:m>
-                <a:r>
-                  <a:rPr lang="en-US" dirty="0"/>
-                  <a:t> being the Lamé constants),</a:t>
-                </a:r>
-              </a:p>
-              <a:p>
-                <a:pPr lvl="1" indent="0">
-                  <a:buNone/>
-                </a:pPr>
-                <a:r>
-                  <a:rPr lang="en-US" dirty="0">
-                    <a:ea typeface="Cambria Math" panose="02040503050406030204" pitchFamily="18" charset="0"/>
-                  </a:rPr>
-                  <a:t>And where </a:t>
-                </a:r>
-                <a14:m>
-                  <m:oMath xmlns:m="http://schemas.openxmlformats.org/officeDocument/2006/math">
-                    <m:acc>
-                      <m:accPr>
-                        <m:chr m:val="̅"/>
-                        <m:ctrlPr>
-                          <a:rPr lang="en-US" b="0" i="1" smtClean="0">
-                            <a:latin typeface="Cambria Math" panose="02040503050406030204" pitchFamily="18" charset="0"/>
-                            <a:ea typeface="Cambria Math" panose="02040503050406030204" pitchFamily="18" charset="0"/>
-                          </a:rPr>
-                        </m:ctrlPr>
-                      </m:accPr>
-                      <m:e>
-                        <m:r>
-                          <a:rPr lang="en-US" b="0" i="1" smtClean="0">
-                            <a:latin typeface="Cambria Math" panose="02040503050406030204" pitchFamily="18" charset="0"/>
-                            <a:ea typeface="Cambria Math" panose="02040503050406030204" pitchFamily="18" charset="0"/>
-                          </a:rPr>
-                          <m:t>𝜖</m:t>
-                        </m:r>
-                      </m:e>
-                    </m:acc>
-                    <m:r>
-                      <a:rPr lang="en-US" b="0" i="1" smtClean="0">
-                        <a:latin typeface="Cambria Math" panose="02040503050406030204" pitchFamily="18" charset="0"/>
-                        <a:ea typeface="Cambria Math" panose="02040503050406030204" pitchFamily="18" charset="0"/>
-                      </a:rPr>
-                      <m:t>=</m:t>
-                    </m:r>
-                    <m:f>
-                      <m:fPr>
-                        <m:ctrlPr>
-                          <a:rPr lang="en-US" b="0" i="1" smtClean="0">
-                            <a:latin typeface="Cambria Math" panose="02040503050406030204" pitchFamily="18" charset="0"/>
-                            <a:ea typeface="Cambria Math" panose="02040503050406030204" pitchFamily="18" charset="0"/>
-                          </a:rPr>
-                        </m:ctrlPr>
-                      </m:fPr>
-                      <m:num>
-                        <m:r>
-                          <a:rPr lang="en-US" b="0" i="1" smtClean="0">
-                            <a:latin typeface="Cambria Math" panose="02040503050406030204" pitchFamily="18" charset="0"/>
-                            <a:ea typeface="Cambria Math" panose="02040503050406030204" pitchFamily="18" charset="0"/>
-                          </a:rPr>
-                          <m:t>1</m:t>
-                        </m:r>
-                      </m:num>
-                      <m:den>
-                        <m:r>
-                          <a:rPr lang="en-US" b="0" i="1" smtClean="0">
-                            <a:latin typeface="Cambria Math" panose="02040503050406030204" pitchFamily="18" charset="0"/>
-                            <a:ea typeface="Cambria Math" panose="02040503050406030204" pitchFamily="18" charset="0"/>
-                          </a:rPr>
-                          <m:t>2</m:t>
-                        </m:r>
-                      </m:den>
-                    </m:f>
-                    <m:d>
-                      <m:dPr>
-                        <m:ctrlPr>
-                          <a:rPr lang="en-US" b="0" i="1" smtClean="0">
-                            <a:latin typeface="Cambria Math" panose="02040503050406030204" pitchFamily="18" charset="0"/>
-                            <a:ea typeface="Cambria Math" panose="02040503050406030204" pitchFamily="18" charset="0"/>
-                          </a:rPr>
-                        </m:ctrlPr>
-                      </m:dPr>
-                      <m:e>
-                        <m:r>
-                          <m:rPr>
-                            <m:sty m:val="p"/>
-                          </m:rPr>
-                          <a:rPr lang="en-US" b="0" i="0" smtClean="0">
-                            <a:latin typeface="Cambria Math" panose="02040503050406030204" pitchFamily="18" charset="0"/>
-                            <a:ea typeface="Cambria Math" panose="02040503050406030204" pitchFamily="18" charset="0"/>
-                          </a:rPr>
-                          <m:t>∇</m:t>
-                        </m:r>
-                        <m:acc>
-                          <m:accPr>
-                            <m:chr m:val="̅"/>
-                            <m:ctrlPr>
-                              <a:rPr lang="en-US" b="0" i="1" smtClean="0">
-                                <a:latin typeface="Cambria Math" panose="02040503050406030204" pitchFamily="18" charset="0"/>
-                                <a:ea typeface="Cambria Math" panose="02040503050406030204" pitchFamily="18" charset="0"/>
-                              </a:rPr>
-                            </m:ctrlPr>
-                          </m:accPr>
-                          <m:e>
-                            <m:r>
-                              <a:rPr lang="en-US" b="0" i="1" smtClean="0">
-                                <a:latin typeface="Cambria Math" panose="02040503050406030204" pitchFamily="18" charset="0"/>
-                                <a:ea typeface="Cambria Math" panose="02040503050406030204" pitchFamily="18" charset="0"/>
-                              </a:rPr>
-                              <m:t>𝑢</m:t>
-                            </m:r>
-                          </m:e>
-                        </m:acc>
-                        <m:r>
-                          <a:rPr lang="en-US" b="0" i="1" smtClean="0">
-                            <a:latin typeface="Cambria Math" panose="02040503050406030204" pitchFamily="18" charset="0"/>
-                            <a:ea typeface="Cambria Math" panose="02040503050406030204" pitchFamily="18" charset="0"/>
-                          </a:rPr>
-                          <m:t>+</m:t>
-                        </m:r>
-                        <m:sSup>
-                          <m:sSupPr>
-                            <m:ctrlPr>
-                              <a:rPr lang="en-US" b="0" i="1" smtClean="0">
-                                <a:latin typeface="Cambria Math" panose="02040503050406030204" pitchFamily="18" charset="0"/>
-                                <a:ea typeface="Cambria Math" panose="02040503050406030204" pitchFamily="18" charset="0"/>
-                              </a:rPr>
-                            </m:ctrlPr>
-                          </m:sSupPr>
-                          <m:e>
-                            <m:d>
-                              <m:dPr>
-                                <m:ctrlPr>
-                                  <a:rPr lang="en-US" b="0" i="1" smtClean="0">
-                                    <a:latin typeface="Cambria Math" panose="02040503050406030204" pitchFamily="18" charset="0"/>
-                                    <a:ea typeface="Cambria Math" panose="02040503050406030204" pitchFamily="18" charset="0"/>
-                                  </a:rPr>
-                                </m:ctrlPr>
-                              </m:dPr>
-                              <m:e>
-                                <m:r>
-                                  <m:rPr>
-                                    <m:sty m:val="p"/>
-                                  </m:rPr>
-                                  <a:rPr lang="en-US" b="0" i="0" smtClean="0">
-                                    <a:latin typeface="Cambria Math" panose="02040503050406030204" pitchFamily="18" charset="0"/>
-                                    <a:ea typeface="Cambria Math" panose="02040503050406030204" pitchFamily="18" charset="0"/>
-                                  </a:rPr>
-                                  <m:t>∇</m:t>
-                                </m:r>
-                                <m:acc>
-                                  <m:accPr>
-                                    <m:chr m:val="̅"/>
-                                    <m:ctrlPr>
-                                      <a:rPr lang="en-US" b="0" i="1" smtClean="0">
-                                        <a:latin typeface="Cambria Math" panose="02040503050406030204" pitchFamily="18" charset="0"/>
-                                        <a:ea typeface="Cambria Math" panose="02040503050406030204" pitchFamily="18" charset="0"/>
-                                      </a:rPr>
-                                    </m:ctrlPr>
-                                  </m:accPr>
-                                  <m:e>
-                                    <m:r>
-                                      <a:rPr lang="en-US" b="0" i="1" smtClean="0">
-                                        <a:latin typeface="Cambria Math" panose="02040503050406030204" pitchFamily="18" charset="0"/>
-                                        <a:ea typeface="Cambria Math" panose="02040503050406030204" pitchFamily="18" charset="0"/>
-                                      </a:rPr>
-                                      <m:t>𝑢</m:t>
-                                    </m:r>
-                                  </m:e>
-                                </m:acc>
-                              </m:e>
-                            </m:d>
-                          </m:e>
-                          <m:sup>
-                            <m:r>
-                              <a:rPr lang="en-US" b="0" i="1" smtClean="0">
-                                <a:latin typeface="Cambria Math" panose="02040503050406030204" pitchFamily="18" charset="0"/>
-                                <a:ea typeface="Cambria Math" panose="02040503050406030204" pitchFamily="18" charset="0"/>
-                              </a:rPr>
-                              <m:t>𝑇</m:t>
-                            </m:r>
-                          </m:sup>
-                        </m:sSup>
-                      </m:e>
-                    </m:d>
-                  </m:oMath>
-                </a14:m>
-                <a:r>
-                  <a:rPr lang="en-US" dirty="0">
-                    <a:latin typeface="Cambria Math" panose="02040503050406030204" pitchFamily="18" charset="0"/>
-                    <a:ea typeface="Cambria Math" panose="02040503050406030204" pitchFamily="18" charset="0"/>
-                  </a:rPr>
-                  <a:t> ; </a:t>
-                </a:r>
-                <a14:m>
-                  <m:oMath xmlns:m="http://schemas.openxmlformats.org/officeDocument/2006/math">
-                    <m:sSub>
-                      <m:sSubPr>
-                        <m:ctrlPr>
-                          <a:rPr lang="en-US" b="0" i="1" smtClean="0">
-                            <a:latin typeface="Cambria Math" panose="02040503050406030204" pitchFamily="18" charset="0"/>
-                            <a:ea typeface="Cambria Math" panose="02040503050406030204" pitchFamily="18" charset="0"/>
-                          </a:rPr>
-                        </m:ctrlPr>
-                      </m:sSubPr>
-                      <m:e>
-                        <m:d>
-                          <m:dPr>
-                            <m:ctrlPr>
-                              <a:rPr lang="en-US" i="1">
-                                <a:latin typeface="Cambria Math" panose="02040503050406030204" pitchFamily="18" charset="0"/>
-                                <a:ea typeface="Cambria Math" panose="02040503050406030204" pitchFamily="18" charset="0"/>
-                              </a:rPr>
-                            </m:ctrlPr>
-                          </m:dPr>
-                          <m:e>
-                            <m:r>
-                              <m:rPr>
-                                <m:sty m:val="p"/>
-                              </m:rPr>
-                              <a:rPr lang="en-US">
-                                <a:latin typeface="Cambria Math" panose="02040503050406030204" pitchFamily="18" charset="0"/>
-                                <a:ea typeface="Cambria Math" panose="02040503050406030204" pitchFamily="18" charset="0"/>
-                              </a:rPr>
-                              <m:t>∇</m:t>
-                            </m:r>
-                            <m:acc>
-                              <m:accPr>
-                                <m:chr m:val="̅"/>
-                                <m:ctrlPr>
-                                  <a:rPr lang="en-US" i="1">
-                                    <a:latin typeface="Cambria Math" panose="02040503050406030204" pitchFamily="18" charset="0"/>
-                                    <a:ea typeface="Cambria Math" panose="02040503050406030204" pitchFamily="18" charset="0"/>
-                                  </a:rPr>
-                                </m:ctrlPr>
-                              </m:accPr>
-                              <m:e>
-                                <m:r>
-                                  <a:rPr lang="en-US" i="1">
-                                    <a:latin typeface="Cambria Math" panose="02040503050406030204" pitchFamily="18" charset="0"/>
-                                    <a:ea typeface="Cambria Math" panose="02040503050406030204" pitchFamily="18" charset="0"/>
-                                  </a:rPr>
-                                  <m:t>𝑢</m:t>
-                                </m:r>
-                              </m:e>
-                            </m:acc>
-                          </m:e>
-                        </m:d>
-                      </m:e>
-                      <m:sub>
-                        <m:r>
-                          <a:rPr lang="en-US" b="0" i="1" smtClean="0">
-                            <a:latin typeface="Cambria Math" panose="02040503050406030204" pitchFamily="18" charset="0"/>
-                            <a:ea typeface="Cambria Math" panose="02040503050406030204" pitchFamily="18" charset="0"/>
-                          </a:rPr>
-                          <m:t>𝑖𝑗</m:t>
-                        </m:r>
-                      </m:sub>
-                    </m:sSub>
-                    <m:r>
-                      <a:rPr lang="en-US" b="0" i="1" smtClean="0">
-                        <a:latin typeface="Cambria Math" panose="02040503050406030204" pitchFamily="18" charset="0"/>
-                        <a:ea typeface="Cambria Math" panose="02040503050406030204" pitchFamily="18" charset="0"/>
-                      </a:rPr>
-                      <m:t>=</m:t>
-                    </m:r>
-                    <m:f>
-                      <m:fPr>
-                        <m:ctrlPr>
-                          <a:rPr lang="en-US" b="0" i="1" smtClean="0">
-                            <a:latin typeface="Cambria Math" panose="02040503050406030204" pitchFamily="18" charset="0"/>
-                            <a:ea typeface="Cambria Math" panose="02040503050406030204" pitchFamily="18" charset="0"/>
-                          </a:rPr>
-                        </m:ctrlPr>
-                      </m:fPr>
-                      <m:num>
-                        <m:r>
-                          <a:rPr lang="en-US" b="0" i="1" smtClean="0">
-                            <a:latin typeface="Cambria Math" panose="02040503050406030204" pitchFamily="18" charset="0"/>
-                            <a:ea typeface="Cambria Math" panose="02040503050406030204" pitchFamily="18" charset="0"/>
-                          </a:rPr>
-                          <m:t>𝜕</m:t>
-                        </m:r>
-                        <m:sSub>
-                          <m:sSubPr>
-                            <m:ctrlPr>
-                              <a:rPr lang="en-US" b="0" i="1" smtClean="0">
-                                <a:latin typeface="Cambria Math" panose="02040503050406030204" pitchFamily="18" charset="0"/>
-                                <a:ea typeface="Cambria Math" panose="02040503050406030204" pitchFamily="18" charset="0"/>
-                              </a:rPr>
-                            </m:ctrlPr>
-                          </m:sSubPr>
-                          <m:e>
-                            <m:r>
-                              <a:rPr lang="en-US" b="0" i="1" smtClean="0">
-                                <a:latin typeface="Cambria Math" panose="02040503050406030204" pitchFamily="18" charset="0"/>
-                                <a:ea typeface="Cambria Math" panose="02040503050406030204" pitchFamily="18" charset="0"/>
-                              </a:rPr>
-                              <m:t>𝑢</m:t>
-                            </m:r>
-                          </m:e>
-                          <m:sub>
-                            <m:r>
-                              <a:rPr lang="en-US" b="0" i="1" smtClean="0">
-                                <a:latin typeface="Cambria Math" panose="02040503050406030204" pitchFamily="18" charset="0"/>
-                                <a:ea typeface="Cambria Math" panose="02040503050406030204" pitchFamily="18" charset="0"/>
-                              </a:rPr>
-                              <m:t>𝑖</m:t>
-                            </m:r>
-                          </m:sub>
-                        </m:sSub>
-                      </m:num>
-                      <m:den>
-                        <m:r>
-                          <a:rPr lang="en-US" b="0" i="1" smtClean="0">
-                            <a:latin typeface="Cambria Math" panose="02040503050406030204" pitchFamily="18" charset="0"/>
-                            <a:ea typeface="Cambria Math" panose="02040503050406030204" pitchFamily="18" charset="0"/>
-                          </a:rPr>
-                          <m:t>𝜕</m:t>
-                        </m:r>
-                        <m:sSub>
-                          <m:sSubPr>
-                            <m:ctrlPr>
-                              <a:rPr lang="en-US" b="0" i="1" smtClean="0">
-                                <a:latin typeface="Cambria Math" panose="02040503050406030204" pitchFamily="18" charset="0"/>
-                                <a:ea typeface="Cambria Math" panose="02040503050406030204" pitchFamily="18" charset="0"/>
-                              </a:rPr>
-                            </m:ctrlPr>
-                          </m:sSubPr>
-                          <m:e>
-                            <m:r>
-                              <a:rPr lang="en-US" b="0" i="1" smtClean="0">
-                                <a:latin typeface="Cambria Math" panose="02040503050406030204" pitchFamily="18" charset="0"/>
-                                <a:ea typeface="Cambria Math" panose="02040503050406030204" pitchFamily="18" charset="0"/>
-                              </a:rPr>
-                              <m:t>𝑥</m:t>
-                            </m:r>
-                          </m:e>
-                          <m:sub>
-                            <m:r>
-                              <a:rPr lang="en-US" b="0" i="1" smtClean="0">
-                                <a:latin typeface="Cambria Math" panose="02040503050406030204" pitchFamily="18" charset="0"/>
-                                <a:ea typeface="Cambria Math" panose="02040503050406030204" pitchFamily="18" charset="0"/>
-                              </a:rPr>
-                              <m:t>𝑗</m:t>
-                            </m:r>
-                          </m:sub>
-                        </m:sSub>
-                      </m:den>
-                    </m:f>
-                  </m:oMath>
-                </a14:m>
-                <a:r>
-                  <a:rPr lang="en-US" dirty="0">
-                    <a:latin typeface="Cambria Math" panose="02040503050406030204" pitchFamily="18" charset="0"/>
-                    <a:ea typeface="Cambria Math" panose="02040503050406030204" pitchFamily="18" charset="0"/>
-                  </a:rPr>
-                  <a:t> </a:t>
-                </a:r>
-              </a:p>
-              <a:p>
-                <a:pPr lvl="1" indent="0">
-                  <a:buNone/>
-                </a:pPr>
-                <a:r>
-                  <a:rPr lang="en-US" dirty="0"/>
-                  <a:t>Symmetric parts of </a:t>
-                </a:r>
-                <a14:m>
-                  <m:oMath xmlns:m="http://schemas.openxmlformats.org/officeDocument/2006/math">
-                    <m:r>
-                      <m:rPr>
-                        <m:sty m:val="p"/>
-                      </m:rPr>
-                      <a:rPr lang="en-US" b="0" i="0" smtClean="0">
-                        <a:latin typeface="Cambria Math" panose="02040503050406030204" pitchFamily="18" charset="0"/>
-                        <a:ea typeface="Cambria Math" panose="02040503050406030204" pitchFamily="18" charset="0"/>
-                      </a:rPr>
-                      <m:t>∇</m:t>
-                    </m:r>
-                    <m:acc>
-                      <m:accPr>
-                        <m:chr m:val="̅"/>
-                        <m:ctrlPr>
-                          <a:rPr lang="en-US" b="0" i="1" smtClean="0">
-                            <a:latin typeface="Cambria Math" panose="02040503050406030204" pitchFamily="18" charset="0"/>
-                            <a:ea typeface="Cambria Math" panose="02040503050406030204" pitchFamily="18" charset="0"/>
-                          </a:rPr>
-                        </m:ctrlPr>
-                      </m:accPr>
-                      <m:e>
-                        <m:r>
-                          <a:rPr lang="en-US" b="0" i="1" smtClean="0">
-                            <a:latin typeface="Cambria Math" panose="02040503050406030204" pitchFamily="18" charset="0"/>
-                            <a:ea typeface="Cambria Math" panose="02040503050406030204" pitchFamily="18" charset="0"/>
-                          </a:rPr>
-                          <m:t>𝑢</m:t>
-                        </m:r>
-                      </m:e>
-                    </m:acc>
-                  </m:oMath>
-                </a14:m>
-                <a:r>
-                  <a:rPr lang="en-US" dirty="0"/>
-                  <a:t> represent pure deformations (stretching, compression, and shear). The asymmetric parts represent rigid body motions.</a:t>
-                </a:r>
-              </a:p>
-              <a:p>
-                <a:pPr marL="285750" lvl="1"/>
-                <a:r>
-                  <a:rPr lang="en-US" dirty="0"/>
-                  <a:t>The wave equation for solids:</a:t>
+                  <a:t>Combining the above, we get the wave equation for solids:</a:t>
                 </a:r>
               </a:p>
               <a:p>
@@ -15381,7 +14174,1576 @@
             </p:txBody>
           </p:sp>
         </mc:Choice>
-        <mc:Fallback>
+        <mc:Fallback xmlns="">
+          <p:sp>
+            <p:nvSpPr>
+              <p:cNvPr id="4" name="Content Placeholder 3">
+                <a:extLst>
+                  <a:ext uri="{FF2B5EF4-FFF2-40B4-BE49-F238E27FC236}">
+                    <a16:creationId xmlns:a16="http://schemas.microsoft.com/office/drawing/2014/main" id="{C9F60626-48B6-5ABF-56DC-461C6D7C5091}"/>
+                  </a:ext>
+                </a:extLst>
+              </p:cNvPr>
+              <p:cNvSpPr>
+                <a:spLocks noGrp="1" noRot="1" noChangeAspect="1" noMove="1" noResize="1" noEditPoints="1" noAdjustHandles="1" noChangeArrowheads="1" noChangeShapeType="1" noTextEdit="1"/>
+              </p:cNvSpPr>
+              <p:nvPr>
+                <p:ph sz="half" idx="14"/>
+              </p:nvPr>
+            </p:nvSpPr>
+            <p:spPr>
+              <a:xfrm>
+                <a:off x="1341120" y="1139483"/>
+                <a:ext cx="8920481" cy="5216865"/>
+              </a:xfrm>
+              <a:blipFill>
+                <a:blip r:embed="rId3"/>
+                <a:stretch>
+                  <a:fillRect l="-410" t="-1519"/>
+                </a:stretch>
+              </a:blipFill>
+            </p:spPr>
+            <p:txBody>
+              <a:bodyPr/>
+              <a:lstStyle/>
+              <a:p>
+                <a:r>
+                  <a:rPr lang="en-US">
+                    <a:noFill/>
+                  </a:rPr>
+                  <a:t> </a:t>
+                </a:r>
+              </a:p>
+            </p:txBody>
+          </p:sp>
+        </mc:Fallback>
+      </mc:AlternateContent>
+    </p:spTree>
+    <p:extLst>
+      <p:ext uri="{BB962C8B-B14F-4D97-AF65-F5344CB8AC3E}">
+        <p14:creationId xmlns:p14="http://schemas.microsoft.com/office/powerpoint/2010/main" val="85280667"/>
+      </p:ext>
+    </p:extLst>
+  </p:cSld>
+  <p:clrMapOvr>
+    <a:masterClrMapping/>
+  </p:clrMapOvr>
+</p:sld>
+</file>
+
+<file path=ppt/slides/slide5.xml><?xml version="1.0" encoding="utf-8"?>
+<p:sld xmlns:a="http://schemas.openxmlformats.org/drawingml/2006/main" xmlns:r="http://schemas.openxmlformats.org/officeDocument/2006/relationships" xmlns:p="http://schemas.openxmlformats.org/presentationml/2006/main">
+  <p:cSld>
+    <p:spTree>
+      <p:nvGrpSpPr>
+        <p:cNvPr id="1" name="">
+          <a:extLst>
+            <a:ext uri="{FF2B5EF4-FFF2-40B4-BE49-F238E27FC236}">
+              <a16:creationId xmlns:a16="http://schemas.microsoft.com/office/drawing/2014/main" id="{64552390-94C5-7C8A-E531-0E96E82EA7C3}"/>
+            </a:ext>
+          </a:extLst>
+        </p:cNvPr>
+        <p:cNvGrpSpPr/>
+        <p:nvPr/>
+      </p:nvGrpSpPr>
+      <p:grpSpPr>
+        <a:xfrm>
+          <a:off x="0" y="0"/>
+          <a:ext cx="0" cy="0"/>
+          <a:chOff x="0" y="0"/>
+          <a:chExt cx="0" cy="0"/>
+        </a:xfrm>
+      </p:grpSpPr>
+      <p:sp>
+        <p:nvSpPr>
+          <p:cNvPr id="2" name="Title 1">
+            <a:extLst>
+              <a:ext uri="{FF2B5EF4-FFF2-40B4-BE49-F238E27FC236}">
+                <a16:creationId xmlns:a16="http://schemas.microsoft.com/office/drawing/2014/main" id="{05023634-3FF5-98EB-9101-63137C059787}"/>
+              </a:ext>
+            </a:extLst>
+          </p:cNvPr>
+          <p:cNvSpPr>
+            <a:spLocks noGrp="1"/>
+          </p:cNvSpPr>
+          <p:nvPr>
+            <p:ph type="title"/>
+          </p:nvPr>
+        </p:nvSpPr>
+        <p:spPr>
+          <a:xfrm>
+            <a:off x="1341120" y="558801"/>
+            <a:ext cx="9953308" cy="580682"/>
+          </a:xfrm>
+        </p:spPr>
+        <p:txBody>
+          <a:bodyPr>
+            <a:normAutofit/>
+          </a:bodyPr>
+          <a:lstStyle/>
+          <a:p>
+            <a:r>
+              <a:rPr lang="en-US" dirty="0"/>
+              <a:t>Governing Equations – Boundary Conditions</a:t>
+            </a:r>
+          </a:p>
+        </p:txBody>
+      </p:sp>
+      <p:sp>
+        <p:nvSpPr>
+          <p:cNvPr id="68" name="Slide Number Placeholder 67">
+            <a:extLst>
+              <a:ext uri="{FF2B5EF4-FFF2-40B4-BE49-F238E27FC236}">
+                <a16:creationId xmlns:a16="http://schemas.microsoft.com/office/drawing/2014/main" id="{E018125A-0987-F2A8-9EBE-BBC5A8DB2F4C}"/>
+              </a:ext>
+            </a:extLst>
+          </p:cNvPr>
+          <p:cNvSpPr>
+            <a:spLocks noGrp="1"/>
+          </p:cNvSpPr>
+          <p:nvPr>
+            <p:ph type="sldNum" sz="quarter" idx="13"/>
+          </p:nvPr>
+        </p:nvSpPr>
+        <p:spPr>
+          <a:xfrm>
+            <a:off x="10373350" y="6356349"/>
+            <a:ext cx="987552" cy="365125"/>
+          </a:xfrm>
+        </p:spPr>
+        <p:txBody>
+          <a:bodyPr/>
+          <a:lstStyle/>
+          <a:p>
+            <a:fld id="{A49DFD55-3C28-40EF-9E31-A92D2E4017FF}" type="slidenum">
+              <a:rPr lang="en-US" smtClean="0"/>
+              <a:pPr/>
+              <a:t>5</a:t>
+            </a:fld>
+            <a:endParaRPr lang="en-US" dirty="0"/>
+          </a:p>
+        </p:txBody>
+      </p:sp>
+      <mc:AlternateContent xmlns:mc="http://schemas.openxmlformats.org/markup-compatibility/2006" xmlns:a14="http://schemas.microsoft.com/office/drawing/2010/main">
+        <mc:Choice Requires="a14">
+          <p:sp>
+            <p:nvSpPr>
+              <p:cNvPr id="4" name="Content Placeholder 3">
+                <a:extLst>
+                  <a:ext uri="{FF2B5EF4-FFF2-40B4-BE49-F238E27FC236}">
+                    <a16:creationId xmlns:a16="http://schemas.microsoft.com/office/drawing/2014/main" id="{1573343B-E3B0-E1CB-3BDC-58F1C031904B}"/>
+                  </a:ext>
+                </a:extLst>
+              </p:cNvPr>
+              <p:cNvSpPr>
+                <a:spLocks noGrp="1"/>
+              </p:cNvSpPr>
+              <p:nvPr>
+                <p:ph sz="half" idx="14"/>
+              </p:nvPr>
+            </p:nvSpPr>
+            <p:spPr>
+              <a:xfrm>
+                <a:off x="1341120" y="1139483"/>
+                <a:ext cx="8920481" cy="5216865"/>
+              </a:xfrm>
+            </p:spPr>
+            <p:txBody>
+              <a:bodyPr>
+                <a:normAutofit/>
+              </a:bodyPr>
+              <a:lstStyle/>
+              <a:p>
+                <a:pPr marL="285750" indent="-285750">
+                  <a:buFont typeface="Arial" panose="020B0604020202020204" pitchFamily="34" charset="0"/>
+                  <a:buChar char="•"/>
+                </a:pPr>
+                <a:r>
+                  <a:rPr lang="en-US" dirty="0"/>
+                  <a:t>Periodicity:</a:t>
+                </a:r>
+              </a:p>
+              <a:p>
+                <a:pPr marL="0" indent="0">
+                  <a:buNone/>
+                </a:pPr>
+                <a14:m>
+                  <m:oMathPara xmlns:m="http://schemas.openxmlformats.org/officeDocument/2006/math">
+                    <m:oMathParaPr>
+                      <m:jc m:val="centerGroup"/>
+                    </m:oMathParaPr>
+                    <m:oMath xmlns:m="http://schemas.openxmlformats.org/officeDocument/2006/math">
+                      <m:acc>
+                        <m:accPr>
+                          <m:chr m:val="̅"/>
+                          <m:ctrlPr>
+                            <a:rPr lang="en-US" b="0" i="1" smtClean="0">
+                              <a:latin typeface="Cambria Math" panose="02040503050406030204" pitchFamily="18" charset="0"/>
+                            </a:rPr>
+                          </m:ctrlPr>
+                        </m:accPr>
+                        <m:e>
+                          <m:r>
+                            <a:rPr lang="en-US" b="0" i="1" smtClean="0">
+                              <a:latin typeface="Cambria Math" panose="02040503050406030204" pitchFamily="18" charset="0"/>
+                            </a:rPr>
+                            <m:t>𝑢</m:t>
+                          </m:r>
+                        </m:e>
+                      </m:acc>
+                      <m:d>
+                        <m:dPr>
+                          <m:ctrlPr>
+                            <a:rPr lang="en-US" b="0" i="1" smtClean="0">
+                              <a:latin typeface="Cambria Math" panose="02040503050406030204" pitchFamily="18" charset="0"/>
+                            </a:rPr>
+                          </m:ctrlPr>
+                        </m:dPr>
+                        <m:e>
+                          <m:acc>
+                            <m:accPr>
+                              <m:chr m:val="̅"/>
+                              <m:ctrlPr>
+                                <a:rPr lang="en-US" b="0" i="1" smtClean="0">
+                                  <a:latin typeface="Cambria Math" panose="02040503050406030204" pitchFamily="18" charset="0"/>
+                                </a:rPr>
+                              </m:ctrlPr>
+                            </m:accPr>
+                            <m:e>
+                              <m:r>
+                                <a:rPr lang="en-US" b="0" i="1" smtClean="0">
+                                  <a:latin typeface="Cambria Math" panose="02040503050406030204" pitchFamily="18" charset="0"/>
+                                </a:rPr>
+                                <m:t>𝑥</m:t>
+                              </m:r>
+                            </m:e>
+                          </m:acc>
+                          <m:r>
+                            <a:rPr lang="en-US" b="0" i="1" smtClean="0">
+                              <a:latin typeface="Cambria Math" panose="02040503050406030204" pitchFamily="18" charset="0"/>
+                            </a:rPr>
+                            <m:t>+</m:t>
+                          </m:r>
+                          <m:sSub>
+                            <m:sSubPr>
+                              <m:ctrlPr>
+                                <a:rPr lang="en-US" b="0" i="1" smtClean="0">
+                                  <a:latin typeface="Cambria Math" panose="02040503050406030204" pitchFamily="18" charset="0"/>
+                                </a:rPr>
+                              </m:ctrlPr>
+                            </m:sSubPr>
+                            <m:e>
+                              <m:acc>
+                                <m:accPr>
+                                  <m:chr m:val="̅"/>
+                                  <m:ctrlPr>
+                                    <a:rPr lang="en-US" b="0" i="1" smtClean="0">
+                                      <a:latin typeface="Cambria Math" panose="02040503050406030204" pitchFamily="18" charset="0"/>
+                                    </a:rPr>
+                                  </m:ctrlPr>
+                                </m:accPr>
+                                <m:e>
+                                  <m:r>
+                                    <a:rPr lang="en-US" b="0" i="1" smtClean="0">
+                                      <a:latin typeface="Cambria Math" panose="02040503050406030204" pitchFamily="18" charset="0"/>
+                                    </a:rPr>
+                                    <m:t>𝑙</m:t>
+                                  </m:r>
+                                </m:e>
+                              </m:acc>
+                            </m:e>
+                            <m:sub>
+                              <m:r>
+                                <a:rPr lang="en-US" b="0" i="1" smtClean="0">
+                                  <a:latin typeface="Cambria Math" panose="02040503050406030204" pitchFamily="18" charset="0"/>
+                                </a:rPr>
+                                <m:t>𝑖</m:t>
+                              </m:r>
+                            </m:sub>
+                          </m:sSub>
+                          <m:r>
+                            <a:rPr lang="en-US" b="0" i="1" smtClean="0">
+                              <a:latin typeface="Cambria Math" panose="02040503050406030204" pitchFamily="18" charset="0"/>
+                            </a:rPr>
+                            <m:t>, </m:t>
+                          </m:r>
+                          <m:r>
+                            <a:rPr lang="en-US" b="0" i="1" smtClean="0">
+                              <a:latin typeface="Cambria Math" panose="02040503050406030204" pitchFamily="18" charset="0"/>
+                            </a:rPr>
+                            <m:t>𝑡</m:t>
+                          </m:r>
+                        </m:e>
+                      </m:d>
+                      <m:r>
+                        <a:rPr lang="en-US" b="0" i="1" smtClean="0">
+                          <a:latin typeface="Cambria Math" panose="02040503050406030204" pitchFamily="18" charset="0"/>
+                        </a:rPr>
+                        <m:t>=</m:t>
+                      </m:r>
+                      <m:acc>
+                        <m:accPr>
+                          <m:chr m:val="̅"/>
+                          <m:ctrlPr>
+                            <a:rPr lang="en-US" b="0" i="1" smtClean="0">
+                              <a:latin typeface="Cambria Math" panose="02040503050406030204" pitchFamily="18" charset="0"/>
+                            </a:rPr>
+                          </m:ctrlPr>
+                        </m:accPr>
+                        <m:e>
+                          <m:r>
+                            <a:rPr lang="en-US" b="0" i="1" smtClean="0">
+                              <a:latin typeface="Cambria Math" panose="02040503050406030204" pitchFamily="18" charset="0"/>
+                            </a:rPr>
+                            <m:t>𝑢</m:t>
+                          </m:r>
+                        </m:e>
+                      </m:acc>
+                      <m:d>
+                        <m:dPr>
+                          <m:ctrlPr>
+                            <a:rPr lang="en-US" b="0" i="1" smtClean="0">
+                              <a:latin typeface="Cambria Math" panose="02040503050406030204" pitchFamily="18" charset="0"/>
+                              <a:ea typeface="Cambria Math" panose="02040503050406030204" pitchFamily="18" charset="0"/>
+                            </a:rPr>
+                          </m:ctrlPr>
+                        </m:dPr>
+                        <m:e>
+                          <m:acc>
+                            <m:accPr>
+                              <m:chr m:val="̅"/>
+                              <m:ctrlPr>
+                                <a:rPr lang="en-US" b="0" i="1" smtClean="0">
+                                  <a:latin typeface="Cambria Math" panose="02040503050406030204" pitchFamily="18" charset="0"/>
+                                  <a:ea typeface="Cambria Math" panose="02040503050406030204" pitchFamily="18" charset="0"/>
+                                </a:rPr>
+                              </m:ctrlPr>
+                            </m:accPr>
+                            <m:e>
+                              <m:r>
+                                <a:rPr lang="en-US" b="0" i="1" smtClean="0">
+                                  <a:latin typeface="Cambria Math" panose="02040503050406030204" pitchFamily="18" charset="0"/>
+                                  <a:ea typeface="Cambria Math" panose="02040503050406030204" pitchFamily="18" charset="0"/>
+                                </a:rPr>
+                                <m:t>𝑥</m:t>
+                              </m:r>
+                            </m:e>
+                          </m:acc>
+                          <m:r>
+                            <a:rPr lang="en-US" b="0" i="1" smtClean="0">
+                              <a:latin typeface="Cambria Math" panose="02040503050406030204" pitchFamily="18" charset="0"/>
+                              <a:ea typeface="Cambria Math" panose="02040503050406030204" pitchFamily="18" charset="0"/>
+                            </a:rPr>
+                            <m:t>,</m:t>
+                          </m:r>
+                          <m:r>
+                            <a:rPr lang="en-US" b="0" i="1" smtClean="0">
+                              <a:latin typeface="Cambria Math" panose="02040503050406030204" pitchFamily="18" charset="0"/>
+                              <a:ea typeface="Cambria Math" panose="02040503050406030204" pitchFamily="18" charset="0"/>
+                            </a:rPr>
+                            <m:t>𝑡</m:t>
+                          </m:r>
+                        </m:e>
+                      </m:d>
+                    </m:oMath>
+                  </m:oMathPara>
+                </a14:m>
+                <a:endParaRPr lang="en-US" dirty="0"/>
+              </a:p>
+              <a:p>
+                <a:pPr marL="285750" indent="-285750">
+                  <a:buFont typeface="Arial" panose="020B0604020202020204" pitchFamily="34" charset="0"/>
+                  <a:buChar char="•"/>
+                </a:pPr>
+                <a:r>
+                  <a:rPr lang="en-US" dirty="0"/>
+                  <a:t>Bloch wave solution:</a:t>
+                </a:r>
+              </a:p>
+              <a:p>
+                <a:pPr lvl="1" indent="0">
+                  <a:buNone/>
+                </a:pPr>
+                <a14:m>
+                  <m:oMathPara xmlns:m="http://schemas.openxmlformats.org/officeDocument/2006/math">
+                    <m:oMathParaPr>
+                      <m:jc m:val="centerGroup"/>
+                    </m:oMathParaPr>
+                    <m:oMath xmlns:m="http://schemas.openxmlformats.org/officeDocument/2006/math">
+                      <m:acc>
+                        <m:accPr>
+                          <m:chr m:val="̅"/>
+                          <m:ctrlPr>
+                            <a:rPr lang="en-US" i="1">
+                              <a:latin typeface="Cambria Math" panose="02040503050406030204" pitchFamily="18" charset="0"/>
+                            </a:rPr>
+                          </m:ctrlPr>
+                        </m:accPr>
+                        <m:e>
+                          <m:r>
+                            <a:rPr lang="en-US" i="1">
+                              <a:latin typeface="Cambria Math" panose="02040503050406030204" pitchFamily="18" charset="0"/>
+                            </a:rPr>
+                            <m:t>𝑢</m:t>
+                          </m:r>
+                        </m:e>
+                      </m:acc>
+                      <m:d>
+                        <m:dPr>
+                          <m:ctrlPr>
+                            <a:rPr lang="en-US" i="1">
+                              <a:latin typeface="Cambria Math" panose="02040503050406030204" pitchFamily="18" charset="0"/>
+                              <a:ea typeface="Cambria Math" panose="02040503050406030204" pitchFamily="18" charset="0"/>
+                            </a:rPr>
+                          </m:ctrlPr>
+                        </m:dPr>
+                        <m:e>
+                          <m:acc>
+                            <m:accPr>
+                              <m:chr m:val="̅"/>
+                              <m:ctrlPr>
+                                <a:rPr lang="en-US" i="1" smtClean="0">
+                                  <a:latin typeface="Cambria Math" panose="02040503050406030204" pitchFamily="18" charset="0"/>
+                                  <a:ea typeface="Cambria Math" panose="02040503050406030204" pitchFamily="18" charset="0"/>
+                                </a:rPr>
+                              </m:ctrlPr>
+                            </m:accPr>
+                            <m:e>
+                              <m:r>
+                                <a:rPr lang="en-US" b="0" i="1" smtClean="0">
+                                  <a:latin typeface="Cambria Math" panose="02040503050406030204" pitchFamily="18" charset="0"/>
+                                  <a:ea typeface="Cambria Math" panose="02040503050406030204" pitchFamily="18" charset="0"/>
+                                </a:rPr>
+                                <m:t>𝑥</m:t>
+                              </m:r>
+                            </m:e>
+                          </m:acc>
+                          <m:r>
+                            <a:rPr lang="en-US" i="1">
+                              <a:latin typeface="Cambria Math" panose="02040503050406030204" pitchFamily="18" charset="0"/>
+                              <a:ea typeface="Cambria Math" panose="02040503050406030204" pitchFamily="18" charset="0"/>
+                            </a:rPr>
+                            <m:t>,</m:t>
+                          </m:r>
+                          <m:r>
+                            <a:rPr lang="en-US" i="1">
+                              <a:latin typeface="Cambria Math" panose="02040503050406030204" pitchFamily="18" charset="0"/>
+                              <a:ea typeface="Cambria Math" panose="02040503050406030204" pitchFamily="18" charset="0"/>
+                            </a:rPr>
+                            <m:t>𝑡</m:t>
+                          </m:r>
+                        </m:e>
+                      </m:d>
+                      <m:r>
+                        <a:rPr lang="en-US" b="0" i="1" smtClean="0">
+                          <a:latin typeface="Cambria Math" panose="02040503050406030204" pitchFamily="18" charset="0"/>
+                          <a:ea typeface="Cambria Math" panose="02040503050406030204" pitchFamily="18" charset="0"/>
+                        </a:rPr>
+                        <m:t>=</m:t>
+                      </m:r>
+                      <m:acc>
+                        <m:accPr>
+                          <m:chr m:val="̃"/>
+                          <m:ctrlPr>
+                            <a:rPr lang="en-US" b="0" i="1" smtClean="0">
+                              <a:latin typeface="Cambria Math" panose="02040503050406030204" pitchFamily="18" charset="0"/>
+                              <a:ea typeface="Cambria Math" panose="02040503050406030204" pitchFamily="18" charset="0"/>
+                            </a:rPr>
+                          </m:ctrlPr>
+                        </m:accPr>
+                        <m:e>
+                          <m:r>
+                            <a:rPr lang="en-US" b="0" i="1" smtClean="0">
+                              <a:latin typeface="Cambria Math" panose="02040503050406030204" pitchFamily="18" charset="0"/>
+                              <a:ea typeface="Cambria Math" panose="02040503050406030204" pitchFamily="18" charset="0"/>
+                            </a:rPr>
+                            <m:t>𝑢</m:t>
+                          </m:r>
+                        </m:e>
+                      </m:acc>
+                      <m:d>
+                        <m:dPr>
+                          <m:ctrlPr>
+                            <a:rPr lang="en-US" b="0" i="1" smtClean="0">
+                              <a:latin typeface="Cambria Math" panose="02040503050406030204" pitchFamily="18" charset="0"/>
+                            </a:rPr>
+                          </m:ctrlPr>
+                        </m:dPr>
+                        <m:e>
+                          <m:r>
+                            <a:rPr lang="en-US" b="0" i="1" smtClean="0">
+                              <a:latin typeface="Cambria Math" panose="02040503050406030204" pitchFamily="18" charset="0"/>
+                            </a:rPr>
+                            <m:t>𝑥</m:t>
+                          </m:r>
+                          <m:r>
+                            <a:rPr lang="en-US" b="0" i="1" smtClean="0">
+                              <a:latin typeface="Cambria Math" panose="02040503050406030204" pitchFamily="18" charset="0"/>
+                            </a:rPr>
+                            <m:t>,</m:t>
+                          </m:r>
+                          <m:r>
+                            <a:rPr lang="en-US" b="0" i="1" smtClean="0">
+                              <a:latin typeface="Cambria Math" panose="02040503050406030204" pitchFamily="18" charset="0"/>
+                            </a:rPr>
+                            <m:t>𝑦</m:t>
+                          </m:r>
+                        </m:e>
+                      </m:d>
+                      <m:sSup>
+                        <m:sSupPr>
+                          <m:ctrlPr>
+                            <a:rPr lang="en-US" b="0" i="1" smtClean="0">
+                              <a:latin typeface="Cambria Math" panose="02040503050406030204" pitchFamily="18" charset="0"/>
+                            </a:rPr>
+                          </m:ctrlPr>
+                        </m:sSupPr>
+                        <m:e>
+                          <m:r>
+                            <a:rPr lang="en-US" b="0" i="1" smtClean="0">
+                              <a:latin typeface="Cambria Math" panose="02040503050406030204" pitchFamily="18" charset="0"/>
+                            </a:rPr>
+                            <m:t>𝑒</m:t>
+                          </m:r>
+                        </m:e>
+                        <m:sup>
+                          <m:r>
+                            <a:rPr lang="en-US" b="0" i="1" smtClean="0">
+                              <a:latin typeface="Cambria Math" panose="02040503050406030204" pitchFamily="18" charset="0"/>
+                            </a:rPr>
+                            <m:t>𝑖</m:t>
+                          </m:r>
+                          <m:d>
+                            <m:dPr>
+                              <m:ctrlPr>
+                                <a:rPr lang="en-US" b="0" i="1" smtClean="0">
+                                  <a:latin typeface="Cambria Math" panose="02040503050406030204" pitchFamily="18" charset="0"/>
+                                </a:rPr>
+                              </m:ctrlPr>
+                            </m:dPr>
+                            <m:e>
+                              <m:acc>
+                                <m:accPr>
+                                  <m:chr m:val="̅"/>
+                                  <m:ctrlPr>
+                                    <a:rPr lang="en-US" b="0" i="1" smtClean="0">
+                                      <a:latin typeface="Cambria Math" panose="02040503050406030204" pitchFamily="18" charset="0"/>
+                                    </a:rPr>
+                                  </m:ctrlPr>
+                                </m:accPr>
+                                <m:e>
+                                  <m:r>
+                                    <a:rPr lang="en-US" b="0" i="1" smtClean="0">
+                                      <a:latin typeface="Cambria Math" panose="02040503050406030204" pitchFamily="18" charset="0"/>
+                                    </a:rPr>
+                                    <m:t>𝑘</m:t>
+                                  </m:r>
+                                </m:e>
+                              </m:acc>
+                              <m:r>
+                                <a:rPr lang="en-US" b="0" i="1" smtClean="0">
+                                  <a:latin typeface="Cambria Math" panose="02040503050406030204" pitchFamily="18" charset="0"/>
+                                </a:rPr>
+                                <m:t>⋅</m:t>
+                              </m:r>
+                              <m:acc>
+                                <m:accPr>
+                                  <m:chr m:val="̅"/>
+                                  <m:ctrlPr>
+                                    <a:rPr lang="en-US" b="0" i="1" smtClean="0">
+                                      <a:latin typeface="Cambria Math" panose="02040503050406030204" pitchFamily="18" charset="0"/>
+                                    </a:rPr>
+                                  </m:ctrlPr>
+                                </m:accPr>
+                                <m:e>
+                                  <m:r>
+                                    <a:rPr lang="en-US" b="0" i="1" smtClean="0">
+                                      <a:latin typeface="Cambria Math" panose="02040503050406030204" pitchFamily="18" charset="0"/>
+                                    </a:rPr>
+                                    <m:t>𝑥</m:t>
+                                  </m:r>
+                                </m:e>
+                              </m:acc>
+                              <m:r>
+                                <a:rPr lang="en-US" b="0" i="1" smtClean="0">
+                                  <a:latin typeface="Cambria Math" panose="02040503050406030204" pitchFamily="18" charset="0"/>
+                                </a:rPr>
+                                <m:t>−</m:t>
+                              </m:r>
+                              <m:r>
+                                <a:rPr lang="en-US" b="0" i="1" smtClean="0">
+                                  <a:latin typeface="Cambria Math" panose="02040503050406030204" pitchFamily="18" charset="0"/>
+                                </a:rPr>
+                                <m:t>𝜔</m:t>
+                              </m:r>
+                              <m:r>
+                                <a:rPr lang="en-US" b="0" i="1" smtClean="0">
+                                  <a:latin typeface="Cambria Math" panose="02040503050406030204" pitchFamily="18" charset="0"/>
+                                </a:rPr>
+                                <m:t>𝑡</m:t>
+                              </m:r>
+                            </m:e>
+                          </m:d>
+                        </m:sup>
+                      </m:sSup>
+                    </m:oMath>
+                  </m:oMathPara>
+                </a14:m>
+                <a:endParaRPr lang="en-US" dirty="0">
+                  <a:ea typeface="Cambria Math" panose="02040503050406030204" pitchFamily="18" charset="0"/>
+                </a:endParaRPr>
+              </a:p>
+              <a:p>
+                <a:pPr marL="285750" lvl="1"/>
+                <a:r>
+                  <a:rPr lang="en-US" dirty="0"/>
+                  <a:t>Displacement continuity (at discrete material interfaces):</a:t>
+                </a:r>
+              </a:p>
+              <a:p>
+                <a:pPr/>
+                <a14:m>
+                  <m:oMathPara xmlns:m="http://schemas.openxmlformats.org/officeDocument/2006/math">
+                    <m:oMathParaPr>
+                      <m:jc m:val="centerGroup"/>
+                    </m:oMathParaPr>
+                    <m:oMath xmlns:m="http://schemas.openxmlformats.org/officeDocument/2006/math">
+                      <m:acc>
+                        <m:accPr>
+                          <m:chr m:val="̅"/>
+                          <m:ctrlPr>
+                            <a:rPr lang="en-US" b="0" i="1" smtClean="0">
+                              <a:latin typeface="Cambria Math" panose="02040503050406030204" pitchFamily="18" charset="0"/>
+                            </a:rPr>
+                          </m:ctrlPr>
+                        </m:accPr>
+                        <m:e>
+                          <m:sSub>
+                            <m:sSubPr>
+                              <m:ctrlPr>
+                                <a:rPr lang="en-US" i="1">
+                                  <a:latin typeface="Cambria Math" panose="02040503050406030204" pitchFamily="18" charset="0"/>
+                                </a:rPr>
+                              </m:ctrlPr>
+                            </m:sSubPr>
+                            <m:e>
+                              <m:r>
+                                <a:rPr lang="en-US" i="1">
+                                  <a:latin typeface="Cambria Math" panose="02040503050406030204" pitchFamily="18" charset="0"/>
+                                </a:rPr>
+                                <m:t>𝑢</m:t>
+                              </m:r>
+                            </m:e>
+                            <m:sub>
+                              <m:r>
+                                <a:rPr lang="en-US" i="1">
+                                  <a:latin typeface="Cambria Math" panose="02040503050406030204" pitchFamily="18" charset="0"/>
+                                </a:rPr>
+                                <m:t>𝑎</m:t>
+                              </m:r>
+                            </m:sub>
+                          </m:sSub>
+                        </m:e>
+                      </m:acc>
+                      <m:r>
+                        <a:rPr lang="en-US" b="0" i="1" smtClean="0">
+                          <a:latin typeface="Cambria Math" panose="02040503050406030204" pitchFamily="18" charset="0"/>
+                        </a:rPr>
+                        <m:t>=</m:t>
+                      </m:r>
+                      <m:acc>
+                        <m:accPr>
+                          <m:chr m:val="̅"/>
+                          <m:ctrlPr>
+                            <a:rPr lang="en-US" b="0" i="1" smtClean="0">
+                              <a:latin typeface="Cambria Math" panose="02040503050406030204" pitchFamily="18" charset="0"/>
+                            </a:rPr>
+                          </m:ctrlPr>
+                        </m:accPr>
+                        <m:e>
+                          <m:sSub>
+                            <m:sSubPr>
+                              <m:ctrlPr>
+                                <a:rPr lang="en-US" i="1">
+                                  <a:latin typeface="Cambria Math" panose="02040503050406030204" pitchFamily="18" charset="0"/>
+                                </a:rPr>
+                              </m:ctrlPr>
+                            </m:sSubPr>
+                            <m:e>
+                              <m:r>
+                                <a:rPr lang="en-US" i="1">
+                                  <a:latin typeface="Cambria Math" panose="02040503050406030204" pitchFamily="18" charset="0"/>
+                                </a:rPr>
+                                <m:t>𝑢</m:t>
+                              </m:r>
+                            </m:e>
+                            <m:sub>
+                              <m:r>
+                                <a:rPr lang="en-US" i="1">
+                                  <a:latin typeface="Cambria Math" panose="02040503050406030204" pitchFamily="18" charset="0"/>
+                                </a:rPr>
+                                <m:t>𝑏</m:t>
+                              </m:r>
+                            </m:sub>
+                          </m:sSub>
+                        </m:e>
+                      </m:acc>
+                    </m:oMath>
+                  </m:oMathPara>
+                </a14:m>
+                <a:endParaRPr lang="en-US" dirty="0"/>
+              </a:p>
+              <a:p>
+                <a:pPr marL="285750" lvl="1"/>
+                <a:r>
+                  <a:rPr lang="en-US" dirty="0"/>
+                  <a:t>Traction continuity (at discrete material interfaces):</a:t>
+                </a:r>
+              </a:p>
+              <a:p>
+                <a:pPr/>
+                <a14:m>
+                  <m:oMathPara xmlns:m="http://schemas.openxmlformats.org/officeDocument/2006/math">
+                    <m:oMathParaPr>
+                      <m:jc m:val="centerGroup"/>
+                    </m:oMathParaPr>
+                    <m:oMath xmlns:m="http://schemas.openxmlformats.org/officeDocument/2006/math">
+                      <m:acc>
+                        <m:accPr>
+                          <m:chr m:val="̅"/>
+                          <m:ctrlPr>
+                            <a:rPr lang="en-US" b="0" i="1" smtClean="0">
+                              <a:latin typeface="Cambria Math" panose="02040503050406030204" pitchFamily="18" charset="0"/>
+                            </a:rPr>
+                          </m:ctrlPr>
+                        </m:accPr>
+                        <m:e>
+                          <m:sSub>
+                            <m:sSubPr>
+                              <m:ctrlPr>
+                                <a:rPr lang="en-US" b="0" i="1" smtClean="0">
+                                  <a:latin typeface="Cambria Math" panose="02040503050406030204" pitchFamily="18" charset="0"/>
+                                </a:rPr>
+                              </m:ctrlPr>
+                            </m:sSubPr>
+                            <m:e>
+                              <m:r>
+                                <a:rPr lang="en-US" b="0" i="1" smtClean="0">
+                                  <a:latin typeface="Cambria Math" panose="02040503050406030204" pitchFamily="18" charset="0"/>
+                                </a:rPr>
+                                <m:t>𝜎</m:t>
+                              </m:r>
+                            </m:e>
+                            <m:sub>
+                              <m:r>
+                                <a:rPr lang="en-US" b="0" i="1" smtClean="0">
+                                  <a:latin typeface="Cambria Math" panose="02040503050406030204" pitchFamily="18" charset="0"/>
+                                </a:rPr>
+                                <m:t>𝑎</m:t>
+                              </m:r>
+                            </m:sub>
+                          </m:sSub>
+                        </m:e>
+                      </m:acc>
+                      <m:r>
+                        <a:rPr lang="en-US" b="0" i="1" smtClean="0">
+                          <a:latin typeface="Cambria Math" panose="02040503050406030204" pitchFamily="18" charset="0"/>
+                        </a:rPr>
+                        <m:t>⋅</m:t>
+                      </m:r>
+                      <m:acc>
+                        <m:accPr>
+                          <m:chr m:val="̂"/>
+                          <m:ctrlPr>
+                            <a:rPr lang="en-US" b="0" i="1" smtClean="0">
+                              <a:latin typeface="Cambria Math" panose="02040503050406030204" pitchFamily="18" charset="0"/>
+                            </a:rPr>
+                          </m:ctrlPr>
+                        </m:accPr>
+                        <m:e>
+                          <m:r>
+                            <a:rPr lang="en-US" b="0" i="1" smtClean="0">
+                              <a:latin typeface="Cambria Math" panose="02040503050406030204" pitchFamily="18" charset="0"/>
+                            </a:rPr>
+                            <m:t>𝑛</m:t>
+                          </m:r>
+                        </m:e>
+                      </m:acc>
+                      <m:r>
+                        <a:rPr lang="en-US" b="0" i="1" smtClean="0">
+                          <a:latin typeface="Cambria Math" panose="02040503050406030204" pitchFamily="18" charset="0"/>
+                        </a:rPr>
+                        <m:t>=</m:t>
+                      </m:r>
+                      <m:acc>
+                        <m:accPr>
+                          <m:chr m:val="̅"/>
+                          <m:ctrlPr>
+                            <a:rPr lang="en-US" i="1">
+                              <a:latin typeface="Cambria Math" panose="02040503050406030204" pitchFamily="18" charset="0"/>
+                            </a:rPr>
+                          </m:ctrlPr>
+                        </m:accPr>
+                        <m:e>
+                          <m:sSub>
+                            <m:sSubPr>
+                              <m:ctrlPr>
+                                <a:rPr lang="en-US" i="1">
+                                  <a:latin typeface="Cambria Math" panose="02040503050406030204" pitchFamily="18" charset="0"/>
+                                </a:rPr>
+                              </m:ctrlPr>
+                            </m:sSubPr>
+                            <m:e>
+                              <m:r>
+                                <a:rPr lang="en-US" i="1">
+                                  <a:latin typeface="Cambria Math" panose="02040503050406030204" pitchFamily="18" charset="0"/>
+                                </a:rPr>
+                                <m:t>𝜎</m:t>
+                              </m:r>
+                            </m:e>
+                            <m:sub>
+                              <m:r>
+                                <a:rPr lang="en-US" b="0" i="1" smtClean="0">
+                                  <a:latin typeface="Cambria Math" panose="02040503050406030204" pitchFamily="18" charset="0"/>
+                                </a:rPr>
+                                <m:t>𝑏</m:t>
+                              </m:r>
+                            </m:sub>
+                          </m:sSub>
+                        </m:e>
+                      </m:acc>
+                      <m:r>
+                        <a:rPr lang="en-US" i="1">
+                          <a:latin typeface="Cambria Math" panose="02040503050406030204" pitchFamily="18" charset="0"/>
+                        </a:rPr>
+                        <m:t>⋅</m:t>
+                      </m:r>
+                      <m:acc>
+                        <m:accPr>
+                          <m:chr m:val="̂"/>
+                          <m:ctrlPr>
+                            <a:rPr lang="en-US" i="1">
+                              <a:latin typeface="Cambria Math" panose="02040503050406030204" pitchFamily="18" charset="0"/>
+                            </a:rPr>
+                          </m:ctrlPr>
+                        </m:accPr>
+                        <m:e>
+                          <m:r>
+                            <a:rPr lang="en-US" i="1">
+                              <a:latin typeface="Cambria Math" panose="02040503050406030204" pitchFamily="18" charset="0"/>
+                            </a:rPr>
+                            <m:t>𝑛</m:t>
+                          </m:r>
+                        </m:e>
+                      </m:acc>
+                    </m:oMath>
+                  </m:oMathPara>
+                </a14:m>
+                <a:endParaRPr lang="en-US" dirty="0"/>
+              </a:p>
+              <a:p>
+                <a:pPr marL="285750" indent="-285750">
+                  <a:buFont typeface="Arial" panose="020B0604020202020204" pitchFamily="34" charset="0"/>
+                  <a:buChar char="•"/>
+                </a:pPr>
+                <a:r>
+                  <a:rPr lang="en-US" dirty="0"/>
+                  <a:t>For continuously varying materials, we can express the wave function as:</a:t>
+                </a:r>
+              </a:p>
+              <a:p>
+                <a:pPr/>
+                <a14:m>
+                  <m:oMathPara xmlns:m="http://schemas.openxmlformats.org/officeDocument/2006/math">
+                    <m:oMathParaPr>
+                      <m:jc m:val="centerGroup"/>
+                    </m:oMathParaPr>
+                    <m:oMath xmlns:m="http://schemas.openxmlformats.org/officeDocument/2006/math">
+                      <m:r>
+                        <a:rPr lang="en-US" i="1">
+                          <a:latin typeface="Cambria Math" panose="02040503050406030204" pitchFamily="18" charset="0"/>
+                        </a:rPr>
+                        <m:t>𝜌</m:t>
+                      </m:r>
+                      <m:r>
+                        <a:rPr lang="en-US" i="1">
+                          <a:latin typeface="Cambria Math" panose="02040503050406030204" pitchFamily="18" charset="0"/>
+                        </a:rPr>
+                        <m:t>(</m:t>
+                      </m:r>
+                      <m:acc>
+                        <m:accPr>
+                          <m:chr m:val="̅"/>
+                          <m:ctrlPr>
+                            <a:rPr lang="en-US" i="1">
+                              <a:latin typeface="Cambria Math" panose="02040503050406030204" pitchFamily="18" charset="0"/>
+                            </a:rPr>
+                          </m:ctrlPr>
+                        </m:accPr>
+                        <m:e>
+                          <m:r>
+                            <a:rPr lang="en-US" i="1">
+                              <a:latin typeface="Cambria Math" panose="02040503050406030204" pitchFamily="18" charset="0"/>
+                            </a:rPr>
+                            <m:t>𝑥</m:t>
+                          </m:r>
+                        </m:e>
+                      </m:acc>
+                      <m:r>
+                        <a:rPr lang="en-US" i="1">
+                          <a:latin typeface="Cambria Math" panose="02040503050406030204" pitchFamily="18" charset="0"/>
+                        </a:rPr>
+                        <m:t>)</m:t>
+                      </m:r>
+                      <m:f>
+                        <m:fPr>
+                          <m:ctrlPr>
+                            <a:rPr lang="en-US" b="0" i="1" smtClean="0">
+                              <a:latin typeface="Cambria Math" panose="02040503050406030204" pitchFamily="18" charset="0"/>
+                            </a:rPr>
+                          </m:ctrlPr>
+                        </m:fPr>
+                        <m:num>
+                          <m:sSup>
+                            <m:sSupPr>
+                              <m:ctrlPr>
+                                <a:rPr lang="en-US" b="0" i="1" smtClean="0">
+                                  <a:latin typeface="Cambria Math" panose="02040503050406030204" pitchFamily="18" charset="0"/>
+                                </a:rPr>
+                              </m:ctrlPr>
+                            </m:sSupPr>
+                            <m:e>
+                              <m:r>
+                                <a:rPr lang="en-US" b="0" i="1" smtClean="0">
+                                  <a:latin typeface="Cambria Math" panose="02040503050406030204" pitchFamily="18" charset="0"/>
+                                  <a:ea typeface="Cambria Math" panose="02040503050406030204" pitchFamily="18" charset="0"/>
+                                </a:rPr>
+                                <m:t>𝜕</m:t>
+                              </m:r>
+                            </m:e>
+                            <m:sup>
+                              <m:r>
+                                <a:rPr lang="en-US" b="0" i="1" smtClean="0">
+                                  <a:latin typeface="Cambria Math" panose="02040503050406030204" pitchFamily="18" charset="0"/>
+                                </a:rPr>
+                                <m:t>2</m:t>
+                              </m:r>
+                            </m:sup>
+                          </m:sSup>
+                          <m:acc>
+                            <m:accPr>
+                              <m:chr m:val="̅"/>
+                              <m:ctrlPr>
+                                <a:rPr lang="en-US" b="0" i="1" smtClean="0">
+                                  <a:latin typeface="Cambria Math" panose="02040503050406030204" pitchFamily="18" charset="0"/>
+                                </a:rPr>
+                              </m:ctrlPr>
+                            </m:accPr>
+                            <m:e>
+                              <m:r>
+                                <a:rPr lang="en-US" b="0" i="1" smtClean="0">
+                                  <a:latin typeface="Cambria Math" panose="02040503050406030204" pitchFamily="18" charset="0"/>
+                                </a:rPr>
+                                <m:t>𝑢</m:t>
+                              </m:r>
+                            </m:e>
+                          </m:acc>
+                        </m:num>
+                        <m:den>
+                          <m:r>
+                            <a:rPr lang="en-US" b="0" i="1" smtClean="0">
+                              <a:latin typeface="Cambria Math" panose="02040503050406030204" pitchFamily="18" charset="0"/>
+                              <a:ea typeface="Cambria Math" panose="02040503050406030204" pitchFamily="18" charset="0"/>
+                            </a:rPr>
+                            <m:t>𝜕</m:t>
+                          </m:r>
+                          <m:sSup>
+                            <m:sSupPr>
+                              <m:ctrlPr>
+                                <a:rPr lang="en-US" b="0" i="1" smtClean="0">
+                                  <a:latin typeface="Cambria Math" panose="02040503050406030204" pitchFamily="18" charset="0"/>
+                                </a:rPr>
+                              </m:ctrlPr>
+                            </m:sSupPr>
+                            <m:e>
+                              <m:r>
+                                <a:rPr lang="en-US" b="0" i="1" smtClean="0">
+                                  <a:latin typeface="Cambria Math" panose="02040503050406030204" pitchFamily="18" charset="0"/>
+                                </a:rPr>
+                                <m:t>𝑡</m:t>
+                              </m:r>
+                            </m:e>
+                            <m:sup>
+                              <m:r>
+                                <a:rPr lang="en-US" b="0" i="1" smtClean="0">
+                                  <a:latin typeface="Cambria Math" panose="02040503050406030204" pitchFamily="18" charset="0"/>
+                                </a:rPr>
+                                <m:t>2</m:t>
+                              </m:r>
+                            </m:sup>
+                          </m:sSup>
+                        </m:den>
+                      </m:f>
+                      <m:r>
+                        <a:rPr lang="en-US" b="0" i="1" smtClean="0">
+                          <a:latin typeface="Cambria Math" panose="02040503050406030204" pitchFamily="18" charset="0"/>
+                        </a:rPr>
+                        <m:t>=</m:t>
+                      </m:r>
+                      <m:r>
+                        <m:rPr>
+                          <m:sty m:val="p"/>
+                        </m:rPr>
+                        <a:rPr lang="en-US" b="0" i="1" smtClean="0">
+                          <a:latin typeface="Cambria Math" panose="02040503050406030204" pitchFamily="18" charset="0"/>
+                          <a:ea typeface="Cambria Math" panose="02040503050406030204" pitchFamily="18" charset="0"/>
+                        </a:rPr>
+                        <m:t>∇</m:t>
+                      </m:r>
+                      <m:r>
+                        <a:rPr lang="en-US" b="0" i="1" smtClean="0">
+                          <a:latin typeface="Cambria Math" panose="02040503050406030204" pitchFamily="18" charset="0"/>
+                          <a:ea typeface="Cambria Math" panose="02040503050406030204" pitchFamily="18" charset="0"/>
+                        </a:rPr>
+                        <m:t>⋅</m:t>
+                      </m:r>
+                      <m:acc>
+                        <m:accPr>
+                          <m:chr m:val="̅"/>
+                          <m:ctrlPr>
+                            <a:rPr lang="en-US" b="0" i="1" smtClean="0">
+                              <a:latin typeface="Cambria Math" panose="02040503050406030204" pitchFamily="18" charset="0"/>
+                              <a:ea typeface="Cambria Math" panose="02040503050406030204" pitchFamily="18" charset="0"/>
+                            </a:rPr>
+                          </m:ctrlPr>
+                        </m:accPr>
+                        <m:e>
+                          <m:r>
+                            <a:rPr lang="en-US" b="0" i="1" smtClean="0">
+                              <a:latin typeface="Cambria Math" panose="02040503050406030204" pitchFamily="18" charset="0"/>
+                              <a:ea typeface="Cambria Math" panose="02040503050406030204" pitchFamily="18" charset="0"/>
+                            </a:rPr>
+                            <m:t>𝜎</m:t>
+                          </m:r>
+                        </m:e>
+                      </m:acc>
+                      <m:r>
+                        <a:rPr lang="en-US" i="1">
+                          <a:latin typeface="Cambria Math" panose="02040503050406030204" pitchFamily="18" charset="0"/>
+                        </a:rPr>
+                        <m:t>(</m:t>
+                      </m:r>
+                      <m:acc>
+                        <m:accPr>
+                          <m:chr m:val="̅"/>
+                          <m:ctrlPr>
+                            <a:rPr lang="en-US" i="1">
+                              <a:latin typeface="Cambria Math" panose="02040503050406030204" pitchFamily="18" charset="0"/>
+                            </a:rPr>
+                          </m:ctrlPr>
+                        </m:accPr>
+                        <m:e>
+                          <m:r>
+                            <a:rPr lang="en-US" i="1">
+                              <a:latin typeface="Cambria Math" panose="02040503050406030204" pitchFamily="18" charset="0"/>
+                            </a:rPr>
+                            <m:t>𝑥</m:t>
+                          </m:r>
+                        </m:e>
+                      </m:acc>
+                      <m:r>
+                        <a:rPr lang="en-US" i="1">
+                          <a:latin typeface="Cambria Math" panose="02040503050406030204" pitchFamily="18" charset="0"/>
+                        </a:rPr>
+                        <m:t>)</m:t>
+                      </m:r>
+                      <m:r>
+                        <a:rPr lang="en-US" b="0" i="1" smtClean="0">
+                          <a:latin typeface="Cambria Math" panose="02040503050406030204" pitchFamily="18" charset="0"/>
+                          <a:ea typeface="Cambria Math" panose="02040503050406030204" pitchFamily="18" charset="0"/>
+                        </a:rPr>
+                        <m:t>+</m:t>
+                      </m:r>
+                      <m:acc>
+                        <m:accPr>
+                          <m:chr m:val="̅"/>
+                          <m:ctrlPr>
+                            <a:rPr lang="en-US" b="0" i="1" smtClean="0">
+                              <a:latin typeface="Cambria Math" panose="02040503050406030204" pitchFamily="18" charset="0"/>
+                              <a:ea typeface="Cambria Math" panose="02040503050406030204" pitchFamily="18" charset="0"/>
+                            </a:rPr>
+                          </m:ctrlPr>
+                        </m:accPr>
+                        <m:e>
+                          <m:r>
+                            <a:rPr lang="en-US" b="0" i="1" smtClean="0">
+                              <a:latin typeface="Cambria Math" panose="02040503050406030204" pitchFamily="18" charset="0"/>
+                              <a:ea typeface="Cambria Math" panose="02040503050406030204" pitchFamily="18" charset="0"/>
+                            </a:rPr>
+                            <m:t>𝑓</m:t>
+                          </m:r>
+                        </m:e>
+                      </m:acc>
+                      <m:r>
+                        <a:rPr lang="en-US" i="1">
+                          <a:latin typeface="Cambria Math" panose="02040503050406030204" pitchFamily="18" charset="0"/>
+                        </a:rPr>
+                        <m:t>(</m:t>
+                      </m:r>
+                      <m:acc>
+                        <m:accPr>
+                          <m:chr m:val="̅"/>
+                          <m:ctrlPr>
+                            <a:rPr lang="en-US" i="1">
+                              <a:latin typeface="Cambria Math" panose="02040503050406030204" pitchFamily="18" charset="0"/>
+                            </a:rPr>
+                          </m:ctrlPr>
+                        </m:accPr>
+                        <m:e>
+                          <m:r>
+                            <a:rPr lang="en-US" i="1">
+                              <a:latin typeface="Cambria Math" panose="02040503050406030204" pitchFamily="18" charset="0"/>
+                            </a:rPr>
+                            <m:t>𝑥</m:t>
+                          </m:r>
+                        </m:e>
+                      </m:acc>
+                      <m:r>
+                        <a:rPr lang="en-US" i="1">
+                          <a:latin typeface="Cambria Math" panose="02040503050406030204" pitchFamily="18" charset="0"/>
+                        </a:rPr>
+                        <m:t>)</m:t>
+                      </m:r>
+                    </m:oMath>
+                  </m:oMathPara>
+                </a14:m>
+                <a:endParaRPr lang="en-US" i="1" dirty="0">
+                  <a:latin typeface="Cambria Math" panose="02040503050406030204" pitchFamily="18" charset="0"/>
+                </a:endParaRPr>
+              </a:p>
+              <a:p>
+                <a:pPr/>
+                <a14:m>
+                  <m:oMathPara xmlns:m="http://schemas.openxmlformats.org/officeDocument/2006/math">
+                    <m:oMathParaPr>
+                      <m:jc m:val="centerGroup"/>
+                    </m:oMathParaPr>
+                    <m:oMath xmlns:m="http://schemas.openxmlformats.org/officeDocument/2006/math">
+                      <m:r>
+                        <a:rPr lang="en-US" i="1" smtClean="0">
+                          <a:latin typeface="Cambria Math" panose="02040503050406030204" pitchFamily="18" charset="0"/>
+                        </a:rPr>
+                        <m:t>𝜌</m:t>
+                      </m:r>
+                      <m:r>
+                        <a:rPr lang="en-US" b="0" i="1" smtClean="0">
+                          <a:latin typeface="Cambria Math" panose="02040503050406030204" pitchFamily="18" charset="0"/>
+                        </a:rPr>
+                        <m:t>(</m:t>
+                      </m:r>
+                      <m:acc>
+                        <m:accPr>
+                          <m:chr m:val="̅"/>
+                          <m:ctrlPr>
+                            <a:rPr lang="en-US" b="0" i="1" smtClean="0">
+                              <a:latin typeface="Cambria Math" panose="02040503050406030204" pitchFamily="18" charset="0"/>
+                            </a:rPr>
+                          </m:ctrlPr>
+                        </m:accPr>
+                        <m:e>
+                          <m:r>
+                            <a:rPr lang="en-US" b="0" i="1" smtClean="0">
+                              <a:latin typeface="Cambria Math" panose="02040503050406030204" pitchFamily="18" charset="0"/>
+                            </a:rPr>
+                            <m:t>𝑥</m:t>
+                          </m:r>
+                        </m:e>
+                      </m:acc>
+                      <m:r>
+                        <a:rPr lang="en-US" b="0" i="1" smtClean="0">
+                          <a:latin typeface="Cambria Math" panose="02040503050406030204" pitchFamily="18" charset="0"/>
+                        </a:rPr>
+                        <m:t>)</m:t>
+                      </m:r>
+                      <m:f>
+                        <m:fPr>
+                          <m:ctrlPr>
+                            <a:rPr lang="en-US" i="1">
+                              <a:latin typeface="Cambria Math" panose="02040503050406030204" pitchFamily="18" charset="0"/>
+                            </a:rPr>
+                          </m:ctrlPr>
+                        </m:fPr>
+                        <m:num>
+                          <m:sSup>
+                            <m:sSupPr>
+                              <m:ctrlPr>
+                                <a:rPr lang="en-US" i="1">
+                                  <a:latin typeface="Cambria Math" panose="02040503050406030204" pitchFamily="18" charset="0"/>
+                                </a:rPr>
+                              </m:ctrlPr>
+                            </m:sSupPr>
+                            <m:e>
+                              <m:r>
+                                <a:rPr lang="en-US" i="1">
+                                  <a:latin typeface="Cambria Math" panose="02040503050406030204" pitchFamily="18" charset="0"/>
+                                  <a:ea typeface="Cambria Math" panose="02040503050406030204" pitchFamily="18" charset="0"/>
+                                </a:rPr>
+                                <m:t>𝜕</m:t>
+                              </m:r>
+                            </m:e>
+                            <m:sup>
+                              <m:r>
+                                <a:rPr lang="en-US" i="1">
+                                  <a:latin typeface="Cambria Math" panose="02040503050406030204" pitchFamily="18" charset="0"/>
+                                </a:rPr>
+                                <m:t>2</m:t>
+                              </m:r>
+                            </m:sup>
+                          </m:sSup>
+                          <m:acc>
+                            <m:accPr>
+                              <m:chr m:val="̅"/>
+                              <m:ctrlPr>
+                                <a:rPr lang="en-US" i="1">
+                                  <a:latin typeface="Cambria Math" panose="02040503050406030204" pitchFamily="18" charset="0"/>
+                                </a:rPr>
+                              </m:ctrlPr>
+                            </m:accPr>
+                            <m:e>
+                              <m:r>
+                                <a:rPr lang="en-US" i="1">
+                                  <a:latin typeface="Cambria Math" panose="02040503050406030204" pitchFamily="18" charset="0"/>
+                                </a:rPr>
+                                <m:t>𝑢</m:t>
+                              </m:r>
+                            </m:e>
+                          </m:acc>
+                        </m:num>
+                        <m:den>
+                          <m:r>
+                            <a:rPr lang="en-US" i="1">
+                              <a:latin typeface="Cambria Math" panose="02040503050406030204" pitchFamily="18" charset="0"/>
+                              <a:ea typeface="Cambria Math" panose="02040503050406030204" pitchFamily="18" charset="0"/>
+                            </a:rPr>
+                            <m:t>𝜕</m:t>
+                          </m:r>
+                          <m:sSup>
+                            <m:sSupPr>
+                              <m:ctrlPr>
+                                <a:rPr lang="en-US" i="1">
+                                  <a:latin typeface="Cambria Math" panose="02040503050406030204" pitchFamily="18" charset="0"/>
+                                </a:rPr>
+                              </m:ctrlPr>
+                            </m:sSupPr>
+                            <m:e>
+                              <m:r>
+                                <a:rPr lang="en-US" i="1">
+                                  <a:latin typeface="Cambria Math" panose="02040503050406030204" pitchFamily="18" charset="0"/>
+                                </a:rPr>
+                                <m:t>𝑡</m:t>
+                              </m:r>
+                            </m:e>
+                            <m:sup>
+                              <m:r>
+                                <a:rPr lang="en-US" i="1">
+                                  <a:latin typeface="Cambria Math" panose="02040503050406030204" pitchFamily="18" charset="0"/>
+                                </a:rPr>
+                                <m:t>2</m:t>
+                              </m:r>
+                            </m:sup>
+                          </m:sSup>
+                        </m:den>
+                      </m:f>
+                      <m:r>
+                        <a:rPr lang="en-US" i="1">
+                          <a:latin typeface="Cambria Math" panose="02040503050406030204" pitchFamily="18" charset="0"/>
+                        </a:rPr>
+                        <m:t>=</m:t>
+                      </m:r>
+                      <m:d>
+                        <m:dPr>
+                          <m:ctrlPr>
+                            <a:rPr lang="en-US" b="0" i="1" smtClean="0">
+                              <a:latin typeface="Cambria Math" panose="02040503050406030204" pitchFamily="18" charset="0"/>
+                            </a:rPr>
+                          </m:ctrlPr>
+                        </m:dPr>
+                        <m:e>
+                          <m:r>
+                            <a:rPr lang="en-US" b="0" i="1" smtClean="0">
+                              <a:latin typeface="Cambria Math" panose="02040503050406030204" pitchFamily="18" charset="0"/>
+                            </a:rPr>
+                            <m:t>𝜆</m:t>
+                          </m:r>
+                          <m:r>
+                            <a:rPr lang="en-US" i="1">
+                              <a:latin typeface="Cambria Math" panose="02040503050406030204" pitchFamily="18" charset="0"/>
+                            </a:rPr>
+                            <m:t>(</m:t>
+                          </m:r>
+                          <m:acc>
+                            <m:accPr>
+                              <m:chr m:val="̅"/>
+                              <m:ctrlPr>
+                                <a:rPr lang="en-US" i="1">
+                                  <a:latin typeface="Cambria Math" panose="02040503050406030204" pitchFamily="18" charset="0"/>
+                                </a:rPr>
+                              </m:ctrlPr>
+                            </m:accPr>
+                            <m:e>
+                              <m:r>
+                                <a:rPr lang="en-US" i="1">
+                                  <a:latin typeface="Cambria Math" panose="02040503050406030204" pitchFamily="18" charset="0"/>
+                                </a:rPr>
+                                <m:t>𝑥</m:t>
+                              </m:r>
+                            </m:e>
+                          </m:acc>
+                          <m:r>
+                            <a:rPr lang="en-US" i="1">
+                              <a:latin typeface="Cambria Math" panose="02040503050406030204" pitchFamily="18" charset="0"/>
+                            </a:rPr>
+                            <m:t>)</m:t>
+                          </m:r>
+                          <m:r>
+                            <a:rPr lang="en-US" b="0" i="1" smtClean="0">
+                              <a:latin typeface="Cambria Math" panose="02040503050406030204" pitchFamily="18" charset="0"/>
+                            </a:rPr>
+                            <m:t>+</m:t>
+                          </m:r>
+                          <m:r>
+                            <a:rPr lang="en-US" b="0" i="1" smtClean="0">
+                              <a:latin typeface="Cambria Math" panose="02040503050406030204" pitchFamily="18" charset="0"/>
+                            </a:rPr>
+                            <m:t>𝜇</m:t>
+                          </m:r>
+                          <m:r>
+                            <a:rPr lang="en-US" i="1">
+                              <a:latin typeface="Cambria Math" panose="02040503050406030204" pitchFamily="18" charset="0"/>
+                            </a:rPr>
+                            <m:t>(</m:t>
+                          </m:r>
+                          <m:acc>
+                            <m:accPr>
+                              <m:chr m:val="̅"/>
+                              <m:ctrlPr>
+                                <a:rPr lang="en-US" i="1">
+                                  <a:latin typeface="Cambria Math" panose="02040503050406030204" pitchFamily="18" charset="0"/>
+                                </a:rPr>
+                              </m:ctrlPr>
+                            </m:accPr>
+                            <m:e>
+                              <m:r>
+                                <a:rPr lang="en-US" i="1">
+                                  <a:latin typeface="Cambria Math" panose="02040503050406030204" pitchFamily="18" charset="0"/>
+                                </a:rPr>
+                                <m:t>𝑥</m:t>
+                              </m:r>
+                            </m:e>
+                          </m:acc>
+                          <m:r>
+                            <a:rPr lang="en-US" i="1">
+                              <a:latin typeface="Cambria Math" panose="02040503050406030204" pitchFamily="18" charset="0"/>
+                            </a:rPr>
+                            <m:t>)</m:t>
+                          </m:r>
+                        </m:e>
+                      </m:d>
+                      <m:r>
+                        <m:rPr>
+                          <m:sty m:val="p"/>
+                        </m:rPr>
+                        <a:rPr lang="en-US" b="0" i="0" smtClean="0">
+                          <a:latin typeface="Cambria Math" panose="02040503050406030204" pitchFamily="18" charset="0"/>
+                        </a:rPr>
+                        <m:t>∇</m:t>
+                      </m:r>
+                      <m:d>
+                        <m:dPr>
+                          <m:ctrlPr>
+                            <a:rPr lang="en-US" b="0" i="1" smtClean="0">
+                              <a:latin typeface="Cambria Math" panose="02040503050406030204" pitchFamily="18" charset="0"/>
+                            </a:rPr>
+                          </m:ctrlPr>
+                        </m:dPr>
+                        <m:e>
+                          <m:r>
+                            <m:rPr>
+                              <m:sty m:val="p"/>
+                            </m:rPr>
+                            <a:rPr lang="en-US" i="1">
+                              <a:latin typeface="Cambria Math" panose="02040503050406030204" pitchFamily="18" charset="0"/>
+                              <a:ea typeface="Cambria Math" panose="02040503050406030204" pitchFamily="18" charset="0"/>
+                            </a:rPr>
+                            <m:t>∇</m:t>
+                          </m:r>
+                          <m:r>
+                            <a:rPr lang="en-US" i="1">
+                              <a:latin typeface="Cambria Math" panose="02040503050406030204" pitchFamily="18" charset="0"/>
+                              <a:ea typeface="Cambria Math" panose="02040503050406030204" pitchFamily="18" charset="0"/>
+                            </a:rPr>
+                            <m:t>⋅</m:t>
+                          </m:r>
+                          <m:acc>
+                            <m:accPr>
+                              <m:chr m:val="̅"/>
+                              <m:ctrlPr>
+                                <a:rPr lang="en-US" i="1">
+                                  <a:latin typeface="Cambria Math" panose="02040503050406030204" pitchFamily="18" charset="0"/>
+                                  <a:ea typeface="Cambria Math" panose="02040503050406030204" pitchFamily="18" charset="0"/>
+                                </a:rPr>
+                              </m:ctrlPr>
+                            </m:accPr>
+                            <m:e>
+                              <m:r>
+                                <a:rPr lang="en-US" b="0" i="1" smtClean="0">
+                                  <a:latin typeface="Cambria Math" panose="02040503050406030204" pitchFamily="18" charset="0"/>
+                                  <a:ea typeface="Cambria Math" panose="02040503050406030204" pitchFamily="18" charset="0"/>
+                                </a:rPr>
+                                <m:t>𝑢</m:t>
+                              </m:r>
+                            </m:e>
+                          </m:acc>
+                        </m:e>
+                      </m:d>
+                      <m:r>
+                        <a:rPr lang="en-US" i="1">
+                          <a:latin typeface="Cambria Math" panose="02040503050406030204" pitchFamily="18" charset="0"/>
+                          <a:ea typeface="Cambria Math" panose="02040503050406030204" pitchFamily="18" charset="0"/>
+                        </a:rPr>
+                        <m:t>+</m:t>
+                      </m:r>
+                      <m:r>
+                        <a:rPr lang="en-US" b="0" i="1" smtClean="0">
+                          <a:latin typeface="Cambria Math" panose="02040503050406030204" pitchFamily="18" charset="0"/>
+                          <a:ea typeface="Cambria Math" panose="02040503050406030204" pitchFamily="18" charset="0"/>
+                        </a:rPr>
+                        <m:t>𝜇</m:t>
+                      </m:r>
+                      <m:sSup>
+                        <m:sSupPr>
+                          <m:ctrlPr>
+                            <a:rPr lang="en-US" b="0" i="1" smtClean="0">
+                              <a:latin typeface="Cambria Math" panose="02040503050406030204" pitchFamily="18" charset="0"/>
+                              <a:ea typeface="Cambria Math" panose="02040503050406030204" pitchFamily="18" charset="0"/>
+                            </a:rPr>
+                          </m:ctrlPr>
+                        </m:sSupPr>
+                        <m:e>
+                          <m:r>
+                            <m:rPr>
+                              <m:sty m:val="p"/>
+                            </m:rPr>
+                            <a:rPr lang="en-US" b="0" i="0" smtClean="0">
+                              <a:latin typeface="Cambria Math" panose="02040503050406030204" pitchFamily="18" charset="0"/>
+                              <a:ea typeface="Cambria Math" panose="02040503050406030204" pitchFamily="18" charset="0"/>
+                            </a:rPr>
+                            <m:t>∇</m:t>
+                          </m:r>
+                        </m:e>
+                        <m:sup>
+                          <m:r>
+                            <a:rPr lang="en-US" b="0" i="1" smtClean="0">
+                              <a:latin typeface="Cambria Math" panose="02040503050406030204" pitchFamily="18" charset="0"/>
+                              <a:ea typeface="Cambria Math" panose="02040503050406030204" pitchFamily="18" charset="0"/>
+                            </a:rPr>
+                            <m:t>2</m:t>
+                          </m:r>
+                        </m:sup>
+                      </m:sSup>
+                      <m:acc>
+                        <m:accPr>
+                          <m:chr m:val="̅"/>
+                          <m:ctrlPr>
+                            <a:rPr lang="en-US" i="1">
+                              <a:latin typeface="Cambria Math" panose="02040503050406030204" pitchFamily="18" charset="0"/>
+                              <a:ea typeface="Cambria Math" panose="02040503050406030204" pitchFamily="18" charset="0"/>
+                            </a:rPr>
+                          </m:ctrlPr>
+                        </m:accPr>
+                        <m:e>
+                          <m:r>
+                            <a:rPr lang="en-US" b="0" i="1" smtClean="0">
+                              <a:latin typeface="Cambria Math" panose="02040503050406030204" pitchFamily="18" charset="0"/>
+                              <a:ea typeface="Cambria Math" panose="02040503050406030204" pitchFamily="18" charset="0"/>
+                            </a:rPr>
+                            <m:t>𝑢</m:t>
+                          </m:r>
+                        </m:e>
+                      </m:acc>
+                      <m:r>
+                        <a:rPr lang="en-US" b="0" i="1" smtClean="0">
+                          <a:latin typeface="Cambria Math" panose="02040503050406030204" pitchFamily="18" charset="0"/>
+                          <a:ea typeface="Cambria Math" panose="02040503050406030204" pitchFamily="18" charset="0"/>
+                        </a:rPr>
+                        <m:t>+</m:t>
+                      </m:r>
+                      <m:acc>
+                        <m:accPr>
+                          <m:chr m:val="̅"/>
+                          <m:ctrlPr>
+                            <a:rPr lang="en-US" b="0" i="1" smtClean="0">
+                              <a:latin typeface="Cambria Math" panose="02040503050406030204" pitchFamily="18" charset="0"/>
+                              <a:ea typeface="Cambria Math" panose="02040503050406030204" pitchFamily="18" charset="0"/>
+                            </a:rPr>
+                          </m:ctrlPr>
+                        </m:accPr>
+                        <m:e>
+                          <m:r>
+                            <a:rPr lang="en-US" b="0" i="1" smtClean="0">
+                              <a:latin typeface="Cambria Math" panose="02040503050406030204" pitchFamily="18" charset="0"/>
+                              <a:ea typeface="Cambria Math" panose="02040503050406030204" pitchFamily="18" charset="0"/>
+                            </a:rPr>
+                            <m:t>𝑓</m:t>
+                          </m:r>
+                        </m:e>
+                      </m:acc>
+                      <m:r>
+                        <a:rPr lang="en-US" i="1">
+                          <a:latin typeface="Cambria Math" panose="02040503050406030204" pitchFamily="18" charset="0"/>
+                        </a:rPr>
+                        <m:t>(</m:t>
+                      </m:r>
+                      <m:acc>
+                        <m:accPr>
+                          <m:chr m:val="̅"/>
+                          <m:ctrlPr>
+                            <a:rPr lang="en-US" i="1">
+                              <a:latin typeface="Cambria Math" panose="02040503050406030204" pitchFamily="18" charset="0"/>
+                            </a:rPr>
+                          </m:ctrlPr>
+                        </m:accPr>
+                        <m:e>
+                          <m:r>
+                            <a:rPr lang="en-US" i="1">
+                              <a:latin typeface="Cambria Math" panose="02040503050406030204" pitchFamily="18" charset="0"/>
+                            </a:rPr>
+                            <m:t>𝑥</m:t>
+                          </m:r>
+                        </m:e>
+                      </m:acc>
+                      <m:r>
+                        <a:rPr lang="en-US" i="1">
+                          <a:latin typeface="Cambria Math" panose="02040503050406030204" pitchFamily="18" charset="0"/>
+                        </a:rPr>
+                        <m:t>)</m:t>
+                      </m:r>
+                    </m:oMath>
+                  </m:oMathPara>
+                </a14:m>
+                <a:endParaRPr lang="en-US" dirty="0"/>
+              </a:p>
+              <a:p>
+                <a:pPr marL="285750" indent="-285750">
+                  <a:buFont typeface="Arial" panose="020B0604020202020204" pitchFamily="34" charset="0"/>
+                  <a:buChar char="•"/>
+                </a:pPr>
+                <a:endParaRPr lang="en-US" dirty="0"/>
+              </a:p>
+            </p:txBody>
+          </p:sp>
+        </mc:Choice>
+        <mc:Fallback xmlns="">
           <p:sp>
             <p:nvSpPr>
               <p:cNvPr id="4" name="Content Placeholder 3">
@@ -16546,8 +16908,8 @@
           </a:p>
         </p:txBody>
       </p:sp>
-      <mc:AlternateContent xmlns:mc="http://schemas.openxmlformats.org/markup-compatibility/2006" xmlns:a14="http://schemas.microsoft.com/office/drawing/2010/main">
-        <mc:Choice Requires="a14">
+      <mc:AlternateContent xmlns:mc="http://schemas.openxmlformats.org/markup-compatibility/2006">
+        <mc:Choice xmlns:a14="http://schemas.microsoft.com/office/drawing/2010/main" Requires="a14">
           <p:sp>
             <p:nvSpPr>
               <p:cNvPr id="4" name="Content Placeholder 3">
@@ -16614,7 +16976,7 @@
                             <a:rPr lang="en-US" b="0" i="1" smtClean="0">
                               <a:latin typeface="Cambria Math" panose="02040503050406030204" pitchFamily="18" charset="0"/>
                             </a:rPr>
-                            <m:t>𝑡</m:t>
+                            <m:t>𝑛</m:t>
                           </m:r>
                           <m:r>
                             <a:rPr lang="en-US" b="0" i="1" smtClean="0">
@@ -16689,7 +17051,7 @@
                                 <a:rPr lang="en-US" b="0" i="1" smtClean="0">
                                   <a:latin typeface="Cambria Math" panose="02040503050406030204" pitchFamily="18" charset="0"/>
                                 </a:rPr>
-                                <m:t>𝑡</m:t>
+                                <m:t>𝑛</m:t>
                               </m:r>
                             </m:sub>
                           </m:sSub>
@@ -16781,7 +17143,7 @@
                                     <a:rPr lang="en-US" b="0" i="1" smtClean="0">
                                       <a:latin typeface="Cambria Math" panose="02040503050406030204" pitchFamily="18" charset="0"/>
                                     </a:rPr>
-                                    <m:t>𝑡</m:t>
+                                    <m:t>𝑛</m:t>
                                   </m:r>
                                 </m:sub>
                               </m:sSub>
@@ -16886,7 +17248,7 @@
                                 <a:rPr lang="en-US" b="0" i="1" smtClean="0">
                                   <a:latin typeface="Cambria Math" panose="02040503050406030204" pitchFamily="18" charset="0"/>
                                 </a:rPr>
-                                <m:t>𝑡</m:t>
+                                <m:t>𝑛</m:t>
                               </m:r>
                             </m:sub>
                           </m:sSub>
@@ -17022,7 +17384,7 @@
                                       <a:latin typeface="Cambria Math" panose="02040503050406030204" pitchFamily="18" charset="0"/>
                                       <a:ea typeface="Cambria Math" panose="02040503050406030204" pitchFamily="18" charset="0"/>
                                     </a:rPr>
-                                    <m:t>𝑡</m:t>
+                                    <m:t>𝑛</m:t>
                                   </m:r>
                                 </m:sub>
                               </m:sSub>
@@ -17403,7 +17765,7 @@
             </p:txBody>
           </p:sp>
         </mc:Choice>
-        <mc:Fallback xmlns="">
+        <mc:Fallback>
           <p:sp>
             <p:nvSpPr>
               <p:cNvPr id="4" name="Content Placeholder 3">
@@ -17428,7 +17790,7 @@
               <a:blipFill>
                 <a:blip r:embed="rId3"/>
                 <a:stretch>
-                  <a:fillRect l="-352" t="-1519"/>
+                  <a:fillRect l="-352" t="-1519" r="-234"/>
                 </a:stretch>
               </a:blipFill>
             </p:spPr>
@@ -17449,7 +17811,7 @@
       </mc:AlternateContent>
       <p:pic>
         <p:nvPicPr>
-          <p:cNvPr id="17" name="Picture 16" descr="A diagram of a machine learning process&#10;&#10;Description automatically generated">
+          <p:cNvPr id="17" name="Picture 16">
             <a:extLst>
               <a:ext uri="{FF2B5EF4-FFF2-40B4-BE49-F238E27FC236}">
                 <a16:creationId xmlns:a16="http://schemas.microsoft.com/office/drawing/2014/main" id="{EC26E83A-C181-117A-8BDE-9E0BA5D6ACBA}"/>
@@ -17463,14 +17825,13 @@
         </p:nvPicPr>
         <p:blipFill>
           <a:blip r:embed="rId4"/>
-          <a:stretch>
-            <a:fillRect/>
-          </a:stretch>
+          <a:srcRect/>
+          <a:stretch/>
         </p:blipFill>
         <p:spPr>
           <a:xfrm>
-            <a:off x="2470614" y="4066831"/>
-            <a:ext cx="7439196" cy="2775031"/>
+            <a:off x="2470614" y="4229494"/>
+            <a:ext cx="7439196" cy="2449705"/>
           </a:xfrm>
           <a:prstGeom prst="rect">
             <a:avLst/>
@@ -17526,6 +17887,298 @@
 </file>
 
 <file path=ppt/slides/slide8.xml><?xml version="1.0" encoding="utf-8"?>
+<p:sld xmlns:a="http://schemas.openxmlformats.org/drawingml/2006/main" xmlns:r="http://schemas.openxmlformats.org/officeDocument/2006/relationships" xmlns:p="http://schemas.openxmlformats.org/presentationml/2006/main">
+  <p:cSld>
+    <p:spTree>
+      <p:nvGrpSpPr>
+        <p:cNvPr id="1" name="">
+          <a:extLst>
+            <a:ext uri="{FF2B5EF4-FFF2-40B4-BE49-F238E27FC236}">
+              <a16:creationId xmlns:a16="http://schemas.microsoft.com/office/drawing/2014/main" id="{A61AB1A7-3AAA-1D0C-890A-4A175EAE6AE7}"/>
+            </a:ext>
+          </a:extLst>
+        </p:cNvPr>
+        <p:cNvGrpSpPr/>
+        <p:nvPr/>
+      </p:nvGrpSpPr>
+      <p:grpSpPr>
+        <a:xfrm>
+          <a:off x="0" y="0"/>
+          <a:ext cx="0" cy="0"/>
+          <a:chOff x="0" y="0"/>
+          <a:chExt cx="0" cy="0"/>
+        </a:xfrm>
+      </p:grpSpPr>
+      <p:sp>
+        <p:nvSpPr>
+          <p:cNvPr id="2" name="Title 1">
+            <a:extLst>
+              <a:ext uri="{FF2B5EF4-FFF2-40B4-BE49-F238E27FC236}">
+                <a16:creationId xmlns:a16="http://schemas.microsoft.com/office/drawing/2014/main" id="{D218839A-9679-5F99-6E8C-882991B32914}"/>
+              </a:ext>
+            </a:extLst>
+          </p:cNvPr>
+          <p:cNvSpPr>
+            <a:spLocks noGrp="1"/>
+          </p:cNvSpPr>
+          <p:nvPr>
+            <p:ph type="title"/>
+          </p:nvPr>
+        </p:nvSpPr>
+        <p:spPr>
+          <a:xfrm>
+            <a:off x="1341120" y="558801"/>
+            <a:ext cx="9953308" cy="580682"/>
+          </a:xfrm>
+        </p:spPr>
+        <p:txBody>
+          <a:bodyPr/>
+          <a:lstStyle/>
+          <a:p>
+            <a:r>
+              <a:rPr lang="en-US" dirty="0"/>
+              <a:t>Fourier Neural Operators - Implementation</a:t>
+            </a:r>
+          </a:p>
+        </p:txBody>
+      </p:sp>
+      <p:sp>
+        <p:nvSpPr>
+          <p:cNvPr id="68" name="Slide Number Placeholder 67">
+            <a:extLst>
+              <a:ext uri="{FF2B5EF4-FFF2-40B4-BE49-F238E27FC236}">
+                <a16:creationId xmlns:a16="http://schemas.microsoft.com/office/drawing/2014/main" id="{A30D05A7-3415-7F41-D45B-0E5DA8617D95}"/>
+              </a:ext>
+            </a:extLst>
+          </p:cNvPr>
+          <p:cNvSpPr>
+            <a:spLocks noGrp="1"/>
+          </p:cNvSpPr>
+          <p:nvPr>
+            <p:ph type="sldNum" sz="quarter" idx="13"/>
+          </p:nvPr>
+        </p:nvSpPr>
+        <p:spPr>
+          <a:xfrm>
+            <a:off x="10373350" y="6356349"/>
+            <a:ext cx="987552" cy="365125"/>
+          </a:xfrm>
+        </p:spPr>
+        <p:txBody>
+          <a:bodyPr/>
+          <a:lstStyle/>
+          <a:p>
+            <a:fld id="{A49DFD55-3C28-40EF-9E31-A92D2E4017FF}" type="slidenum">
+              <a:rPr lang="en-US" smtClean="0"/>
+              <a:pPr/>
+              <a:t>8</a:t>
+            </a:fld>
+            <a:endParaRPr lang="en-US" dirty="0"/>
+          </a:p>
+        </p:txBody>
+      </p:sp>
+      <p:sp>
+        <p:nvSpPr>
+          <p:cNvPr id="4" name="Content Placeholder 3">
+            <a:extLst>
+              <a:ext uri="{FF2B5EF4-FFF2-40B4-BE49-F238E27FC236}">
+                <a16:creationId xmlns:a16="http://schemas.microsoft.com/office/drawing/2014/main" id="{8D836372-0FEA-329C-3C3A-FFC90B1F7000}"/>
+              </a:ext>
+            </a:extLst>
+          </p:cNvPr>
+          <p:cNvSpPr>
+            <a:spLocks noGrp="1"/>
+          </p:cNvSpPr>
+          <p:nvPr>
+            <p:ph sz="half" idx="14"/>
+          </p:nvPr>
+        </p:nvSpPr>
+        <p:spPr>
+          <a:xfrm>
+            <a:off x="897572" y="1139483"/>
+            <a:ext cx="10396856" cy="5216865"/>
+          </a:xfrm>
+        </p:spPr>
+        <p:txBody>
+          <a:bodyPr/>
+          <a:lstStyle/>
+          <a:p>
+            <a:pPr marL="285750" indent="-285750">
+              <a:buFont typeface="Arial" panose="020B0604020202020204" pitchFamily="34" charset="0"/>
+              <a:buChar char="•"/>
+            </a:pPr>
+            <a:r>
+              <a:rPr lang="en-US" dirty="0" err="1"/>
+              <a:t>modes_height</a:t>
+            </a:r>
+            <a:r>
+              <a:rPr lang="en-US" dirty="0"/>
+              <a:t> = </a:t>
+            </a:r>
+            <a:r>
+              <a:rPr lang="en-US" dirty="0" err="1"/>
+              <a:t>modes_width</a:t>
+            </a:r>
+            <a:r>
+              <a:rPr lang="en-US" dirty="0"/>
+              <a:t> = 32 (allows for 32 spatial frequencies in the x and y dimension)</a:t>
+            </a:r>
+          </a:p>
+          <a:p>
+            <a:pPr marL="285750" indent="-285750">
+              <a:buFont typeface="Arial" panose="020B0604020202020204" pitchFamily="34" charset="0"/>
+              <a:buChar char="•"/>
+            </a:pPr>
+            <a:r>
+              <a:rPr lang="en-US" dirty="0" err="1"/>
+              <a:t>in_channels</a:t>
+            </a:r>
+            <a:r>
+              <a:rPr lang="en-US" dirty="0"/>
+              <a:t> = 3, </a:t>
+            </a:r>
+            <a:r>
+              <a:rPr lang="en-US" dirty="0" err="1"/>
+              <a:t>out_channels</a:t>
+            </a:r>
+            <a:r>
+              <a:rPr lang="en-US" dirty="0"/>
+              <a:t> = 4 (3 input images, 4 output images)</a:t>
+            </a:r>
+          </a:p>
+          <a:p>
+            <a:pPr marL="285750" indent="-285750">
+              <a:buFont typeface="Arial" panose="020B0604020202020204" pitchFamily="34" charset="0"/>
+              <a:buChar char="•"/>
+            </a:pPr>
+            <a:r>
+              <a:rPr lang="en-US" dirty="0" err="1"/>
+              <a:t>hidden_channels</a:t>
+            </a:r>
+            <a:r>
+              <a:rPr lang="en-US" dirty="0"/>
+              <a:t> = 64 (model param size approx. scales quadratically with this param)</a:t>
+            </a:r>
+          </a:p>
+          <a:p>
+            <a:pPr marL="285750" indent="-285750">
+              <a:buFont typeface="Arial" panose="020B0604020202020204" pitchFamily="34" charset="0"/>
+              <a:buChar char="•"/>
+            </a:pPr>
+            <a:r>
+              <a:rPr lang="en-US" dirty="0" err="1"/>
+              <a:t>num_layers</a:t>
+            </a:r>
+            <a:r>
+              <a:rPr lang="en-US" dirty="0"/>
+              <a:t> = 4 (in literature, 4 has been sufficient for most applications)</a:t>
+            </a:r>
+          </a:p>
+        </p:txBody>
+      </p:sp>
+      <p:pic>
+        <p:nvPicPr>
+          <p:cNvPr id="8" name="Picture 7">
+            <a:extLst>
+              <a:ext uri="{FF2B5EF4-FFF2-40B4-BE49-F238E27FC236}">
+                <a16:creationId xmlns:a16="http://schemas.microsoft.com/office/drawing/2014/main" id="{97850B71-FF9D-2D9C-27FD-698E55E67DE2}"/>
+              </a:ext>
+            </a:extLst>
+          </p:cNvPr>
+          <p:cNvPicPr>
+            <a:picLocks noChangeAspect="1"/>
+          </p:cNvPicPr>
+          <p:nvPr/>
+        </p:nvPicPr>
+        <p:blipFill>
+          <a:blip r:embed="rId3"/>
+          <a:stretch>
+            <a:fillRect/>
+          </a:stretch>
+        </p:blipFill>
+        <p:spPr>
+          <a:xfrm>
+            <a:off x="0" y="2875994"/>
+            <a:ext cx="8135485" cy="3982006"/>
+          </a:xfrm>
+          <a:prstGeom prst="rect">
+            <a:avLst/>
+          </a:prstGeom>
+        </p:spPr>
+      </p:pic>
+      <p:pic>
+        <p:nvPicPr>
+          <p:cNvPr id="10" name="Picture 9">
+            <a:extLst>
+              <a:ext uri="{FF2B5EF4-FFF2-40B4-BE49-F238E27FC236}">
+                <a16:creationId xmlns:a16="http://schemas.microsoft.com/office/drawing/2014/main" id="{66119B39-CCCC-2BD4-99CF-B06FF787CB17}"/>
+              </a:ext>
+            </a:extLst>
+          </p:cNvPr>
+          <p:cNvPicPr>
+            <a:picLocks noChangeAspect="1"/>
+          </p:cNvPicPr>
+          <p:nvPr/>
+        </p:nvPicPr>
+        <p:blipFill>
+          <a:blip r:embed="rId4"/>
+          <a:srcRect t="3423" b="4288"/>
+          <a:stretch/>
+        </p:blipFill>
+        <p:spPr>
+          <a:xfrm>
+            <a:off x="8135485" y="2879510"/>
+            <a:ext cx="4056515" cy="1350499"/>
+          </a:xfrm>
+          <a:prstGeom prst="rect">
+            <a:avLst/>
+          </a:prstGeom>
+        </p:spPr>
+      </p:pic>
+      <p:pic>
+        <p:nvPicPr>
+          <p:cNvPr id="12" name="Picture 11">
+            <a:extLst>
+              <a:ext uri="{FF2B5EF4-FFF2-40B4-BE49-F238E27FC236}">
+                <a16:creationId xmlns:a16="http://schemas.microsoft.com/office/drawing/2014/main" id="{88E58BB6-FE56-356D-3DAF-52A8D201484E}"/>
+              </a:ext>
+            </a:extLst>
+          </p:cNvPr>
+          <p:cNvPicPr>
+            <a:picLocks noChangeAspect="1"/>
+          </p:cNvPicPr>
+          <p:nvPr/>
+        </p:nvPicPr>
+        <p:blipFill>
+          <a:blip r:embed="rId5"/>
+          <a:stretch>
+            <a:fillRect/>
+          </a:stretch>
+        </p:blipFill>
+        <p:spPr>
+          <a:xfrm>
+            <a:off x="8135484" y="4230009"/>
+            <a:ext cx="2598837" cy="2627991"/>
+          </a:xfrm>
+          <a:prstGeom prst="rect">
+            <a:avLst/>
+          </a:prstGeom>
+        </p:spPr>
+      </p:pic>
+    </p:spTree>
+    <p:extLst>
+      <p:ext uri="{BB962C8B-B14F-4D97-AF65-F5344CB8AC3E}">
+        <p14:creationId xmlns:p14="http://schemas.microsoft.com/office/powerpoint/2010/main" val="197232763"/>
+      </p:ext>
+    </p:extLst>
+  </p:cSld>
+  <p:clrMapOvr>
+    <a:masterClrMapping/>
+  </p:clrMapOvr>
+</p:sld>
+</file>
+
+<file path=ppt/slides/slide9.xml><?xml version="1.0" encoding="utf-8"?>
 <p:sld xmlns:a="http://schemas.openxmlformats.org/drawingml/2006/main" xmlns:r="http://schemas.openxmlformats.org/officeDocument/2006/relationships" xmlns:p="http://schemas.openxmlformats.org/presentationml/2006/main">
   <p:cSld>
     <p:spTree>
@@ -17604,7 +18257,7 @@
             <a:fld id="{A49DFD55-3C28-40EF-9E31-A92D2E4017FF}" type="slidenum">
               <a:rPr lang="en-US" smtClean="0"/>
               <a:pPr/>
-              <a:t>8</a:t>
+              <a:t>9</a:t>
             </a:fld>
             <a:endParaRPr lang="en-US" dirty="0"/>
           </a:p>
@@ -17796,236 +18449,6 @@
     <p:extLst>
       <p:ext uri="{BB962C8B-B14F-4D97-AF65-F5344CB8AC3E}">
         <p14:creationId xmlns:p14="http://schemas.microsoft.com/office/powerpoint/2010/main" val="3185897304"/>
-      </p:ext>
-    </p:extLst>
-  </p:cSld>
-  <p:clrMapOvr>
-    <a:masterClrMapping/>
-  </p:clrMapOvr>
-</p:sld>
-</file>
-
-<file path=ppt/slides/slide9.xml><?xml version="1.0" encoding="utf-8"?>
-<p:sld xmlns:a="http://schemas.openxmlformats.org/drawingml/2006/main" xmlns:r="http://schemas.openxmlformats.org/officeDocument/2006/relationships" xmlns:p="http://schemas.openxmlformats.org/presentationml/2006/main" show="0">
-  <p:cSld>
-    <p:spTree>
-      <p:nvGrpSpPr>
-        <p:cNvPr id="1" name=""/>
-        <p:cNvGrpSpPr/>
-        <p:nvPr/>
-      </p:nvGrpSpPr>
-      <p:grpSpPr>
-        <a:xfrm>
-          <a:off x="0" y="0"/>
-          <a:ext cx="0" cy="0"/>
-          <a:chOff x="0" y="0"/>
-          <a:chExt cx="0" cy="0"/>
-        </a:xfrm>
-      </p:grpSpPr>
-      <p:sp>
-        <p:nvSpPr>
-          <p:cNvPr id="2" name="Title 1">
-            <a:extLst>
-              <a:ext uri="{FF2B5EF4-FFF2-40B4-BE49-F238E27FC236}">
-                <a16:creationId xmlns:a16="http://schemas.microsoft.com/office/drawing/2014/main" id="{8B27D9B3-B64F-656A-0D99-161A6C0F518F}"/>
-              </a:ext>
-            </a:extLst>
-          </p:cNvPr>
-          <p:cNvSpPr>
-            <a:spLocks noGrp="1"/>
-          </p:cNvSpPr>
-          <p:nvPr>
-            <p:ph type="title"/>
-          </p:nvPr>
-        </p:nvSpPr>
-        <p:spPr>
-          <a:xfrm>
-            <a:off x="1341120" y="558801"/>
-            <a:ext cx="9953308" cy="580682"/>
-          </a:xfrm>
-        </p:spPr>
-        <p:txBody>
-          <a:bodyPr/>
-          <a:lstStyle/>
-          <a:p>
-            <a:r>
-              <a:rPr lang="en-US" dirty="0"/>
-              <a:t>Troubleshooting</a:t>
-            </a:r>
-          </a:p>
-        </p:txBody>
-      </p:sp>
-      <p:sp>
-        <p:nvSpPr>
-          <p:cNvPr id="68" name="Slide Number Placeholder 67">
-            <a:extLst>
-              <a:ext uri="{FF2B5EF4-FFF2-40B4-BE49-F238E27FC236}">
-                <a16:creationId xmlns:a16="http://schemas.microsoft.com/office/drawing/2014/main" id="{AA0ACADD-CC4E-851C-DA07-C22DB97FA23E}"/>
-              </a:ext>
-            </a:extLst>
-          </p:cNvPr>
-          <p:cNvSpPr>
-            <a:spLocks noGrp="1"/>
-          </p:cNvSpPr>
-          <p:nvPr>
-            <p:ph type="sldNum" sz="quarter" idx="13"/>
-          </p:nvPr>
-        </p:nvSpPr>
-        <p:spPr>
-          <a:xfrm>
-            <a:off x="10373350" y="6356349"/>
-            <a:ext cx="987552" cy="365125"/>
-          </a:xfrm>
-        </p:spPr>
-        <p:txBody>
-          <a:bodyPr/>
-          <a:lstStyle/>
-          <a:p>
-            <a:fld id="{A49DFD55-3C28-40EF-9E31-A92D2E4017FF}" type="slidenum">
-              <a:rPr lang="en-US" smtClean="0"/>
-              <a:pPr/>
-              <a:t>9</a:t>
-            </a:fld>
-            <a:endParaRPr lang="en-US" dirty="0"/>
-          </a:p>
-        </p:txBody>
-      </p:sp>
-      <p:sp>
-        <p:nvSpPr>
-          <p:cNvPr id="4" name="Content Placeholder 3">
-            <a:extLst>
-              <a:ext uri="{FF2B5EF4-FFF2-40B4-BE49-F238E27FC236}">
-                <a16:creationId xmlns:a16="http://schemas.microsoft.com/office/drawing/2014/main" id="{AB1F8A9E-54FC-8CCB-7C5C-8B9D1002ADA2}"/>
-              </a:ext>
-            </a:extLst>
-          </p:cNvPr>
-          <p:cNvSpPr>
-            <a:spLocks noGrp="1"/>
-          </p:cNvSpPr>
-          <p:nvPr>
-            <p:ph sz="half" idx="14"/>
-          </p:nvPr>
-        </p:nvSpPr>
-        <p:spPr>
-          <a:xfrm>
-            <a:off x="1341120" y="1139483"/>
-            <a:ext cx="8920481" cy="5216865"/>
-          </a:xfrm>
-        </p:spPr>
-        <p:txBody>
-          <a:bodyPr/>
-          <a:lstStyle/>
-          <a:p>
-            <a:pPr marL="285750" indent="-285750">
-              <a:buFont typeface="Arial" panose="020B0604020202020204" pitchFamily="34" charset="0"/>
-              <a:buChar char="•"/>
-            </a:pPr>
-            <a:r>
-              <a:rPr lang="en-US" dirty="0"/>
-              <a:t>Currently using </a:t>
-            </a:r>
-            <a:r>
-              <a:rPr lang="en-US" dirty="0" err="1"/>
-              <a:t>Neuralop</a:t>
-            </a:r>
-            <a:r>
-              <a:rPr lang="en-US" dirty="0"/>
-              <a:t> package to build &amp; train FNO neural operator. </a:t>
-            </a:r>
-          </a:p>
-          <a:p>
-            <a:pPr marL="569214" lvl="1"/>
-            <a:r>
-              <a:rPr lang="en-US" dirty="0"/>
-              <a:t>Inputs: geometry; Outputs: eigenvector x component; Fixed: wavevector</a:t>
-            </a:r>
-          </a:p>
-          <a:p>
-            <a:pPr marL="285750" indent="-285750">
-              <a:buFont typeface="Arial" panose="020B0604020202020204" pitchFamily="34" charset="0"/>
-              <a:buChar char="•"/>
-            </a:pPr>
-            <a:r>
-              <a:rPr lang="en-US" dirty="0"/>
-              <a:t>Suspect the neural network is not properly transforming the input space.</a:t>
-            </a:r>
-          </a:p>
-          <a:p>
-            <a:pPr marL="285750" indent="-285750">
-              <a:buFont typeface="Arial" panose="020B0604020202020204" pitchFamily="34" charset="0"/>
-              <a:buChar char="•"/>
-            </a:pPr>
-            <a:r>
-              <a:rPr lang="en-US" dirty="0"/>
-              <a:t>Suspect there are other inputs necessary for network to learn, like wavevector.</a:t>
-            </a:r>
-          </a:p>
-          <a:p>
-            <a:pPr marL="285750" indent="-285750">
-              <a:buFont typeface="Arial" panose="020B0604020202020204" pitchFamily="34" charset="0"/>
-              <a:buChar char="•"/>
-            </a:pPr>
-            <a:r>
-              <a:rPr lang="en-US" dirty="0"/>
-              <a:t>Suspect it may be easier to learn eigenvector magnitude over one component</a:t>
-            </a:r>
-          </a:p>
-          <a:p>
-            <a:pPr marL="285750" indent="-285750">
-              <a:buFont typeface="Arial" panose="020B0604020202020204" pitchFamily="34" charset="0"/>
-              <a:buChar char="•"/>
-            </a:pPr>
-            <a:r>
-              <a:rPr lang="en-US" dirty="0"/>
-              <a:t>Train/test on one sample to see if model can learn just one representation.</a:t>
-            </a:r>
-          </a:p>
-          <a:p>
-            <a:pPr marL="285750" indent="-285750">
-              <a:buFont typeface="Arial" panose="020B0604020202020204" pitchFamily="34" charset="0"/>
-              <a:buChar char="•"/>
-            </a:pPr>
-            <a:r>
-              <a:rPr lang="en-US" dirty="0"/>
-              <a:t>Swap to eigenvector magnitude to see if it can learn that. Then try x &amp; y.</a:t>
-            </a:r>
-          </a:p>
-        </p:txBody>
-      </p:sp>
-      <p:pic>
-        <p:nvPicPr>
-          <p:cNvPr id="5" name="Picture 4" descr="A blue and green squares&#10;&#10;Description automatically generated">
-            <a:extLst>
-              <a:ext uri="{FF2B5EF4-FFF2-40B4-BE49-F238E27FC236}">
-                <a16:creationId xmlns:a16="http://schemas.microsoft.com/office/drawing/2014/main" id="{931E91D2-10F6-706B-F055-E2ED87EABE1E}"/>
-              </a:ext>
-            </a:extLst>
-          </p:cNvPr>
-          <p:cNvPicPr>
-            <a:picLocks noChangeAspect="1"/>
-          </p:cNvPicPr>
-          <p:nvPr/>
-        </p:nvPicPr>
-        <p:blipFill>
-          <a:blip r:embed="rId3"/>
-          <a:stretch>
-            <a:fillRect/>
-          </a:stretch>
-        </p:blipFill>
-        <p:spPr>
-          <a:xfrm>
-            <a:off x="1341120" y="3838543"/>
-            <a:ext cx="8920481" cy="2882931"/>
-          </a:xfrm>
-          <a:prstGeom prst="rect">
-            <a:avLst/>
-          </a:prstGeom>
-        </p:spPr>
-      </p:pic>
-    </p:spTree>
-    <p:extLst>
-      <p:ext uri="{BB962C8B-B14F-4D97-AF65-F5344CB8AC3E}">
-        <p14:creationId xmlns:p14="http://schemas.microsoft.com/office/powerpoint/2010/main" val="2594934582"/>
       </p:ext>
     </p:extLst>
   </p:cSld>
@@ -18827,23 +19250,6 @@
 </file>
 
 <file path=customXml/item1.xml><?xml version="1.0" encoding="utf-8"?>
-<?mso-contentType ?>
-<FormTemplates xmlns="http://schemas.microsoft.com/sharepoint/v3/contenttype/forms">
-  <Display>DocumentLibraryForm</Display>
-  <Edit>DocumentLibraryForm</Edit>
-  <New>DocumentLibraryForm</New>
-</FormTemplates>
-</file>
-
-<file path=customXml/item2.xml><?xml version="1.0" encoding="utf-8"?>
-<p:properties xmlns:p="http://schemas.microsoft.com/office/2006/metadata/properties" xmlns:xsi="http://www.w3.org/2001/XMLSchema-instance" xmlns:pc="http://schemas.microsoft.com/office/infopath/2007/PartnerControls">
-  <documentManagement>
-    <_activity xmlns="5ab46313-7834-4214-aec9-155b2fe37111" xsi:nil="true"/>
-  </documentManagement>
-</p:properties>
-</file>
-
-<file path=customXml/item3.xml><?xml version="1.0" encoding="utf-8"?>
 <ct:contentTypeSchema xmlns:ct="http://schemas.microsoft.com/office/2006/metadata/contentType" xmlns:ma="http://schemas.microsoft.com/office/2006/metadata/properties/metaAttributes" ct:_="" ma:_="" ma:contentTypeName="Document" ma:contentTypeID="0x0101008C6D81289CCC004F972E63C671B7D298" ma:contentTypeVersion="16" ma:contentTypeDescription="Create a new document." ma:contentTypeScope="" ma:versionID="c2c3315a8cb087b7f4137d6d13727adf">
   <xsd:schema xmlns:xsd="http://www.w3.org/2001/XMLSchema" xmlns:xs="http://www.w3.org/2001/XMLSchema" xmlns:p="http://schemas.microsoft.com/office/2006/metadata/properties" xmlns:ns3="5ab46313-7834-4214-aec9-155b2fe37111" xmlns:ns4="2d1aa6b7-1a0a-46e3-8f70-b6d3e32cbd9a" targetNamespace="http://schemas.microsoft.com/office/2006/metadata/properties" ma:root="true" ma:fieldsID="26aa1baf6954272560c91e9e12c661a6" ns3:_="" ns4:_="">
     <xsd:import namespace="5ab46313-7834-4214-aec9-155b2fe37111"/>
@@ -19082,10 +19488,38 @@
 </ct:contentTypeSchema>
 </file>
 
+<file path=customXml/item2.xml><?xml version="1.0" encoding="utf-8"?>
+<p:properties xmlns:p="http://schemas.microsoft.com/office/2006/metadata/properties" xmlns:xsi="http://www.w3.org/2001/XMLSchema-instance" xmlns:pc="http://schemas.microsoft.com/office/infopath/2007/PartnerControls">
+  <documentManagement>
+    <_activity xmlns="5ab46313-7834-4214-aec9-155b2fe37111" xsi:nil="true"/>
+  </documentManagement>
+</p:properties>
+</file>
+
+<file path=customXml/item3.xml><?xml version="1.0" encoding="utf-8"?>
+<?mso-contentType ?>
+<FormTemplates xmlns="http://schemas.microsoft.com/sharepoint/v3/contenttype/forms">
+  <Display>DocumentLibraryForm</Display>
+  <Edit>DocumentLibraryForm</Edit>
+  <New>DocumentLibraryForm</New>
+</FormTemplates>
+</file>
+
 <file path=customXml/itemProps1.xml><?xml version="1.0" encoding="utf-8"?>
-<ds:datastoreItem xmlns:ds="http://schemas.openxmlformats.org/officeDocument/2006/customXml" ds:itemID="{CABF691C-888B-4061-8A6F-D5CE84A0254B}">
+<ds:datastoreItem xmlns:ds="http://schemas.openxmlformats.org/officeDocument/2006/customXml" ds:itemID="{7DFF6294-0604-41C8-8ED0-04BB72B8FEC1}">
   <ds:schemaRefs>
-    <ds:schemaRef ds:uri="http://schemas.microsoft.com/sharepoint/v3/contenttype/forms"/>
+    <ds:schemaRef ds:uri="http://schemas.microsoft.com/office/2006/metadata/contentType"/>
+    <ds:schemaRef ds:uri="http://schemas.microsoft.com/office/2006/metadata/properties/metaAttributes"/>
+    <ds:schemaRef ds:uri="http://www.w3.org/2001/XMLSchema"/>
+    <ds:schemaRef ds:uri="http://schemas.microsoft.com/office/2006/metadata/properties"/>
+    <ds:schemaRef ds:uri="5ab46313-7834-4214-aec9-155b2fe37111"/>
+    <ds:schemaRef ds:uri="2d1aa6b7-1a0a-46e3-8f70-b6d3e32cbd9a"/>
+    <ds:schemaRef ds:uri="http://schemas.microsoft.com/office/2006/documentManagement/types"/>
+    <ds:schemaRef ds:uri="http://schemas.microsoft.com/office/infopath/2007/PartnerControls"/>
+    <ds:schemaRef ds:uri="http://schemas.openxmlformats.org/package/2006/metadata/core-properties"/>
+    <ds:schemaRef ds:uri="http://purl.org/dc/elements/1.1/"/>
+    <ds:schemaRef ds:uri="http://purl.org/dc/terms/"/>
+    <ds:schemaRef ds:uri="http://schemas.microsoft.com/internal/obd"/>
   </ds:schemaRefs>
 </ds:datastoreItem>
 </file>
@@ -19108,20 +19542,9 @@
 </file>
 
 <file path=customXml/itemProps3.xml><?xml version="1.0" encoding="utf-8"?>
-<ds:datastoreItem xmlns:ds="http://schemas.openxmlformats.org/officeDocument/2006/customXml" ds:itemID="{7DFF6294-0604-41C8-8ED0-04BB72B8FEC1}">
+<ds:datastoreItem xmlns:ds="http://schemas.openxmlformats.org/officeDocument/2006/customXml" ds:itemID="{CABF691C-888B-4061-8A6F-D5CE84A0254B}">
   <ds:schemaRefs>
-    <ds:schemaRef ds:uri="http://schemas.microsoft.com/office/2006/metadata/contentType"/>
-    <ds:schemaRef ds:uri="http://schemas.microsoft.com/office/2006/metadata/properties/metaAttributes"/>
-    <ds:schemaRef ds:uri="http://www.w3.org/2001/XMLSchema"/>
-    <ds:schemaRef ds:uri="http://schemas.microsoft.com/office/2006/metadata/properties"/>
-    <ds:schemaRef ds:uri="5ab46313-7834-4214-aec9-155b2fe37111"/>
-    <ds:schemaRef ds:uri="2d1aa6b7-1a0a-46e3-8f70-b6d3e32cbd9a"/>
-    <ds:schemaRef ds:uri="http://schemas.microsoft.com/office/2006/documentManagement/types"/>
-    <ds:schemaRef ds:uri="http://schemas.microsoft.com/office/infopath/2007/PartnerControls"/>
-    <ds:schemaRef ds:uri="http://schemas.openxmlformats.org/package/2006/metadata/core-properties"/>
-    <ds:schemaRef ds:uri="http://purl.org/dc/elements/1.1/"/>
-    <ds:schemaRef ds:uri="http://purl.org/dc/terms/"/>
-    <ds:schemaRef ds:uri="http://schemas.microsoft.com/internal/obd"/>
+    <ds:schemaRef ds:uri="http://schemas.microsoft.com/sharepoint/v3/contenttype/forms"/>
   </ds:schemaRefs>
 </ds:datastoreItem>
 </file>

</xml_diff>